<commit_message>
Removed redlines and made a change on slide 6
Removed all redlines from entire ppt and added BernoulliNB as model in slide 6
</commit_message>
<xml_diff>
--- a/Using Data Driven Solution to Detect and Prevent Fraud for Caratlane.pptx
+++ b/Using Data Driven Solution to Detect and Prevent Fraud for Caratlane.pptx
@@ -129,22 +129,6 @@
 
 <file path=ppt/changesInfos/changesInfo1.xml><?xml version="1.0" encoding="utf-8"?>
 <pc:chgInfo xmlns:a="http://schemas.openxmlformats.org/drawingml/2006/main" xmlns:r="http://schemas.openxmlformats.org/officeDocument/2006/relationships" xmlns:ac="http://schemas.microsoft.com/office/drawing/2013/main/command" xmlns:pc="http://schemas.microsoft.com/office/powerpoint/2013/main/command">
-  <pc:docChgLst>
-    <pc:chgData name="Rathore, Anupama" userId="S::anupama.rathore@capco.com::53e29683-f3af-420f-8d29-265ae79f771c" providerId="AD" clId="Web-{C89BF7CF-34DD-458A-88AD-2D295C1F2909}"/>
-    <pc:docChg chg="addSld">
-      <pc:chgData name="Rathore, Anupama" userId="S::anupama.rathore@capco.com::53e29683-f3af-420f-8d29-265ae79f771c" providerId="AD" clId="Web-{C89BF7CF-34DD-458A-88AD-2D295C1F2909}" dt="2022-11-28T12:30:39.204" v="0"/>
-      <pc:docMkLst>
-        <pc:docMk/>
-      </pc:docMkLst>
-      <pc:sldChg chg="new">
-        <pc:chgData name="Rathore, Anupama" userId="S::anupama.rathore@capco.com::53e29683-f3af-420f-8d29-265ae79f771c" providerId="AD" clId="Web-{C89BF7CF-34DD-458A-88AD-2D295C1F2909}" dt="2022-11-28T12:30:39.204" v="0"/>
-        <pc:sldMkLst>
-          <pc:docMk/>
-          <pc:sldMk cId="4023298244" sldId="259"/>
-        </pc:sldMkLst>
-      </pc:sldChg>
-    </pc:docChg>
-  </pc:docChgLst>
   <pc:docChgLst>
     <pc:chgData name="Rathore, Anupama" userId="53e29683-f3af-420f-8d29-265ae79f771c" providerId="ADAL" clId="{BA7E0770-6634-48B7-B6BD-E9061DB5BB2A}"/>
     <pc:docChg chg="undo redo custSel addSld delSld modSld sldOrd">
@@ -817,6 +801,22 @@
     </pc:docChg>
   </pc:docChgLst>
   <pc:docChgLst>
+    <pc:chgData name="Rathore, Anupama" userId="S::anupama.rathore@capco.com::53e29683-f3af-420f-8d29-265ae79f771c" providerId="AD" clId="Web-{C89BF7CF-34DD-458A-88AD-2D295C1F2909}"/>
+    <pc:docChg chg="addSld">
+      <pc:chgData name="Rathore, Anupama" userId="S::anupama.rathore@capco.com::53e29683-f3af-420f-8d29-265ae79f771c" providerId="AD" clId="Web-{C89BF7CF-34DD-458A-88AD-2D295C1F2909}" dt="2022-11-28T12:30:39.204" v="0"/>
+      <pc:docMkLst>
+        <pc:docMk/>
+      </pc:docMkLst>
+      <pc:sldChg chg="new">
+        <pc:chgData name="Rathore, Anupama" userId="S::anupama.rathore@capco.com::53e29683-f3af-420f-8d29-265ae79f771c" providerId="AD" clId="Web-{C89BF7CF-34DD-458A-88AD-2D295C1F2909}" dt="2022-11-28T12:30:39.204" v="0"/>
+        <pc:sldMkLst>
+          <pc:docMk/>
+          <pc:sldMk cId="4023298244" sldId="259"/>
+        </pc:sldMkLst>
+      </pc:sldChg>
+    </pc:docChg>
+  </pc:docChgLst>
+  <pc:docChgLst>
     <pc:chgData name="Negi, Kailash" userId="S::kailash.negi@capco.com::7bc98a1e-656a-45ed-8779-f234834c40b5" providerId="AD" clId="Web-{780CAA75-C49C-461F-B5BA-ECF9748F4287}"/>
     <pc:docChg chg="delSld">
       <pc:chgData name="Negi, Kailash" userId="S::kailash.negi@capco.com::7bc98a1e-656a-45ed-8779-f234834c40b5" providerId="AD" clId="Web-{780CAA75-C49C-461F-B5BA-ECF9748F4287}" dt="2022-11-28T12:33:55.153" v="0"/>
@@ -986,7 +986,7 @@
               <a:rPr lang="en-IN" smtClean="0"/>
               <a:t>12-12-2022</a:t>
             </a:fld>
-            <a:endParaRPr lang="en-IN"/>
+            <a:endParaRPr lang="en-IN" dirty="0"/>
           </a:p>
         </p:txBody>
       </p:sp>
@@ -1011,7 +1011,7 @@
           <a:bodyPr/>
           <a:lstStyle/>
           <a:p>
-            <a:endParaRPr lang="en-IN"/>
+            <a:endParaRPr lang="en-IN" dirty="0"/>
           </a:p>
         </p:txBody>
       </p:sp>
@@ -1040,7 +1040,7 @@
               <a:rPr lang="en-IN" smtClean="0"/>
               <a:t>‹#›</a:t>
             </a:fld>
-            <a:endParaRPr lang="en-IN"/>
+            <a:endParaRPr lang="en-IN" dirty="0"/>
           </a:p>
         </p:txBody>
       </p:sp>
@@ -1186,7 +1186,7 @@
               <a:rPr lang="en-IN" smtClean="0"/>
               <a:t>12-12-2022</a:t>
             </a:fld>
-            <a:endParaRPr lang="en-IN"/>
+            <a:endParaRPr lang="en-IN" dirty="0"/>
           </a:p>
         </p:txBody>
       </p:sp>
@@ -1211,7 +1211,7 @@
           <a:bodyPr/>
           <a:lstStyle/>
           <a:p>
-            <a:endParaRPr lang="en-IN"/>
+            <a:endParaRPr lang="en-IN" dirty="0"/>
           </a:p>
         </p:txBody>
       </p:sp>
@@ -1240,7 +1240,7 @@
               <a:rPr lang="en-IN" smtClean="0"/>
               <a:t>‹#›</a:t>
             </a:fld>
-            <a:endParaRPr lang="en-IN"/>
+            <a:endParaRPr lang="en-IN" dirty="0"/>
           </a:p>
         </p:txBody>
       </p:sp>
@@ -1396,7 +1396,7 @@
               <a:rPr lang="en-IN" smtClean="0"/>
               <a:t>12-12-2022</a:t>
             </a:fld>
-            <a:endParaRPr lang="en-IN"/>
+            <a:endParaRPr lang="en-IN" dirty="0"/>
           </a:p>
         </p:txBody>
       </p:sp>
@@ -1421,7 +1421,7 @@
           <a:bodyPr/>
           <a:lstStyle/>
           <a:p>
-            <a:endParaRPr lang="en-IN"/>
+            <a:endParaRPr lang="en-IN" dirty="0"/>
           </a:p>
         </p:txBody>
       </p:sp>
@@ -1450,7 +1450,7 @@
               <a:rPr lang="en-IN" smtClean="0"/>
               <a:t>‹#›</a:t>
             </a:fld>
-            <a:endParaRPr lang="en-IN"/>
+            <a:endParaRPr lang="en-IN" dirty="0"/>
           </a:p>
         </p:txBody>
       </p:sp>
@@ -1551,7 +1551,7 @@
               <a:rPr lang="en-US" smtClean="0"/>
               <a:t>12/12/2022</a:t>
             </a:fld>
-            <a:endParaRPr lang="en-US"/>
+            <a:endParaRPr lang="en-US" dirty="0"/>
           </a:p>
         </p:txBody>
       </p:sp>
@@ -1570,7 +1570,7 @@
           <a:bodyPr/>
           <a:lstStyle/>
           <a:p>
-            <a:endParaRPr lang="en-US"/>
+            <a:endParaRPr lang="en-US" dirty="0"/>
           </a:p>
         </p:txBody>
       </p:sp>
@@ -1593,7 +1593,7 @@
               <a:rPr lang="en-US" smtClean="0"/>
               <a:t>‹#›</a:t>
             </a:fld>
-            <a:endParaRPr lang="en-US"/>
+            <a:endParaRPr lang="en-US" dirty="0"/>
           </a:p>
         </p:txBody>
       </p:sp>
@@ -1764,7 +1764,7 @@
               <a:rPr lang="en-US" smtClean="0"/>
               <a:t>12/12/2022</a:t>
             </a:fld>
-            <a:endParaRPr lang="en-US"/>
+            <a:endParaRPr lang="en-US" dirty="0"/>
           </a:p>
         </p:txBody>
       </p:sp>
@@ -1783,7 +1783,7 @@
           <a:bodyPr/>
           <a:lstStyle/>
           <a:p>
-            <a:endParaRPr lang="en-US"/>
+            <a:endParaRPr lang="en-US" dirty="0"/>
           </a:p>
         </p:txBody>
       </p:sp>
@@ -1806,7 +1806,7 @@
               <a:rPr lang="en-US" smtClean="0"/>
               <a:t>‹#›</a:t>
             </a:fld>
-            <a:endParaRPr lang="en-US"/>
+            <a:endParaRPr lang="en-US" dirty="0"/>
           </a:p>
         </p:txBody>
       </p:sp>
@@ -2022,7 +2022,7 @@
               <a:rPr lang="en-IN" smtClean="0"/>
               <a:t>12-12-2022</a:t>
             </a:fld>
-            <a:endParaRPr lang="en-IN"/>
+            <a:endParaRPr lang="en-IN" dirty="0"/>
           </a:p>
         </p:txBody>
       </p:sp>
@@ -2047,7 +2047,7 @@
           <a:bodyPr/>
           <a:lstStyle/>
           <a:p>
-            <a:endParaRPr lang="en-IN"/>
+            <a:endParaRPr lang="en-IN" dirty="0"/>
           </a:p>
         </p:txBody>
       </p:sp>
@@ -2076,7 +2076,7 @@
               <a:rPr lang="en-IN" smtClean="0"/>
               <a:t>‹#›</a:t>
             </a:fld>
-            <a:endParaRPr lang="en-IN"/>
+            <a:endParaRPr lang="en-IN" dirty="0"/>
           </a:p>
         </p:txBody>
       </p:sp>
@@ -2298,7 +2298,7 @@
               <a:rPr lang="en-IN" smtClean="0"/>
               <a:t>12-12-2022</a:t>
             </a:fld>
-            <a:endParaRPr lang="en-IN"/>
+            <a:endParaRPr lang="en-IN" dirty="0"/>
           </a:p>
         </p:txBody>
       </p:sp>
@@ -2323,7 +2323,7 @@
           <a:bodyPr/>
           <a:lstStyle/>
           <a:p>
-            <a:endParaRPr lang="en-IN"/>
+            <a:endParaRPr lang="en-IN" dirty="0"/>
           </a:p>
         </p:txBody>
       </p:sp>
@@ -2352,7 +2352,7 @@
               <a:rPr lang="en-IN" smtClean="0"/>
               <a:t>‹#›</a:t>
             </a:fld>
-            <a:endParaRPr lang="en-IN"/>
+            <a:endParaRPr lang="en-IN" dirty="0"/>
           </a:p>
         </p:txBody>
       </p:sp>
@@ -2566,7 +2566,7 @@
               <a:rPr lang="en-IN" smtClean="0"/>
               <a:t>12-12-2022</a:t>
             </a:fld>
-            <a:endParaRPr lang="en-IN"/>
+            <a:endParaRPr lang="en-IN" dirty="0"/>
           </a:p>
         </p:txBody>
       </p:sp>
@@ -2591,7 +2591,7 @@
           <a:bodyPr/>
           <a:lstStyle/>
           <a:p>
-            <a:endParaRPr lang="en-IN"/>
+            <a:endParaRPr lang="en-IN" dirty="0"/>
           </a:p>
         </p:txBody>
       </p:sp>
@@ -2620,7 +2620,7 @@
               <a:rPr lang="en-IN" smtClean="0"/>
               <a:t>‹#›</a:t>
             </a:fld>
-            <a:endParaRPr lang="en-IN"/>
+            <a:endParaRPr lang="en-IN" dirty="0"/>
           </a:p>
         </p:txBody>
       </p:sp>
@@ -2981,7 +2981,7 @@
               <a:rPr lang="en-IN" smtClean="0"/>
               <a:t>12-12-2022</a:t>
             </a:fld>
-            <a:endParaRPr lang="en-IN"/>
+            <a:endParaRPr lang="en-IN" dirty="0"/>
           </a:p>
         </p:txBody>
       </p:sp>
@@ -3006,7 +3006,7 @@
           <a:bodyPr/>
           <a:lstStyle/>
           <a:p>
-            <a:endParaRPr lang="en-IN"/>
+            <a:endParaRPr lang="en-IN" dirty="0"/>
           </a:p>
         </p:txBody>
       </p:sp>
@@ -3035,7 +3035,7 @@
               <a:rPr lang="en-IN" smtClean="0"/>
               <a:t>‹#›</a:t>
             </a:fld>
-            <a:endParaRPr lang="en-IN"/>
+            <a:endParaRPr lang="en-IN" dirty="0"/>
           </a:p>
         </p:txBody>
       </p:sp>
@@ -3123,7 +3123,7 @@
               <a:rPr lang="en-IN" smtClean="0"/>
               <a:t>12-12-2022</a:t>
             </a:fld>
-            <a:endParaRPr lang="en-IN"/>
+            <a:endParaRPr lang="en-IN" dirty="0"/>
           </a:p>
         </p:txBody>
       </p:sp>
@@ -3148,7 +3148,7 @@
           <a:bodyPr/>
           <a:lstStyle/>
           <a:p>
-            <a:endParaRPr lang="en-IN"/>
+            <a:endParaRPr lang="en-IN" dirty="0"/>
           </a:p>
         </p:txBody>
       </p:sp>
@@ -3177,7 +3177,7 @@
               <a:rPr lang="en-IN" smtClean="0"/>
               <a:t>‹#›</a:t>
             </a:fld>
-            <a:endParaRPr lang="en-IN"/>
+            <a:endParaRPr lang="en-IN" dirty="0"/>
           </a:p>
         </p:txBody>
       </p:sp>
@@ -3236,7 +3236,7 @@
               <a:rPr lang="en-IN" smtClean="0"/>
               <a:t>12-12-2022</a:t>
             </a:fld>
-            <a:endParaRPr lang="en-IN"/>
+            <a:endParaRPr lang="en-IN" dirty="0"/>
           </a:p>
         </p:txBody>
       </p:sp>
@@ -3261,7 +3261,7 @@
           <a:bodyPr/>
           <a:lstStyle/>
           <a:p>
-            <a:endParaRPr lang="en-IN"/>
+            <a:endParaRPr lang="en-IN" dirty="0"/>
           </a:p>
         </p:txBody>
       </p:sp>
@@ -3290,7 +3290,7 @@
               <a:rPr lang="en-IN" smtClean="0"/>
               <a:t>‹#›</a:t>
             </a:fld>
-            <a:endParaRPr lang="en-IN"/>
+            <a:endParaRPr lang="en-IN" dirty="0"/>
           </a:p>
         </p:txBody>
       </p:sp>
@@ -3549,7 +3549,7 @@
               <a:rPr lang="en-IN" smtClean="0"/>
               <a:t>12-12-2022</a:t>
             </a:fld>
-            <a:endParaRPr lang="en-IN"/>
+            <a:endParaRPr lang="en-IN" dirty="0"/>
           </a:p>
         </p:txBody>
       </p:sp>
@@ -3574,7 +3574,7 @@
           <a:bodyPr/>
           <a:lstStyle/>
           <a:p>
-            <a:endParaRPr lang="en-IN"/>
+            <a:endParaRPr lang="en-IN" dirty="0"/>
           </a:p>
         </p:txBody>
       </p:sp>
@@ -3603,7 +3603,7 @@
               <a:rPr lang="en-IN" smtClean="0"/>
               <a:t>‹#›</a:t>
             </a:fld>
-            <a:endParaRPr lang="en-IN"/>
+            <a:endParaRPr lang="en-IN" dirty="0"/>
           </a:p>
         </p:txBody>
       </p:sp>
@@ -3738,7 +3738,7 @@
             </a:lvl9pPr>
           </a:lstStyle>
           <a:p>
-            <a:endParaRPr lang="en-IN"/>
+            <a:endParaRPr lang="en-IN" dirty="0"/>
           </a:p>
         </p:txBody>
       </p:sp>
@@ -3838,7 +3838,7 @@
               <a:rPr lang="en-IN" smtClean="0"/>
               <a:t>12-12-2022</a:t>
             </a:fld>
-            <a:endParaRPr lang="en-IN"/>
+            <a:endParaRPr lang="en-IN" dirty="0"/>
           </a:p>
         </p:txBody>
       </p:sp>
@@ -3863,7 +3863,7 @@
           <a:bodyPr/>
           <a:lstStyle/>
           <a:p>
-            <a:endParaRPr lang="en-IN"/>
+            <a:endParaRPr lang="en-IN" dirty="0"/>
           </a:p>
         </p:txBody>
       </p:sp>
@@ -3892,7 +3892,7 @@
               <a:rPr lang="en-IN" smtClean="0"/>
               <a:t>‹#›</a:t>
             </a:fld>
-            <a:endParaRPr lang="en-IN"/>
+            <a:endParaRPr lang="en-IN" dirty="0"/>
           </a:p>
         </p:txBody>
       </p:sp>
@@ -4081,7 +4081,7 @@
               <a:rPr lang="en-IN" smtClean="0"/>
               <a:t>12-12-2022</a:t>
             </a:fld>
-            <a:endParaRPr lang="en-IN"/>
+            <a:endParaRPr lang="en-IN" dirty="0"/>
           </a:p>
         </p:txBody>
       </p:sp>
@@ -4124,7 +4124,7 @@
             </a:lvl1pPr>
           </a:lstStyle>
           <a:p>
-            <a:endParaRPr lang="en-IN"/>
+            <a:endParaRPr lang="en-IN" dirty="0"/>
           </a:p>
         </p:txBody>
       </p:sp>
@@ -4171,7 +4171,7 @@
               <a:rPr lang="en-IN" smtClean="0"/>
               <a:t>‹#›</a:t>
             </a:fld>
-            <a:endParaRPr lang="en-IN"/>
+            <a:endParaRPr lang="en-IN" dirty="0"/>
           </a:p>
         </p:txBody>
       </p:sp>
@@ -4562,7 +4562,7 @@
           <a:lstStyle/>
           <a:p>
             <a:pPr algn="ctr"/>
-            <a:endParaRPr lang="en-US"/>
+            <a:endParaRPr lang="en-US" dirty="0"/>
           </a:p>
         </p:txBody>
       </p:sp>
@@ -4626,7 +4626,7 @@
           <a:lstStyle/>
           <a:p>
             <a:r>
-              <a:rPr lang="en-US" sz="5100" b="1">
+              <a:rPr lang="en-US" sz="5100" b="1" dirty="0">
                 <a:solidFill>
                   <a:srgbClr val="FFFFFF"/>
                 </a:solidFill>
@@ -4635,7 +4635,7 @@
               </a:rPr>
               <a:t>Using Data Driven Solution to Detect &amp; Prevent Fraud for Caratlane</a:t>
             </a:r>
-            <a:endParaRPr lang="en-IN" sz="5100" b="1">
+            <a:endParaRPr lang="en-IN" sz="5100" b="1" dirty="0">
               <a:solidFill>
                 <a:srgbClr val="FFFFFF"/>
               </a:solidFill>
@@ -4674,7 +4674,7 @@
           <a:lstStyle/>
           <a:p>
             <a:r>
-              <a:rPr lang="en-US" sz="1900" b="1">
+              <a:rPr lang="en-US" sz="1900" b="1" dirty="0">
                 <a:solidFill>
                   <a:srgbClr val="FFFFFF"/>
                 </a:solidFill>
@@ -4686,7 +4686,7 @@
           </a:p>
           <a:p>
             <a:r>
-              <a:rPr lang="en-US" sz="1900">
+              <a:rPr lang="en-US" sz="1900" dirty="0">
                 <a:solidFill>
                   <a:srgbClr val="FFFFFF"/>
                 </a:solidFill>
@@ -4698,7 +4698,7 @@
           </a:p>
           <a:p>
             <a:r>
-              <a:rPr lang="en-US" sz="1900">
+              <a:rPr lang="en-US" sz="1900" dirty="0">
                 <a:solidFill>
                   <a:srgbClr val="FFFFFF"/>
                 </a:solidFill>
@@ -4710,7 +4710,7 @@
           </a:p>
           <a:p>
             <a:r>
-              <a:rPr lang="en-US" sz="1900">
+              <a:rPr lang="en-US" sz="1900" dirty="0">
                 <a:solidFill>
                   <a:srgbClr val="FFFFFF"/>
                 </a:solidFill>
@@ -4719,7 +4719,7 @@
               </a:rPr>
               <a:t>Kailash Negi</a:t>
             </a:r>
-            <a:endParaRPr lang="en-IN" sz="1900">
+            <a:endParaRPr lang="en-IN" sz="1900" dirty="0">
               <a:solidFill>
                 <a:srgbClr val="FFFFFF"/>
               </a:solidFill>
@@ -5072,7 +5072,7 @@
           <a:lstStyle/>
           <a:p>
             <a:pPr algn="ctr"/>
-            <a:endParaRPr lang="en-US"/>
+            <a:endParaRPr lang="en-US" dirty="0"/>
           </a:p>
         </p:txBody>
       </p:sp>
@@ -10757,17 +10757,6 @@
             <a:lstStyle/>
             <a:p>
               <a:r>
-                <a:rPr lang="es-US" dirty="0" err="1">
-                  <a:solidFill>
-                    <a:schemeClr val="bg1">
-                      <a:lumMod val="50000"/>
-                    </a:schemeClr>
-                  </a:solidFill>
-                  <a:latin typeface="Open Sans" panose="020B0606030504020204" pitchFamily="34" charset="0"/>
-                </a:rPr>
-                <a:t>Browsing</a:t>
-              </a:r>
-              <a:r>
                 <a:rPr lang="es-US" dirty="0">
                   <a:solidFill>
                     <a:schemeClr val="bg1">
@@ -10776,10 +10765,10 @@
                   </a:solidFill>
                   <a:latin typeface="Open Sans" panose="020B0606030504020204" pitchFamily="34" charset="0"/>
                 </a:rPr>
-                <a:t> </a:t>
+                <a:t>Browsing </a:t>
               </a:r>
               <a:r>
-                <a:rPr lang="es-US" dirty="0" err="1">
+                <a:rPr lang="en-US" dirty="0">
                   <a:solidFill>
                     <a:schemeClr val="bg1">
                       <a:lumMod val="50000"/>
@@ -10798,73 +10787,7 @@
                   </a:solidFill>
                   <a:latin typeface="Open Sans" panose="020B0606030504020204" pitchFamily="34" charset="0"/>
                 </a:rPr>
-                <a:t> </a:t>
-              </a:r>
-              <a:r>
-                <a:rPr lang="es-US" dirty="0" err="1">
-                  <a:solidFill>
-                    <a:schemeClr val="bg1">
-                      <a:lumMod val="50000"/>
-                    </a:schemeClr>
-                  </a:solidFill>
-                  <a:latin typeface="Open Sans" panose="020B0606030504020204" pitchFamily="34" charset="0"/>
-                </a:rPr>
-                <a:t>product</a:t>
-              </a:r>
-              <a:r>
-                <a:rPr lang="es-US" dirty="0">
-                  <a:solidFill>
-                    <a:schemeClr val="bg1">
-                      <a:lumMod val="50000"/>
-                    </a:schemeClr>
-                  </a:solidFill>
-                  <a:latin typeface="Open Sans" panose="020B0606030504020204" pitchFamily="34" charset="0"/>
-                </a:rPr>
-                <a:t> </a:t>
-              </a:r>
-              <a:r>
-                <a:rPr lang="es-US" dirty="0" err="1">
-                  <a:solidFill>
-                    <a:schemeClr val="bg1">
-                      <a:lumMod val="50000"/>
-                    </a:schemeClr>
-                  </a:solidFill>
-                  <a:latin typeface="Open Sans" panose="020B0606030504020204" pitchFamily="34" charset="0"/>
-                </a:rPr>
-                <a:t>pages</a:t>
-              </a:r>
-              <a:r>
-                <a:rPr lang="es-US" dirty="0">
-                  <a:solidFill>
-                    <a:schemeClr val="bg1">
-                      <a:lumMod val="50000"/>
-                    </a:schemeClr>
-                  </a:solidFill>
-                  <a:latin typeface="Open Sans" panose="020B0606030504020204" pitchFamily="34" charset="0"/>
-                </a:rPr>
-                <a:t>, </a:t>
-              </a:r>
-              <a:r>
-                <a:rPr lang="es-US" dirty="0" err="1">
-                  <a:solidFill>
-                    <a:schemeClr val="bg1">
-                      <a:lumMod val="50000"/>
-                    </a:schemeClr>
-                  </a:solidFill>
-                  <a:latin typeface="Open Sans" panose="020B0606030504020204" pitchFamily="34" charset="0"/>
-                </a:rPr>
-                <a:t>clicks</a:t>
-              </a:r>
-              <a:r>
-                <a:rPr lang="es-US" dirty="0">
-                  <a:solidFill>
-                    <a:schemeClr val="bg1">
-                      <a:lumMod val="50000"/>
-                    </a:schemeClr>
-                  </a:solidFill>
-                  <a:latin typeface="Open Sans" panose="020B0606030504020204" pitchFamily="34" charset="0"/>
-                </a:rPr>
-                <a:t>, etc.</a:t>
+                <a:t> product pages, clicks, etc.</a:t>
               </a:r>
               <a:endParaRPr lang="en-US" dirty="0">
                 <a:solidFill>
@@ -10979,17 +10902,6 @@
             <a:lstStyle/>
             <a:p>
               <a:r>
-                <a:rPr lang="es-US" dirty="0" err="1">
-                  <a:solidFill>
-                    <a:schemeClr val="bg1">
-                      <a:lumMod val="50000"/>
-                    </a:schemeClr>
-                  </a:solidFill>
-                  <a:latin typeface="Open Sans" panose="020B0606030504020204" pitchFamily="34" charset="0"/>
-                </a:rPr>
-                <a:t>Product</a:t>
-              </a:r>
-              <a:r>
                 <a:rPr lang="es-US" dirty="0">
                   <a:solidFill>
                     <a:schemeClr val="bg1">
@@ -10998,40 +10910,7 @@
                   </a:solidFill>
                   <a:latin typeface="Open Sans" panose="020B0606030504020204" pitchFamily="34" charset="0"/>
                 </a:rPr>
-                <a:t> </a:t>
-              </a:r>
-              <a:r>
-                <a:rPr lang="es-US" dirty="0" err="1">
-                  <a:solidFill>
-                    <a:schemeClr val="bg1">
-                      <a:lumMod val="50000"/>
-                    </a:schemeClr>
-                  </a:solidFill>
-                  <a:latin typeface="Open Sans" panose="020B0606030504020204" pitchFamily="34" charset="0"/>
-                </a:rPr>
-                <a:t>purchase</a:t>
-              </a:r>
-              <a:r>
-                <a:rPr lang="es-US" dirty="0">
-                  <a:solidFill>
-                    <a:schemeClr val="bg1">
-                      <a:lumMod val="50000"/>
-                    </a:schemeClr>
-                  </a:solidFill>
-                  <a:latin typeface="Open Sans" panose="020B0606030504020204" pitchFamily="34" charset="0"/>
-                </a:rPr>
-                <a:t> and </a:t>
-              </a:r>
-              <a:r>
-                <a:rPr lang="es-US" dirty="0" err="1">
-                  <a:solidFill>
-                    <a:schemeClr val="bg1">
-                      <a:lumMod val="50000"/>
-                    </a:schemeClr>
-                  </a:solidFill>
-                  <a:latin typeface="Open Sans" panose="020B0606030504020204" pitchFamily="34" charset="0"/>
-                </a:rPr>
-                <a:t>payment</a:t>
+                <a:t>Product purchase and payment</a:t>
               </a:r>
               <a:endParaRPr lang="en-US" dirty="0">
                 <a:solidFill>
@@ -11103,9 +10982,9 @@
         <p:grpSpPr>
           <a:xfrm>
             <a:off x="609602" y="4721777"/>
-            <a:ext cx="3198832" cy="1587670"/>
+            <a:ext cx="3198832" cy="1310671"/>
             <a:chOff x="8995807" y="857110"/>
-            <a:chExt cx="2776595" cy="1587670"/>
+            <a:chExt cx="2776595" cy="1310671"/>
           </a:xfrm>
         </p:grpSpPr>
         <p:sp>
@@ -11123,7 +11002,7 @@
           <p:spPr>
             <a:xfrm>
               <a:off x="8995808" y="1244451"/>
-              <a:ext cx="2776594" cy="1200329"/>
+              <a:ext cx="2776594" cy="923330"/>
             </a:xfrm>
             <a:prstGeom prst="rect">
               <a:avLst/>
@@ -11138,17 +11017,6 @@
             <a:p>
               <a:pPr algn="r"/>
               <a:r>
-                <a:rPr lang="es-US" dirty="0" err="1">
-                  <a:solidFill>
-                    <a:schemeClr val="bg1">
-                      <a:lumMod val="50000"/>
-                    </a:schemeClr>
-                  </a:solidFill>
-                  <a:latin typeface="Open Sans" panose="020B0606030504020204" pitchFamily="34" charset="0"/>
-                </a:rPr>
-                <a:t>Reviews</a:t>
-              </a:r>
-              <a:r>
                 <a:rPr lang="es-US" dirty="0">
                   <a:solidFill>
                     <a:schemeClr val="bg1">
@@ -11157,117 +11025,7 @@
                   </a:solidFill>
                   <a:latin typeface="Open Sans" panose="020B0606030504020204" pitchFamily="34" charset="0"/>
                 </a:rPr>
-                <a:t>, </a:t>
-              </a:r>
-              <a:r>
-                <a:rPr lang="es-US" dirty="0" err="1">
-                  <a:solidFill>
-                    <a:schemeClr val="bg1">
-                      <a:lumMod val="50000"/>
-                    </a:schemeClr>
-                  </a:solidFill>
-                  <a:latin typeface="Open Sans" panose="020B0606030504020204" pitchFamily="34" charset="0"/>
-                </a:rPr>
-                <a:t>making</a:t>
-              </a:r>
-              <a:r>
-                <a:rPr lang="es-US" dirty="0">
-                  <a:solidFill>
-                    <a:schemeClr val="bg1">
-                      <a:lumMod val="50000"/>
-                    </a:schemeClr>
-                  </a:solidFill>
-                  <a:latin typeface="Open Sans" panose="020B0606030504020204" pitchFamily="34" charset="0"/>
-                </a:rPr>
-                <a:t> </a:t>
-              </a:r>
-              <a:r>
-                <a:rPr lang="es-US" dirty="0" err="1">
-                  <a:solidFill>
-                    <a:schemeClr val="bg1">
-                      <a:lumMod val="50000"/>
-                    </a:schemeClr>
-                  </a:solidFill>
-                  <a:latin typeface="Open Sans" panose="020B0606030504020204" pitchFamily="34" charset="0"/>
-                </a:rPr>
-                <a:t>another</a:t>
-              </a:r>
-              <a:r>
-                <a:rPr lang="es-US" dirty="0">
-                  <a:solidFill>
-                    <a:schemeClr val="bg1">
-                      <a:lumMod val="50000"/>
-                    </a:schemeClr>
-                  </a:solidFill>
-                  <a:latin typeface="Open Sans" panose="020B0606030504020204" pitchFamily="34" charset="0"/>
-                </a:rPr>
-                <a:t> </a:t>
-              </a:r>
-              <a:r>
-                <a:rPr lang="es-US" dirty="0" err="1">
-                  <a:solidFill>
-                    <a:schemeClr val="bg1">
-                      <a:lumMod val="50000"/>
-                    </a:schemeClr>
-                  </a:solidFill>
-                  <a:latin typeface="Open Sans" panose="020B0606030504020204" pitchFamily="34" charset="0"/>
-                </a:rPr>
-                <a:t>purchase</a:t>
-              </a:r>
-              <a:r>
-                <a:rPr lang="es-US" dirty="0">
-                  <a:solidFill>
-                    <a:schemeClr val="bg1">
-                      <a:lumMod val="50000"/>
-                    </a:schemeClr>
-                  </a:solidFill>
-                  <a:latin typeface="Open Sans" panose="020B0606030504020204" pitchFamily="34" charset="0"/>
-                </a:rPr>
-                <a:t>, </a:t>
-              </a:r>
-              <a:r>
-                <a:rPr lang="es-US" dirty="0" err="1">
-                  <a:solidFill>
-                    <a:schemeClr val="bg1">
-                      <a:lumMod val="50000"/>
-                    </a:schemeClr>
-                  </a:solidFill>
-                  <a:latin typeface="Open Sans" panose="020B0606030504020204" pitchFamily="34" charset="0"/>
-                </a:rPr>
-                <a:t>bringing</a:t>
-              </a:r>
-              <a:r>
-                <a:rPr lang="es-US" dirty="0">
-                  <a:solidFill>
-                    <a:schemeClr val="bg1">
-                      <a:lumMod val="50000"/>
-                    </a:schemeClr>
-                  </a:solidFill>
-                  <a:latin typeface="Open Sans" panose="020B0606030504020204" pitchFamily="34" charset="0"/>
-                </a:rPr>
-                <a:t> more </a:t>
-              </a:r>
-              <a:r>
-                <a:rPr lang="es-US" dirty="0" err="1">
-                  <a:solidFill>
-                    <a:schemeClr val="bg1">
-                      <a:lumMod val="50000"/>
-                    </a:schemeClr>
-                  </a:solidFill>
-                  <a:latin typeface="Open Sans" panose="020B0606030504020204" pitchFamily="34" charset="0"/>
-                </a:rPr>
-                <a:t>customers</a:t>
-              </a:r>
-              <a:r>
-                <a:rPr lang="es-US" dirty="0">
-                  <a:solidFill>
-                    <a:schemeClr val="bg1">
-                      <a:lumMod val="50000"/>
-                    </a:schemeClr>
-                  </a:solidFill>
-                  <a:latin typeface="Open Sans" panose="020B0606030504020204" pitchFamily="34" charset="0"/>
-                </a:rPr>
-                <a:t>.</a:t>
+                <a:t>Reviews, making another purchase, bringing more customers</a:t>
               </a:r>
               <a:endParaRPr lang="en-US" dirty="0">
                 <a:solidFill>
@@ -11411,18 +11169,7 @@
                   </a:solidFill>
                   <a:latin typeface="Open Sans" panose="020B0606030504020204" pitchFamily="34" charset="0"/>
                 </a:rPr>
-                <a:t>View Online ad, social media, </a:t>
-              </a:r>
-              <a:r>
-                <a:rPr lang="es-US" dirty="0" err="1">
-                  <a:solidFill>
-                    <a:schemeClr val="bg1">
-                      <a:lumMod val="50000"/>
-                    </a:schemeClr>
-                  </a:solidFill>
-                  <a:latin typeface="Open Sans" panose="020B0606030504020204" pitchFamily="34" charset="0"/>
-                </a:rPr>
-                <a:t>campaigns</a:t>
+                <a:t>View Online ad, social media campaigns</a:t>
               </a:r>
               <a:endParaRPr lang="en-US" dirty="0">
                 <a:solidFill>
@@ -13218,7 +12965,7 @@
           <a:p>
             <a:pPr algn="ctr"/>
             <a:r>
-              <a:rPr lang="en-US" sz="1100" b="1">
+              <a:rPr lang="en-US" sz="1100" b="1" dirty="0">
                 <a:solidFill>
                   <a:srgbClr val="4F3267"/>
                 </a:solidFill>
@@ -13227,7 +12974,7 @@
               </a:rPr>
               <a:t>Add to Cart</a:t>
             </a:r>
-            <a:endParaRPr lang="en-IN" sz="1100" b="1">
+            <a:endParaRPr lang="en-IN" sz="1100" b="1" dirty="0">
               <a:solidFill>
                 <a:srgbClr val="4F3267"/>
               </a:solidFill>
@@ -13334,7 +13081,7 @@
           <a:p>
             <a:pPr algn="ctr"/>
             <a:r>
-              <a:rPr lang="en-US" sz="1100" b="1">
+              <a:rPr lang="en-US" sz="1100" b="1" dirty="0">
                 <a:solidFill>
                   <a:srgbClr val="4F3267"/>
                 </a:solidFill>
@@ -13343,7 +13090,7 @@
               </a:rPr>
               <a:t>We look at Quantity and Volume of Transaction</a:t>
             </a:r>
-            <a:endParaRPr lang="en-IN" sz="1100" b="1">
+            <a:endParaRPr lang="en-IN" sz="1100" b="1" dirty="0">
               <a:solidFill>
                 <a:srgbClr val="4F3267"/>
               </a:solidFill>
@@ -13450,7 +13197,7 @@
           <a:p>
             <a:pPr algn="ctr"/>
             <a:r>
-              <a:rPr lang="en-US" sz="1100" b="1">
+              <a:rPr lang="en-US" sz="1100" b="1" dirty="0">
                 <a:solidFill>
                   <a:srgbClr val="4F3267"/>
                 </a:solidFill>
@@ -13459,7 +13206,7 @@
               </a:rPr>
               <a:t>Checkout</a:t>
             </a:r>
-            <a:endParaRPr lang="en-IN" sz="1100" b="1">
+            <a:endParaRPr lang="en-IN" sz="1100" b="1" dirty="0">
               <a:solidFill>
                 <a:srgbClr val="4F3267"/>
               </a:solidFill>
@@ -13565,7 +13312,7 @@
           <a:p>
             <a:pPr algn="ctr"/>
             <a:r>
-              <a:rPr lang="en-US" sz="1100" b="1">
+              <a:rPr lang="en-US" sz="1100" b="1" dirty="0">
                 <a:solidFill>
                   <a:srgbClr val="4F3267"/>
                 </a:solidFill>
@@ -13574,7 +13321,7 @@
               </a:rPr>
               <a:t>The AI system or model will check for possibility of suspicious activity basis these actions</a:t>
             </a:r>
-            <a:endParaRPr lang="en-IN" sz="1100" b="1">
+            <a:endParaRPr lang="en-IN" sz="1100" b="1" dirty="0">
               <a:solidFill>
                 <a:srgbClr val="4F3267"/>
               </a:solidFill>
@@ -13679,7 +13426,7 @@
           <a:p>
             <a:pPr algn="ctr"/>
             <a:r>
-              <a:rPr lang="en-US" sz="1100" b="1">
+              <a:rPr lang="en-US" sz="1100" b="1" dirty="0">
                 <a:solidFill>
                   <a:srgbClr val="4F3267"/>
                 </a:solidFill>
@@ -13688,7 +13435,7 @@
               </a:rPr>
               <a:t>Looks Suspicious?</a:t>
             </a:r>
-            <a:endParaRPr lang="en-IN" sz="1100" b="1">
+            <a:endParaRPr lang="en-IN" sz="1100" b="1" dirty="0">
               <a:solidFill>
                 <a:srgbClr val="4F3267"/>
               </a:solidFill>
@@ -13839,7 +13586,7 @@
           <a:p>
             <a:pPr algn="ctr"/>
             <a:r>
-              <a:rPr lang="en-US" sz="1100" b="1">
+              <a:rPr lang="en-US" sz="1100" b="1" dirty="0">
                 <a:solidFill>
                   <a:srgbClr val="4F3267"/>
                 </a:solidFill>
@@ -13848,7 +13595,7 @@
               </a:rPr>
               <a:t>Let the transaction go through</a:t>
             </a:r>
-            <a:endParaRPr lang="en-IN" sz="1100" b="1">
+            <a:endParaRPr lang="en-IN" sz="1100" b="1" dirty="0">
               <a:solidFill>
                 <a:srgbClr val="4F3267"/>
               </a:solidFill>
@@ -13909,7 +13656,7 @@
           <a:p>
             <a:pPr algn="ctr"/>
             <a:r>
-              <a:rPr lang="en-US" sz="1100" b="1">
+              <a:rPr lang="en-US" sz="1100" b="1" dirty="0">
                 <a:solidFill>
                   <a:srgbClr val="4F3267"/>
                 </a:solidFill>
@@ -13918,7 +13665,7 @@
               </a:rPr>
               <a:t>Raise appropriate triggers and decline the transaction</a:t>
             </a:r>
-            <a:endParaRPr lang="en-IN" sz="1100" b="1">
+            <a:endParaRPr lang="en-IN" sz="1100" b="1" dirty="0">
               <a:solidFill>
                 <a:srgbClr val="4F3267"/>
               </a:solidFill>
@@ -13960,7 +13707,7 @@
           <a:lstStyle/>
           <a:p>
             <a:r>
-              <a:rPr lang="en-US" sz="1100" b="1">
+              <a:rPr lang="en-US" sz="1100" b="1" dirty="0">
                 <a:solidFill>
                   <a:srgbClr val="4F3267"/>
                 </a:solidFill>
@@ -13969,7 +13716,7 @@
               </a:rPr>
               <a:t>Yes</a:t>
             </a:r>
-            <a:endParaRPr lang="en-IN" sz="1100" b="1">
+            <a:endParaRPr lang="en-IN" sz="1100" b="1" dirty="0">
               <a:solidFill>
                 <a:srgbClr val="4F3267"/>
               </a:solidFill>
@@ -14011,7 +13758,7 @@
           <a:lstStyle/>
           <a:p>
             <a:r>
-              <a:rPr lang="en-US" sz="1100" b="1">
+              <a:rPr lang="en-US" sz="1100" b="1" dirty="0">
                 <a:solidFill>
                   <a:srgbClr val="4F3267"/>
                 </a:solidFill>
@@ -14020,7 +13767,7 @@
               </a:rPr>
               <a:t>No</a:t>
             </a:r>
-            <a:endParaRPr lang="en-IN" sz="1100" b="1">
+            <a:endParaRPr lang="en-IN" sz="1100" b="1" dirty="0">
               <a:solidFill>
                 <a:srgbClr val="4F3267"/>
               </a:solidFill>
@@ -14216,7 +13963,7 @@
           <a:p>
             <a:pPr algn="ctr"/>
             <a:r>
-              <a:rPr lang="en-US" sz="1100" b="1">
+              <a:rPr lang="en-US" sz="1100" b="1" dirty="0">
                 <a:solidFill>
                   <a:srgbClr val="4F3267"/>
                 </a:solidFill>
@@ -14225,7 +13972,7 @@
               </a:rPr>
               <a:t>Location Specific</a:t>
             </a:r>
-            <a:endParaRPr lang="en-IN" sz="1100" b="1">
+            <a:endParaRPr lang="en-IN" sz="1100" b="1" dirty="0">
               <a:solidFill>
                 <a:srgbClr val="4F3267"/>
               </a:solidFill>
@@ -14286,7 +14033,7 @@
           <a:p>
             <a:pPr algn="ctr"/>
             <a:r>
-              <a:rPr lang="en-US" sz="1100" b="1">
+              <a:rPr lang="en-US" sz="1100" b="1" dirty="0">
                 <a:solidFill>
                   <a:srgbClr val="4F3267"/>
                 </a:solidFill>
@@ -14295,7 +14042,7 @@
               </a:rPr>
               <a:t>Volume/Quantity specific</a:t>
             </a:r>
-            <a:endParaRPr lang="en-IN" sz="1100" b="1">
+            <a:endParaRPr lang="en-IN" sz="1100" b="1" dirty="0">
               <a:solidFill>
                 <a:srgbClr val="4F3267"/>
               </a:solidFill>
@@ -14356,7 +14103,7 @@
           <a:p>
             <a:pPr algn="ctr"/>
             <a:r>
-              <a:rPr lang="en-US" sz="1100" b="1">
+              <a:rPr lang="en-US" sz="1100" b="1" dirty="0">
                 <a:solidFill>
                   <a:srgbClr val="4F3267"/>
                 </a:solidFill>
@@ -14365,7 +14112,7 @@
               </a:rPr>
               <a:t>Number of transactions specific</a:t>
             </a:r>
-            <a:endParaRPr lang="en-IN" sz="1100" b="1">
+            <a:endParaRPr lang="en-IN" sz="1100" b="1" dirty="0">
               <a:solidFill>
                 <a:srgbClr val="4F3267"/>
               </a:solidFill>
@@ -14426,7 +14173,7 @@
           <a:p>
             <a:pPr algn="ctr"/>
             <a:r>
-              <a:rPr lang="en-US" sz="1100" b="1">
+              <a:rPr lang="en-US" sz="1100" b="1" dirty="0">
                 <a:solidFill>
                   <a:srgbClr val="4F3267"/>
                 </a:solidFill>
@@ -14435,7 +14182,7 @@
               </a:rPr>
               <a:t>We track activity of  customers using device id and IP Address on the app/website</a:t>
             </a:r>
-            <a:endParaRPr lang="en-IN" sz="1100" b="1">
+            <a:endParaRPr lang="en-IN" sz="1100" b="1" dirty="0">
               <a:solidFill>
                 <a:srgbClr val="4F3267"/>
               </a:solidFill>
@@ -14540,7 +14287,7 @@
           <a:p>
             <a:pPr algn="ctr"/>
             <a:r>
-              <a:rPr lang="en-US" sz="1100" b="1">
+              <a:rPr lang="en-US" sz="1100" b="1" dirty="0">
                 <a:solidFill>
                   <a:srgbClr val="4F3267"/>
                 </a:solidFill>
@@ -14549,7 +14296,7 @@
               </a:rPr>
               <a:t>Check the Location from where customer is making transaction and if its from unknown location for registered customer and unexpected location for an unregistered customer</a:t>
             </a:r>
-            <a:endParaRPr lang="en-IN" sz="1100" b="1">
+            <a:endParaRPr lang="en-IN" sz="1100" b="1" dirty="0">
               <a:solidFill>
                 <a:srgbClr val="4F3267"/>
               </a:solidFill>
@@ -14610,7 +14357,7 @@
           <a:p>
             <a:pPr algn="ctr"/>
             <a:r>
-              <a:rPr lang="en-US" sz="1100" b="1">
+              <a:rPr lang="en-US" sz="1100" b="1" dirty="0">
                 <a:solidFill>
                   <a:srgbClr val="4F3267"/>
                 </a:solidFill>
@@ -14619,7 +14366,7 @@
               </a:rPr>
               <a:t>Based on past transactions from same device or IP Address check if customer is making multiple transactions in small denominations</a:t>
             </a:r>
-            <a:endParaRPr lang="en-IN" sz="1100" b="1">
+            <a:endParaRPr lang="en-IN" sz="1100" b="1" dirty="0">
               <a:solidFill>
                 <a:srgbClr val="4F3267"/>
               </a:solidFill>
@@ -14680,7 +14427,7 @@
           <a:p>
             <a:pPr algn="ctr"/>
             <a:r>
-              <a:rPr lang="en-US" sz="1100" b="1">
+              <a:rPr lang="en-US" sz="1100" b="1" dirty="0">
                 <a:solidFill>
                   <a:srgbClr val="4F3267"/>
                 </a:solidFill>
@@ -14689,7 +14436,7 @@
               </a:rPr>
               <a:t>Check if the amount of time spent from same device or IP Address on the Caratlane app/website is surprisingly long or short before making a purchase</a:t>
             </a:r>
-            <a:endParaRPr lang="en-IN" sz="1100" b="1">
+            <a:endParaRPr lang="en-IN" sz="1100" b="1" dirty="0">
               <a:solidFill>
                 <a:srgbClr val="4F3267"/>
               </a:solidFill>
@@ -14750,7 +14497,7 @@
           <a:p>
             <a:pPr algn="ctr"/>
             <a:r>
-              <a:rPr lang="en-US" sz="1100" b="1">
+              <a:rPr lang="en-US" sz="1100" b="1" dirty="0">
                 <a:solidFill>
                   <a:srgbClr val="4F3267"/>
                 </a:solidFill>
@@ -14759,7 +14506,7 @@
               </a:rPr>
               <a:t>Check if the order quantity/volume is more than a threshold (which Caratlane can set)</a:t>
             </a:r>
-            <a:endParaRPr lang="en-IN" sz="1100" b="1">
+            <a:endParaRPr lang="en-IN" sz="1100" b="1" dirty="0">
               <a:solidFill>
                 <a:srgbClr val="4F3267"/>
               </a:solidFill>
@@ -14999,7 +14746,7 @@
           <a:p>
             <a:pPr algn="ctr"/>
             <a:r>
-              <a:rPr lang="en-US" sz="1100" b="1">
+              <a:rPr lang="en-US" sz="1100" b="1" dirty="0">
                 <a:solidFill>
                   <a:srgbClr val="4F3267"/>
                 </a:solidFill>
@@ -15008,7 +14755,7 @@
               </a:rPr>
               <a:t>Surprisingly long or short browsing on Caratlane app/website</a:t>
             </a:r>
-            <a:endParaRPr lang="en-IN" sz="1100" b="1">
+            <a:endParaRPr lang="en-IN" sz="1100" b="1" dirty="0">
               <a:solidFill>
                 <a:srgbClr val="4F3267"/>
               </a:solidFill>
@@ -15229,7 +14976,7 @@
           <a:lstStyle/>
           <a:p>
             <a:pPr algn="ctr"/>
-            <a:endParaRPr lang="en-IN"/>
+            <a:endParaRPr lang="en-IN" dirty="0"/>
           </a:p>
         </p:txBody>
       </p:sp>
@@ -15283,7 +15030,7 @@
           <a:lstStyle/>
           <a:p>
             <a:pPr algn="ctr"/>
-            <a:endParaRPr lang="en-IN"/>
+            <a:endParaRPr lang="en-IN" dirty="0"/>
           </a:p>
         </p:txBody>
       </p:sp>
@@ -15337,7 +15084,7 @@
           <a:lstStyle/>
           <a:p>
             <a:pPr algn="ctr"/>
-            <a:endParaRPr lang="en-IN"/>
+            <a:endParaRPr lang="en-IN" dirty="0"/>
           </a:p>
         </p:txBody>
       </p:sp>
@@ -15391,7 +15138,7 @@
           <a:lstStyle/>
           <a:p>
             <a:pPr algn="ctr"/>
-            <a:endParaRPr lang="en-IN"/>
+            <a:endParaRPr lang="en-IN" dirty="0"/>
           </a:p>
         </p:txBody>
       </p:sp>
@@ -15447,7 +15194,7 @@
           <a:lstStyle/>
           <a:p>
             <a:pPr algn="ctr"/>
-            <a:endParaRPr lang="en-IN"/>
+            <a:endParaRPr lang="en-IN" dirty="0"/>
           </a:p>
         </p:txBody>
       </p:sp>
@@ -15501,7 +15248,7 @@
           <a:lstStyle/>
           <a:p>
             <a:pPr algn="ctr"/>
-            <a:endParaRPr lang="en-IN"/>
+            <a:endParaRPr lang="en-IN" dirty="0"/>
           </a:p>
         </p:txBody>
       </p:sp>
@@ -15598,7 +15345,7 @@
           <a:lstStyle/>
           <a:p>
             <a:pPr algn="ctr"/>
-            <a:endParaRPr lang="en-IN"/>
+            <a:endParaRPr lang="en-IN" dirty="0"/>
           </a:p>
         </p:txBody>
       </p:sp>
@@ -15650,7 +15397,7 @@
           <a:lstStyle/>
           <a:p>
             <a:pPr algn="ctr"/>
-            <a:endParaRPr lang="en-IN"/>
+            <a:endParaRPr lang="en-IN" dirty="0"/>
           </a:p>
         </p:txBody>
       </p:sp>
@@ -15702,7 +15449,7 @@
           <a:lstStyle/>
           <a:p>
             <a:pPr algn="ctr"/>
-            <a:endParaRPr lang="en-IN"/>
+            <a:endParaRPr lang="en-IN" dirty="0"/>
           </a:p>
         </p:txBody>
       </p:sp>
@@ -15754,7 +15501,7 @@
           <a:lstStyle/>
           <a:p>
             <a:pPr algn="ctr"/>
-            <a:endParaRPr lang="en-IN"/>
+            <a:endParaRPr lang="en-IN" dirty="0"/>
           </a:p>
         </p:txBody>
       </p:sp>
@@ -15806,7 +15553,7 @@
           <a:lstStyle/>
           <a:p>
             <a:pPr algn="ctr"/>
-            <a:endParaRPr lang="en-IN"/>
+            <a:endParaRPr lang="en-IN" dirty="0"/>
           </a:p>
         </p:txBody>
       </p:sp>
@@ -15858,7 +15605,7 @@
           <a:lstStyle/>
           <a:p>
             <a:pPr algn="ctr"/>
-            <a:endParaRPr lang="en-IN"/>
+            <a:endParaRPr lang="en-IN" dirty="0"/>
           </a:p>
         </p:txBody>
       </p:sp>
@@ -16204,7 +15951,7 @@
           <a:lstStyle/>
           <a:p>
             <a:pPr algn="ctr"/>
-            <a:endParaRPr lang="en-IN"/>
+            <a:endParaRPr lang="en-IN" dirty="0"/>
           </a:p>
         </p:txBody>
       </p:sp>
@@ -16256,7 +16003,7 @@
           <a:lstStyle/>
           <a:p>
             <a:pPr algn="ctr"/>
-            <a:endParaRPr lang="en-IN"/>
+            <a:endParaRPr lang="en-IN" dirty="0"/>
           </a:p>
         </p:txBody>
       </p:sp>
@@ -16308,7 +16055,7 @@
           <a:lstStyle/>
           <a:p>
             <a:pPr algn="ctr"/>
-            <a:endParaRPr lang="en-IN"/>
+            <a:endParaRPr lang="en-IN" dirty="0"/>
           </a:p>
         </p:txBody>
       </p:sp>
@@ -16360,7 +16107,7 @@
           <a:lstStyle/>
           <a:p>
             <a:pPr algn="ctr"/>
-            <a:endParaRPr lang="en-IN"/>
+            <a:endParaRPr lang="en-IN" dirty="0"/>
           </a:p>
         </p:txBody>
       </p:sp>
@@ -16414,7 +16161,7 @@
           <a:lstStyle/>
           <a:p>
             <a:pPr algn="ctr"/>
-            <a:endParaRPr lang="en-IN"/>
+            <a:endParaRPr lang="en-IN" dirty="0"/>
           </a:p>
         </p:txBody>
       </p:sp>
@@ -16466,7 +16213,7 @@
           <a:lstStyle/>
           <a:p>
             <a:pPr algn="ctr"/>
-            <a:endParaRPr lang="en-IN">
+            <a:endParaRPr lang="en-IN" dirty="0">
               <a:solidFill>
                 <a:schemeClr val="accent3"/>
               </a:solidFill>
@@ -16504,17 +16251,6 @@
           <a:p>
             <a:pPr algn="ctr"/>
             <a:r>
-              <a:rPr lang="es-US" sz="1400" dirty="0" err="1">
-                <a:solidFill>
-                  <a:schemeClr val="bg1"/>
-                </a:solidFill>
-                <a:latin typeface="Open Sans" panose="020B0606030504020204" pitchFamily="34" charset="0"/>
-                <a:ea typeface="Open Sans" panose="020B0606030504020204" pitchFamily="34" charset="0"/>
-                <a:cs typeface="Open Sans" panose="020B0606030504020204" pitchFamily="34" charset="0"/>
-              </a:rPr>
-              <a:t>Customer</a:t>
-            </a:r>
-            <a:r>
               <a:rPr lang="es-US" sz="1400" dirty="0">
                 <a:solidFill>
                   <a:schemeClr val="bg1"/>
@@ -16523,73 +16259,7 @@
                 <a:ea typeface="Open Sans" panose="020B0606030504020204" pitchFamily="34" charset="0"/>
                 <a:cs typeface="Open Sans" panose="020B0606030504020204" pitchFamily="34" charset="0"/>
               </a:rPr>
-              <a:t> </a:t>
-            </a:r>
-            <a:r>
-              <a:rPr lang="es-US" sz="1400" dirty="0" err="1">
-                <a:solidFill>
-                  <a:schemeClr val="bg1"/>
-                </a:solidFill>
-                <a:latin typeface="Open Sans" panose="020B0606030504020204" pitchFamily="34" charset="0"/>
-                <a:ea typeface="Open Sans" panose="020B0606030504020204" pitchFamily="34" charset="0"/>
-                <a:cs typeface="Open Sans" panose="020B0606030504020204" pitchFamily="34" charset="0"/>
-              </a:rPr>
-              <a:t>Journey</a:t>
-            </a:r>
-            <a:r>
-              <a:rPr lang="es-US" sz="1400" dirty="0">
-                <a:solidFill>
-                  <a:schemeClr val="bg1"/>
-                </a:solidFill>
-                <a:latin typeface="Open Sans" panose="020B0606030504020204" pitchFamily="34" charset="0"/>
-                <a:ea typeface="Open Sans" panose="020B0606030504020204" pitchFamily="34" charset="0"/>
-                <a:cs typeface="Open Sans" panose="020B0606030504020204" pitchFamily="34" charset="0"/>
-              </a:rPr>
-              <a:t> </a:t>
-            </a:r>
-            <a:r>
-              <a:rPr lang="es-US" sz="1400" dirty="0" err="1">
-                <a:solidFill>
-                  <a:schemeClr val="bg1"/>
-                </a:solidFill>
-                <a:latin typeface="Open Sans" panose="020B0606030504020204" pitchFamily="34" charset="0"/>
-                <a:ea typeface="Open Sans" panose="020B0606030504020204" pitchFamily="34" charset="0"/>
-                <a:cs typeface="Open Sans" panose="020B0606030504020204" pitchFamily="34" charset="0"/>
-              </a:rPr>
-              <a:t>on</a:t>
-            </a:r>
-            <a:r>
-              <a:rPr lang="es-US" sz="1400" dirty="0">
-                <a:solidFill>
-                  <a:schemeClr val="bg1"/>
-                </a:solidFill>
-                <a:latin typeface="Open Sans" panose="020B0606030504020204" pitchFamily="34" charset="0"/>
-                <a:ea typeface="Open Sans" panose="020B0606030504020204" pitchFamily="34" charset="0"/>
-                <a:cs typeface="Open Sans" panose="020B0606030504020204" pitchFamily="34" charset="0"/>
-              </a:rPr>
-              <a:t> </a:t>
-            </a:r>
-            <a:r>
-              <a:rPr lang="es-US" sz="1400" dirty="0" err="1">
-                <a:solidFill>
-                  <a:schemeClr val="bg1"/>
-                </a:solidFill>
-                <a:latin typeface="Open Sans" panose="020B0606030504020204" pitchFamily="34" charset="0"/>
-                <a:ea typeface="Open Sans" panose="020B0606030504020204" pitchFamily="34" charset="0"/>
-                <a:cs typeface="Open Sans" panose="020B0606030504020204" pitchFamily="34" charset="0"/>
-              </a:rPr>
-              <a:t>Caratlane</a:t>
-            </a:r>
-            <a:r>
-              <a:rPr lang="es-US" sz="1400" dirty="0">
-                <a:solidFill>
-                  <a:schemeClr val="bg1"/>
-                </a:solidFill>
-                <a:latin typeface="Open Sans" panose="020B0606030504020204" pitchFamily="34" charset="0"/>
-                <a:ea typeface="Open Sans" panose="020B0606030504020204" pitchFamily="34" charset="0"/>
-                <a:cs typeface="Open Sans" panose="020B0606030504020204" pitchFamily="34" charset="0"/>
-              </a:rPr>
-              <a:t> Portal</a:t>
+              <a:t>Customer Journey on Caratlane Portal</a:t>
             </a:r>
             <a:endParaRPr lang="en-US" sz="1400" dirty="0">
               <a:solidFill>
@@ -16689,7 +16359,7 @@
           <a:p>
             <a:pPr algn="ctr"/>
             <a:r>
-              <a:rPr lang="es-US" sz="1400" dirty="0" err="1">
+              <a:rPr lang="es-US" sz="1400" dirty="0">
                 <a:solidFill>
                   <a:schemeClr val="bg1"/>
                 </a:solidFill>
@@ -16697,8 +16367,11 @@
                 <a:ea typeface="Open Sans" panose="020B0606030504020204" pitchFamily="34" charset="0"/>
                 <a:cs typeface="Open Sans" panose="020B0606030504020204" pitchFamily="34" charset="0"/>
               </a:rPr>
-              <a:t>Sample</a:t>
+              <a:t>Sample Online Data</a:t>
             </a:r>
+          </a:p>
+          <a:p>
+            <a:pPr algn="ctr"/>
             <a:r>
               <a:rPr lang="es-US" sz="1400" dirty="0">
                 <a:solidFill>
@@ -16708,96 +16381,8 @@
                 <a:ea typeface="Open Sans" panose="020B0606030504020204" pitchFamily="34" charset="0"/>
                 <a:cs typeface="Open Sans" panose="020B0606030504020204" pitchFamily="34" charset="0"/>
               </a:rPr>
-              <a:t> Online Data</a:t>
+              <a:t>collected from Public sources</a:t>
             </a:r>
-          </a:p>
-          <a:p>
-            <a:pPr algn="ctr"/>
-            <a:r>
-              <a:rPr lang="es-US" sz="1400" dirty="0" err="1">
-                <a:solidFill>
-                  <a:schemeClr val="bg1"/>
-                </a:solidFill>
-                <a:latin typeface="Open Sans" panose="020B0606030504020204" pitchFamily="34" charset="0"/>
-                <a:ea typeface="Open Sans" panose="020B0606030504020204" pitchFamily="34" charset="0"/>
-                <a:cs typeface="Open Sans" panose="020B0606030504020204" pitchFamily="34" charset="0"/>
-              </a:rPr>
-              <a:t>collected</a:t>
-            </a:r>
-            <a:r>
-              <a:rPr lang="es-US" sz="1400" dirty="0">
-                <a:solidFill>
-                  <a:schemeClr val="bg1"/>
-                </a:solidFill>
-                <a:latin typeface="Open Sans" panose="020B0606030504020204" pitchFamily="34" charset="0"/>
-                <a:ea typeface="Open Sans" panose="020B0606030504020204" pitchFamily="34" charset="0"/>
-                <a:cs typeface="Open Sans" panose="020B0606030504020204" pitchFamily="34" charset="0"/>
-              </a:rPr>
-              <a:t> </a:t>
-            </a:r>
-            <a:r>
-              <a:rPr lang="es-US" sz="1400" dirty="0" err="1">
-                <a:solidFill>
-                  <a:schemeClr val="bg1"/>
-                </a:solidFill>
-                <a:latin typeface="Open Sans" panose="020B0606030504020204" pitchFamily="34" charset="0"/>
-                <a:ea typeface="Open Sans" panose="020B0606030504020204" pitchFamily="34" charset="0"/>
-                <a:cs typeface="Open Sans" panose="020B0606030504020204" pitchFamily="34" charset="0"/>
-              </a:rPr>
-              <a:t>from</a:t>
-            </a:r>
-            <a:r>
-              <a:rPr lang="es-US" sz="1400" dirty="0">
-                <a:solidFill>
-                  <a:schemeClr val="bg1"/>
-                </a:solidFill>
-                <a:latin typeface="Open Sans" panose="020B0606030504020204" pitchFamily="34" charset="0"/>
-                <a:ea typeface="Open Sans" panose="020B0606030504020204" pitchFamily="34" charset="0"/>
-                <a:cs typeface="Open Sans" panose="020B0606030504020204" pitchFamily="34" charset="0"/>
-              </a:rPr>
-              <a:t> </a:t>
-            </a:r>
-            <a:r>
-              <a:rPr lang="es-US" sz="1400" dirty="0" err="1">
-                <a:solidFill>
-                  <a:schemeClr val="bg1"/>
-                </a:solidFill>
-                <a:latin typeface="Open Sans" panose="020B0606030504020204" pitchFamily="34" charset="0"/>
-                <a:ea typeface="Open Sans" panose="020B0606030504020204" pitchFamily="34" charset="0"/>
-                <a:cs typeface="Open Sans" panose="020B0606030504020204" pitchFamily="34" charset="0"/>
-              </a:rPr>
-              <a:t>Public</a:t>
-            </a:r>
-            <a:r>
-              <a:rPr lang="es-US" sz="1400" dirty="0">
-                <a:solidFill>
-                  <a:schemeClr val="bg1"/>
-                </a:solidFill>
-                <a:latin typeface="Open Sans" panose="020B0606030504020204" pitchFamily="34" charset="0"/>
-                <a:ea typeface="Open Sans" panose="020B0606030504020204" pitchFamily="34" charset="0"/>
-                <a:cs typeface="Open Sans" panose="020B0606030504020204" pitchFamily="34" charset="0"/>
-              </a:rPr>
-              <a:t> </a:t>
-            </a:r>
-            <a:r>
-              <a:rPr lang="es-US" sz="1400" dirty="0" err="1">
-                <a:solidFill>
-                  <a:schemeClr val="bg1"/>
-                </a:solidFill>
-                <a:latin typeface="Open Sans" panose="020B0606030504020204" pitchFamily="34" charset="0"/>
-                <a:ea typeface="Open Sans" panose="020B0606030504020204" pitchFamily="34" charset="0"/>
-                <a:cs typeface="Open Sans" panose="020B0606030504020204" pitchFamily="34" charset="0"/>
-              </a:rPr>
-              <a:t>sources</a:t>
-            </a:r>
-            <a:endParaRPr lang="es-US" sz="1400" dirty="0">
-              <a:solidFill>
-                <a:schemeClr val="bg1"/>
-              </a:solidFill>
-              <a:latin typeface="Open Sans" panose="020B0606030504020204" pitchFamily="34" charset="0"/>
-              <a:ea typeface="Open Sans" panose="020B0606030504020204" pitchFamily="34" charset="0"/>
-              <a:cs typeface="Open Sans" panose="020B0606030504020204" pitchFamily="34" charset="0"/>
-            </a:endParaRPr>
           </a:p>
         </p:txBody>
       </p:sp>
@@ -16904,84 +16489,7 @@
                 <a:ea typeface="Open Sans" panose="020B0606030504020204" pitchFamily="34" charset="0"/>
                 <a:cs typeface="Open Sans" panose="020B0606030504020204" pitchFamily="34" charset="0"/>
               </a:rPr>
-              <a:t>Descriptive </a:t>
-            </a:r>
-            <a:r>
-              <a:rPr lang="es-US" sz="1400" dirty="0" err="1">
-                <a:solidFill>
-                  <a:schemeClr val="bg1"/>
-                </a:solidFill>
-                <a:latin typeface="Open Sans" panose="020B0606030504020204" pitchFamily="34" charset="0"/>
-                <a:ea typeface="Open Sans" panose="020B0606030504020204" pitchFamily="34" charset="0"/>
-                <a:cs typeface="Open Sans" panose="020B0606030504020204" pitchFamily="34" charset="0"/>
-              </a:rPr>
-              <a:t>Analytics</a:t>
-            </a:r>
-            <a:r>
-              <a:rPr lang="es-US" sz="1400" dirty="0">
-                <a:solidFill>
-                  <a:schemeClr val="bg1"/>
-                </a:solidFill>
-                <a:latin typeface="Open Sans" panose="020B0606030504020204" pitchFamily="34" charset="0"/>
-                <a:ea typeface="Open Sans" panose="020B0606030504020204" pitchFamily="34" charset="0"/>
-                <a:cs typeface="Open Sans" panose="020B0606030504020204" pitchFamily="34" charset="0"/>
-              </a:rPr>
-              <a:t>, </a:t>
-            </a:r>
-            <a:r>
-              <a:rPr lang="es-US" sz="1400" dirty="0" err="1">
-                <a:solidFill>
-                  <a:schemeClr val="bg1"/>
-                </a:solidFill>
-                <a:latin typeface="Open Sans" panose="020B0606030504020204" pitchFamily="34" charset="0"/>
-                <a:ea typeface="Open Sans" panose="020B0606030504020204" pitchFamily="34" charset="0"/>
-                <a:cs typeface="Open Sans" panose="020B0606030504020204" pitchFamily="34" charset="0"/>
-              </a:rPr>
-              <a:t>Clean</a:t>
-            </a:r>
-            <a:r>
-              <a:rPr lang="es-US" sz="1400" dirty="0">
-                <a:solidFill>
-                  <a:schemeClr val="bg1"/>
-                </a:solidFill>
-                <a:latin typeface="Open Sans" panose="020B0606030504020204" pitchFamily="34" charset="0"/>
-                <a:ea typeface="Open Sans" panose="020B0606030504020204" pitchFamily="34" charset="0"/>
-                <a:cs typeface="Open Sans" panose="020B0606030504020204" pitchFamily="34" charset="0"/>
-              </a:rPr>
-              <a:t> Data, </a:t>
-            </a:r>
-            <a:r>
-              <a:rPr lang="es-US" sz="1400" dirty="0" err="1">
-                <a:solidFill>
-                  <a:schemeClr val="bg1"/>
-                </a:solidFill>
-                <a:latin typeface="Open Sans" panose="020B0606030504020204" pitchFamily="34" charset="0"/>
-                <a:ea typeface="Open Sans" panose="020B0606030504020204" pitchFamily="34" charset="0"/>
-                <a:cs typeface="Open Sans" panose="020B0606030504020204" pitchFamily="34" charset="0"/>
-              </a:rPr>
-              <a:t>Format</a:t>
-            </a:r>
-            <a:r>
-              <a:rPr lang="es-US" sz="1400" dirty="0">
-                <a:solidFill>
-                  <a:schemeClr val="bg1"/>
-                </a:solidFill>
-                <a:latin typeface="Open Sans" panose="020B0606030504020204" pitchFamily="34" charset="0"/>
-                <a:ea typeface="Open Sans" panose="020B0606030504020204" pitchFamily="34" charset="0"/>
-                <a:cs typeface="Open Sans" panose="020B0606030504020204" pitchFamily="34" charset="0"/>
-              </a:rPr>
-              <a:t> Variables, </a:t>
-            </a:r>
-            <a:r>
-              <a:rPr lang="es-US" sz="1400" dirty="0" err="1">
-                <a:solidFill>
-                  <a:schemeClr val="bg1"/>
-                </a:solidFill>
-                <a:latin typeface="Open Sans" panose="020B0606030504020204" pitchFamily="34" charset="0"/>
-                <a:ea typeface="Open Sans" panose="020B0606030504020204" pitchFamily="34" charset="0"/>
-                <a:cs typeface="Open Sans" panose="020B0606030504020204" pitchFamily="34" charset="0"/>
-              </a:rPr>
-              <a:t>Correlation</a:t>
+              <a:t>Descriptive Analytics, Clean Data, Format Variables, Correlation</a:t>
             </a:r>
             <a:endParaRPr lang="en-US" sz="1400" dirty="0">
               <a:solidFill>
@@ -17103,17 +16611,6 @@
           <a:p>
             <a:pPr algn="ctr"/>
             <a:r>
-              <a:rPr lang="es-US" sz="1400" dirty="0" err="1">
-                <a:solidFill>
-                  <a:schemeClr val="bg1"/>
-                </a:solidFill>
-                <a:latin typeface="Open Sans" panose="020B0606030504020204" pitchFamily="34" charset="0"/>
-                <a:ea typeface="Open Sans" panose="020B0606030504020204" pitchFamily="34" charset="0"/>
-                <a:cs typeface="Open Sans" panose="020B0606030504020204" pitchFamily="34" charset="0"/>
-              </a:rPr>
-              <a:t>Design</a:t>
-            </a:r>
-            <a:r>
               <a:rPr lang="es-US" sz="1400" dirty="0">
                 <a:solidFill>
                   <a:schemeClr val="bg1"/>
@@ -17122,95 +16619,7 @@
                 <a:ea typeface="Open Sans" panose="020B0606030504020204" pitchFamily="34" charset="0"/>
                 <a:cs typeface="Open Sans" panose="020B0606030504020204" pitchFamily="34" charset="0"/>
               </a:rPr>
-              <a:t>. </a:t>
-            </a:r>
-            <a:r>
-              <a:rPr lang="es-US" sz="1400" dirty="0" err="1">
-                <a:solidFill>
-                  <a:schemeClr val="bg1"/>
-                </a:solidFill>
-                <a:latin typeface="Open Sans" panose="020B0606030504020204" pitchFamily="34" charset="0"/>
-                <a:ea typeface="Open Sans" panose="020B0606030504020204" pitchFamily="34" charset="0"/>
-                <a:cs typeface="Open Sans" panose="020B0606030504020204" pitchFamily="34" charset="0"/>
-              </a:rPr>
-              <a:t>Build</a:t>
-            </a:r>
-            <a:r>
-              <a:rPr lang="es-US" sz="1400" dirty="0">
-                <a:solidFill>
-                  <a:schemeClr val="bg1"/>
-                </a:solidFill>
-                <a:latin typeface="Open Sans" panose="020B0606030504020204" pitchFamily="34" charset="0"/>
-                <a:ea typeface="Open Sans" panose="020B0606030504020204" pitchFamily="34" charset="0"/>
-                <a:cs typeface="Open Sans" panose="020B0606030504020204" pitchFamily="34" charset="0"/>
-              </a:rPr>
-              <a:t> &amp; </a:t>
-            </a:r>
-            <a:r>
-              <a:rPr lang="es-US" sz="1400" dirty="0" err="1">
-                <a:solidFill>
-                  <a:schemeClr val="bg1"/>
-                </a:solidFill>
-                <a:latin typeface="Open Sans" panose="020B0606030504020204" pitchFamily="34" charset="0"/>
-                <a:ea typeface="Open Sans" panose="020B0606030504020204" pitchFamily="34" charset="0"/>
-                <a:cs typeface="Open Sans" panose="020B0606030504020204" pitchFamily="34" charset="0"/>
-              </a:rPr>
-              <a:t>assess</a:t>
-            </a:r>
-            <a:r>
-              <a:rPr lang="es-US" sz="1400" dirty="0">
-                <a:solidFill>
-                  <a:schemeClr val="bg1"/>
-                </a:solidFill>
-                <a:latin typeface="Open Sans" panose="020B0606030504020204" pitchFamily="34" charset="0"/>
-                <a:ea typeface="Open Sans" panose="020B0606030504020204" pitchFamily="34" charset="0"/>
-                <a:cs typeface="Open Sans" panose="020B0606030504020204" pitchFamily="34" charset="0"/>
-              </a:rPr>
-              <a:t> </a:t>
-            </a:r>
-            <a:r>
-              <a:rPr lang="es-US" sz="1400" dirty="0" err="1">
-                <a:solidFill>
-                  <a:schemeClr val="bg1"/>
-                </a:solidFill>
-                <a:latin typeface="Open Sans" panose="020B0606030504020204" pitchFamily="34" charset="0"/>
-                <a:ea typeface="Open Sans" panose="020B0606030504020204" pitchFamily="34" charset="0"/>
-                <a:cs typeface="Open Sans" panose="020B0606030504020204" pitchFamily="34" charset="0"/>
-              </a:rPr>
-              <a:t>the</a:t>
-            </a:r>
-            <a:r>
-              <a:rPr lang="es-US" sz="1400" dirty="0">
-                <a:solidFill>
-                  <a:schemeClr val="bg1"/>
-                </a:solidFill>
-                <a:latin typeface="Open Sans" panose="020B0606030504020204" pitchFamily="34" charset="0"/>
-                <a:ea typeface="Open Sans" panose="020B0606030504020204" pitchFamily="34" charset="0"/>
-                <a:cs typeface="Open Sans" panose="020B0606030504020204" pitchFamily="34" charset="0"/>
-              </a:rPr>
-              <a:t> </a:t>
-            </a:r>
-            <a:r>
-              <a:rPr lang="es-US" sz="1400" dirty="0" err="1">
-                <a:solidFill>
-                  <a:schemeClr val="bg1"/>
-                </a:solidFill>
-                <a:latin typeface="Open Sans" panose="020B0606030504020204" pitchFamily="34" charset="0"/>
-                <a:ea typeface="Open Sans" panose="020B0606030504020204" pitchFamily="34" charset="0"/>
-                <a:cs typeface="Open Sans" panose="020B0606030504020204" pitchFamily="34" charset="0"/>
-              </a:rPr>
-              <a:t>model</a:t>
-            </a:r>
-            <a:r>
-              <a:rPr lang="es-US" sz="1400" dirty="0">
-                <a:solidFill>
-                  <a:schemeClr val="bg1"/>
-                </a:solidFill>
-                <a:latin typeface="Open Sans" panose="020B0606030504020204" pitchFamily="34" charset="0"/>
-                <a:ea typeface="Open Sans" panose="020B0606030504020204" pitchFamily="34" charset="0"/>
-                <a:cs typeface="Open Sans" panose="020B0606030504020204" pitchFamily="34" charset="0"/>
-              </a:rPr>
-              <a:t> </a:t>
+              <a:t>Design. Build &amp; assess the model </a:t>
             </a:r>
             <a:endParaRPr lang="en-US" sz="1400" dirty="0">
               <a:solidFill>
@@ -17578,23 +16987,7 @@
           <a:p>
             <a:r>
               <a:rPr lang="en-US" dirty="0"/>
-              <a:t>Online Transaction Data </a:t>
-            </a:r>
-            <a:r>
-              <a:rPr lang="en-US"/>
-              <a:t>with 15,110 </a:t>
-            </a:r>
-            <a:r>
-              <a:rPr lang="en-US" dirty="0"/>
-              <a:t>Transactions </a:t>
-            </a:r>
-            <a:r>
-              <a:rPr lang="en-US"/>
-              <a:t>and 11 </a:t>
-            </a:r>
-            <a:r>
-              <a:rPr lang="en-US" dirty="0"/>
-              <a:t>features</a:t>
+              <a:t>Online Transaction Data with 15,110 Transactions and 11 features</a:t>
             </a:r>
           </a:p>
         </p:txBody>
@@ -17660,15 +17053,7 @@
             <a:pPr algn="l"/>
             <a:r>
               <a:rPr lang="en-US" sz="1600" dirty="0"/>
-              <a:t>Assuming that the </a:t>
-            </a:r>
-            <a:r>
-              <a:rPr lang="en-US" sz="1600" dirty="0" err="1"/>
-              <a:t>Caratlane</a:t>
-            </a:r>
-            <a:r>
-              <a:rPr lang="en-US" sz="1600" dirty="0"/>
-              <a:t> website/app should be generating similar data points, the sample dataset comprises of Unique Customer ID, information on customers’ activity such as sign-up time, purchase and purchase value, demographics such as sex, age and IP address and device usage were used to explore and build a model. </a:t>
+              <a:t>Assuming that the Caratlane website/app should be generating similar data points, the sample dataset comprises of Unique Customer ID, information on customers’ activity such as sign-up time, purchase and purchase value, demographics such as sex, age and IP address and device usage were used to explore and build a model. </a:t>
             </a:r>
           </a:p>
           <a:p>
@@ -17691,12 +17076,8 @@
               <a:buChar char="•"/>
             </a:pPr>
             <a:r>
-              <a:rPr lang="en-US" sz="1100" dirty="0" err="1"/>
-              <a:t>user_id</a:t>
-            </a:r>
-            <a:r>
               <a:rPr lang="en-US" sz="1100" dirty="0"/>
-              <a:t> - The unique id of the Customer</a:t>
+              <a:t>user_id - The unique id of the Customer</a:t>
             </a:r>
           </a:p>
           <a:p>
@@ -17705,12 +17086,8 @@
               <a:buChar char="•"/>
             </a:pPr>
             <a:r>
-              <a:rPr lang="en-US" sz="1100" dirty="0" err="1"/>
-              <a:t>signup_time</a:t>
-            </a:r>
-            <a:r>
               <a:rPr lang="en-US" sz="1100" dirty="0"/>
-              <a:t>  -The time at which the Customer signs up into the portal     </a:t>
+              <a:t>signup_time  -The time at which the Customer signs up into the portal     </a:t>
             </a:r>
           </a:p>
           <a:p>
@@ -17719,12 +17096,8 @@
               <a:buChar char="•"/>
             </a:pPr>
             <a:r>
-              <a:rPr lang="en-US" sz="1100" dirty="0" err="1"/>
-              <a:t>purchase_time</a:t>
-            </a:r>
-            <a:r>
               <a:rPr lang="en-US" sz="1100" dirty="0"/>
-              <a:t> -The time at which the Customer performs any purchase from the portal</a:t>
+              <a:t>purchase_time -The time at which the Customer performs any purchase from the portal</a:t>
             </a:r>
           </a:p>
           <a:p>
@@ -17733,12 +17106,8 @@
               <a:buChar char="•"/>
             </a:pPr>
             <a:r>
-              <a:rPr lang="en-US" sz="1100" dirty="0" err="1"/>
-              <a:t>purchase_value</a:t>
-            </a:r>
-            <a:r>
               <a:rPr lang="en-US" sz="1100" dirty="0"/>
-              <a:t>  - The amount at which the customer buys</a:t>
+              <a:t>purchase_value  - The amount at which the customer buys</a:t>
             </a:r>
           </a:p>
           <a:p>
@@ -17747,12 +17116,8 @@
               <a:buChar char="•"/>
             </a:pPr>
             <a:r>
-              <a:rPr lang="en-US" sz="1100" dirty="0" err="1"/>
-              <a:t>device_id</a:t>
-            </a:r>
-            <a:r>
               <a:rPr lang="en-US" sz="1100" dirty="0"/>
-              <a:t>   - device id is specific to the device what the customer is using</a:t>
+              <a:t>device_id   - device id is specific to the device what the customer is using</a:t>
             </a:r>
           </a:p>
           <a:p>
@@ -17801,12 +17166,8 @@
               <a:buChar char="•"/>
             </a:pPr>
             <a:r>
-              <a:rPr lang="en-US" sz="1100" dirty="0" err="1"/>
-              <a:t>ip_address</a:t>
-            </a:r>
-            <a:r>
               <a:rPr lang="en-US" sz="1100" dirty="0"/>
-              <a:t>  - Customer IP Address</a:t>
+              <a:t>ip_address  - Customer IP Address</a:t>
             </a:r>
           </a:p>
           <a:p>
@@ -17816,15 +17177,7 @@
             </a:pPr>
             <a:r>
               <a:rPr lang="en-US" sz="1100" dirty="0"/>
-              <a:t>class    - Target variable [1- Fraud transaction , 0 - </a:t>
-            </a:r>
-            <a:r>
-              <a:rPr lang="en-US" sz="1100" dirty="0" err="1"/>
-              <a:t>Successfull</a:t>
-            </a:r>
-            <a:r>
-              <a:rPr lang="en-US" sz="1100" dirty="0"/>
-              <a:t> Transaction]</a:t>
+              <a:t>class    - Target variable [1- Fraud transaction , 0 - Successfull Transaction]</a:t>
             </a:r>
           </a:p>
         </p:txBody>
@@ -18008,7 +17361,7 @@
             </a:pPr>
             <a:r>
               <a:rPr lang="en-US" dirty="0"/>
-              <a:t>AdaBoost as the best model with an accuracy &amp; F1- Score of 68% using Lazy predict</a:t>
+              <a:t>BernoulliNB and AdaBoost are the best models with an accuracy &amp; F1- Score of 68% using Lazy predict</a:t>
             </a:r>
           </a:p>
           <a:p>
@@ -18162,7 +17515,7 @@
           </a:bodyPr>
           <a:lstStyle/>
           <a:p>
-            <a:endParaRPr lang="en-US"/>
+            <a:endParaRPr lang="en-US" dirty="0"/>
           </a:p>
         </p:txBody>
       </p:sp>
@@ -18253,12 +17606,8 @@
           <a:lstStyle/>
           <a:p>
             <a:r>
-              <a:rPr lang="en-US" dirty="0" err="1"/>
-              <a:t>StreamLit</a:t>
-            </a:r>
-            <a:r>
               <a:rPr lang="en-US" dirty="0"/>
-              <a:t> UI Prototype</a:t>
+              <a:t>StreamLit UI Prototype</a:t>
             </a:r>
           </a:p>
         </p:txBody>

</xml_diff>

<commit_message>
Added a new slide for detection while browsing
</commit_message>
<xml_diff>
--- a/Using Data Driven Solution to Detect and Prevent Fraud for Caratlane.pptx
+++ b/Using Data Driven Solution to Detect and Prevent Fraud for Caratlane.pptx
@@ -12,7 +12,8 @@
     <p:sldId id="380" r:id="rId6"/>
     <p:sldId id="381" r:id="rId7"/>
     <p:sldId id="382" r:id="rId8"/>
-    <p:sldId id="383" r:id="rId9"/>
+    <p:sldId id="385" r:id="rId9"/>
+    <p:sldId id="383" r:id="rId10"/>
   </p:sldIdLst>
   <p:sldSz cx="12192000" cy="6858000"/>
   <p:notesSz cx="6858000" cy="9144000"/>
@@ -984,7 +985,7 @@
           <a:p>
             <a:fld id="{C9A480B5-FD0D-4A36-954E-21396C10E761}" type="datetimeFigureOut">
               <a:rPr lang="en-IN" smtClean="0"/>
-              <a:t>12-12-2022</a:t>
+              <a:t>17-12-2022</a:t>
             </a:fld>
             <a:endParaRPr lang="en-IN" dirty="0"/>
           </a:p>
@@ -1184,7 +1185,7 @@
           <a:p>
             <a:fld id="{C9A480B5-FD0D-4A36-954E-21396C10E761}" type="datetimeFigureOut">
               <a:rPr lang="en-IN" smtClean="0"/>
-              <a:t>12-12-2022</a:t>
+              <a:t>17-12-2022</a:t>
             </a:fld>
             <a:endParaRPr lang="en-IN" dirty="0"/>
           </a:p>
@@ -1394,7 +1395,7 @@
           <a:p>
             <a:fld id="{C9A480B5-FD0D-4A36-954E-21396C10E761}" type="datetimeFigureOut">
               <a:rPr lang="en-IN" smtClean="0"/>
-              <a:t>12-12-2022</a:t>
+              <a:t>17-12-2022</a:t>
             </a:fld>
             <a:endParaRPr lang="en-IN" dirty="0"/>
           </a:p>
@@ -1549,7 +1550,7 @@
           <a:p>
             <a:fld id="{425404F2-BE9A-4460-8815-8F645183555F}" type="datetimeFigureOut">
               <a:rPr lang="en-US" smtClean="0"/>
-              <a:t>12/12/2022</a:t>
+              <a:t>12/17/2022</a:t>
             </a:fld>
             <a:endParaRPr lang="en-US" dirty="0"/>
           </a:p>
@@ -1762,7 +1763,7 @@
           <a:p>
             <a:fld id="{425404F2-BE9A-4460-8815-8F645183555F}" type="datetimeFigureOut">
               <a:rPr lang="en-US" smtClean="0"/>
-              <a:t>12/12/2022</a:t>
+              <a:t>12/17/2022</a:t>
             </a:fld>
             <a:endParaRPr lang="en-US" dirty="0"/>
           </a:p>
@@ -2020,7 +2021,7 @@
           <a:p>
             <a:fld id="{C9A480B5-FD0D-4A36-954E-21396C10E761}" type="datetimeFigureOut">
               <a:rPr lang="en-IN" smtClean="0"/>
-              <a:t>12-12-2022</a:t>
+              <a:t>17-12-2022</a:t>
             </a:fld>
             <a:endParaRPr lang="en-IN" dirty="0"/>
           </a:p>
@@ -2296,7 +2297,7 @@
           <a:p>
             <a:fld id="{C9A480B5-FD0D-4A36-954E-21396C10E761}" type="datetimeFigureOut">
               <a:rPr lang="en-IN" smtClean="0"/>
-              <a:t>12-12-2022</a:t>
+              <a:t>17-12-2022</a:t>
             </a:fld>
             <a:endParaRPr lang="en-IN" dirty="0"/>
           </a:p>
@@ -2564,7 +2565,7 @@
           <a:p>
             <a:fld id="{C9A480B5-FD0D-4A36-954E-21396C10E761}" type="datetimeFigureOut">
               <a:rPr lang="en-IN" smtClean="0"/>
-              <a:t>12-12-2022</a:t>
+              <a:t>17-12-2022</a:t>
             </a:fld>
             <a:endParaRPr lang="en-IN" dirty="0"/>
           </a:p>
@@ -2979,7 +2980,7 @@
           <a:p>
             <a:fld id="{C9A480B5-FD0D-4A36-954E-21396C10E761}" type="datetimeFigureOut">
               <a:rPr lang="en-IN" smtClean="0"/>
-              <a:t>12-12-2022</a:t>
+              <a:t>17-12-2022</a:t>
             </a:fld>
             <a:endParaRPr lang="en-IN" dirty="0"/>
           </a:p>
@@ -3121,7 +3122,7 @@
           <a:p>
             <a:fld id="{C9A480B5-FD0D-4A36-954E-21396C10E761}" type="datetimeFigureOut">
               <a:rPr lang="en-IN" smtClean="0"/>
-              <a:t>12-12-2022</a:t>
+              <a:t>17-12-2022</a:t>
             </a:fld>
             <a:endParaRPr lang="en-IN" dirty="0"/>
           </a:p>
@@ -3234,7 +3235,7 @@
           <a:p>
             <a:fld id="{C9A480B5-FD0D-4A36-954E-21396C10E761}" type="datetimeFigureOut">
               <a:rPr lang="en-IN" smtClean="0"/>
-              <a:t>12-12-2022</a:t>
+              <a:t>17-12-2022</a:t>
             </a:fld>
             <a:endParaRPr lang="en-IN" dirty="0"/>
           </a:p>
@@ -3547,7 +3548,7 @@
           <a:p>
             <a:fld id="{C9A480B5-FD0D-4A36-954E-21396C10E761}" type="datetimeFigureOut">
               <a:rPr lang="en-IN" smtClean="0"/>
-              <a:t>12-12-2022</a:t>
+              <a:t>17-12-2022</a:t>
             </a:fld>
             <a:endParaRPr lang="en-IN" dirty="0"/>
           </a:p>
@@ -3836,7 +3837,7 @@
           <a:p>
             <a:fld id="{C9A480B5-FD0D-4A36-954E-21396C10E761}" type="datetimeFigureOut">
               <a:rPr lang="en-IN" smtClean="0"/>
-              <a:t>12-12-2022</a:t>
+              <a:t>17-12-2022</a:t>
             </a:fld>
             <a:endParaRPr lang="en-IN" dirty="0"/>
           </a:p>
@@ -4079,7 +4080,7 @@
           <a:p>
             <a:fld id="{C9A480B5-FD0D-4A36-954E-21396C10E761}" type="datetimeFigureOut">
               <a:rPr lang="en-IN" smtClean="0"/>
-              <a:t>12-12-2022</a:t>
+              <a:t>17-12-2022</a:t>
             </a:fld>
             <a:endParaRPr lang="en-IN" dirty="0"/>
           </a:p>
@@ -13794,8 +13795,8 @@
         </p:nvCxnSpPr>
         <p:spPr>
           <a:xfrm flipH="1" flipV="1">
-            <a:off x="4011018" y="4374225"/>
-            <a:ext cx="847042" cy="352395"/>
+            <a:off x="4011018" y="4280773"/>
+            <a:ext cx="847042" cy="445847"/>
           </a:xfrm>
           <a:prstGeom prst="straightConnector1">
             <a:avLst/>
@@ -13839,8 +13840,8 @@
         </p:nvCxnSpPr>
         <p:spPr>
           <a:xfrm flipH="1" flipV="1">
-            <a:off x="3669567" y="5147853"/>
-            <a:ext cx="1097338" cy="27095"/>
+            <a:off x="3605619" y="4881890"/>
+            <a:ext cx="1161286" cy="68442"/>
           </a:xfrm>
           <a:prstGeom prst="straightConnector1">
             <a:avLst/>
@@ -13884,8 +13885,8 @@
         </p:nvCxnSpPr>
         <p:spPr>
           <a:xfrm flipH="1">
-            <a:off x="3764256" y="5389363"/>
-            <a:ext cx="1093804" cy="576115"/>
+            <a:off x="3493349" y="5190110"/>
+            <a:ext cx="1273556" cy="308963"/>
           </a:xfrm>
           <a:prstGeom prst="straightConnector1">
             <a:avLst/>
@@ -13927,7 +13928,7 @@
         <p:spPr>
           <a:xfrm>
             <a:off x="2636408" y="4084296"/>
-            <a:ext cx="1374610" cy="579858"/>
+            <a:ext cx="1374610" cy="392954"/>
           </a:xfrm>
           <a:prstGeom prst="rect">
             <a:avLst/>
@@ -13996,8 +13997,8 @@
         </p:nvSpPr>
         <p:spPr>
           <a:xfrm>
-            <a:off x="2276337" y="4866727"/>
-            <a:ext cx="1393230" cy="562251"/>
+            <a:off x="2212389" y="4658967"/>
+            <a:ext cx="1393230" cy="445846"/>
           </a:xfrm>
           <a:prstGeom prst="rect">
             <a:avLst/>
@@ -14066,8 +14067,8 @@
         </p:nvSpPr>
         <p:spPr>
           <a:xfrm>
-            <a:off x="2389646" y="5675549"/>
-            <a:ext cx="1374610" cy="579858"/>
+            <a:off x="2118739" y="5259642"/>
+            <a:ext cx="1374610" cy="478861"/>
           </a:xfrm>
           <a:prstGeom prst="rect">
             <a:avLst/>
@@ -14390,7 +14391,7 @@
         </p:nvSpPr>
         <p:spPr>
           <a:xfrm>
-            <a:off x="9385369" y="2626815"/>
+            <a:off x="9481986" y="2057419"/>
             <a:ext cx="2078962" cy="1093107"/>
           </a:xfrm>
           <a:prstGeom prst="rect">
@@ -14460,7 +14461,7 @@
         </p:nvSpPr>
         <p:spPr>
           <a:xfrm>
-            <a:off x="9295488" y="1434311"/>
+            <a:off x="9392105" y="864915"/>
             <a:ext cx="2168843" cy="912572"/>
           </a:xfrm>
           <a:prstGeom prst="rect">
@@ -14532,8 +14533,8 @@
         </p:nvCxnSpPr>
         <p:spPr>
           <a:xfrm flipV="1">
-            <a:off x="8831111" y="1770467"/>
-            <a:ext cx="464377" cy="394437"/>
+            <a:off x="8840824" y="1201071"/>
+            <a:ext cx="551281" cy="791255"/>
           </a:xfrm>
           <a:prstGeom prst="straightConnector1">
             <a:avLst/>
@@ -14577,8 +14578,8 @@
         </p:nvCxnSpPr>
         <p:spPr>
           <a:xfrm>
-            <a:off x="8831111" y="2444836"/>
-            <a:ext cx="554258" cy="728533"/>
+            <a:off x="8852258" y="2421014"/>
+            <a:ext cx="629728" cy="182959"/>
           </a:xfrm>
           <a:prstGeom prst="straightConnector1">
             <a:avLst/>
@@ -14709,8 +14710,8 @@
         </p:nvSpPr>
         <p:spPr>
           <a:xfrm>
-            <a:off x="4011018" y="6147737"/>
-            <a:ext cx="1766930" cy="579858"/>
+            <a:off x="2212389" y="5893332"/>
+            <a:ext cx="2190949" cy="502196"/>
           </a:xfrm>
           <a:prstGeom prst="rect">
             <a:avLst/>
@@ -14781,8 +14782,8 @@
         </p:nvCxnSpPr>
         <p:spPr>
           <a:xfrm flipH="1">
-            <a:off x="5029124" y="5623075"/>
-            <a:ext cx="109742" cy="478861"/>
+            <a:off x="4334091" y="5410145"/>
+            <a:ext cx="523969" cy="445847"/>
           </a:xfrm>
           <a:prstGeom prst="straightConnector1">
             <a:avLst/>
@@ -14839,6 +14840,325 @@
           </a:prstGeom>
         </p:spPr>
       </p:pic>
+      <p:sp>
+        <p:nvSpPr>
+          <p:cNvPr id="2" name="Rectangle 1">
+            <a:extLst>
+              <a:ext uri="{FF2B5EF4-FFF2-40B4-BE49-F238E27FC236}">
+                <a16:creationId xmlns:a16="http://schemas.microsoft.com/office/drawing/2014/main" id="{62D1D164-A25E-FD3C-E0E2-A39912FD841B}"/>
+              </a:ext>
+            </a:extLst>
+          </p:cNvPr>
+          <p:cNvSpPr/>
+          <p:nvPr/>
+        </p:nvSpPr>
+        <p:spPr>
+          <a:xfrm>
+            <a:off x="9481986" y="3360450"/>
+            <a:ext cx="2078962" cy="796774"/>
+          </a:xfrm>
+          <a:prstGeom prst="rect">
+            <a:avLst/>
+          </a:prstGeom>
+          <a:solidFill>
+            <a:schemeClr val="bg1"/>
+          </a:solidFill>
+          <a:ln>
+            <a:solidFill>
+              <a:srgbClr val="4F3267"/>
+            </a:solidFill>
+          </a:ln>
+        </p:spPr>
+        <p:style>
+          <a:lnRef idx="2">
+            <a:schemeClr val="accent1">
+              <a:shade val="50000"/>
+            </a:schemeClr>
+          </a:lnRef>
+          <a:fillRef idx="1">
+            <a:schemeClr val="accent1"/>
+          </a:fillRef>
+          <a:effectRef idx="0">
+            <a:schemeClr val="accent1"/>
+          </a:effectRef>
+          <a:fontRef idx="minor">
+            <a:schemeClr val="lt1"/>
+          </a:fontRef>
+        </p:style>
+        <p:txBody>
+          <a:bodyPr lIns="91440" tIns="45720" rIns="91440" bIns="45720" rtlCol="0" anchor="ctr"/>
+          <a:lstStyle>
+            <a:defPPr>
+              <a:defRPr lang="en-US"/>
+            </a:defPPr>
+            <a:lvl1pPr marL="0" algn="l" defTabSz="914400" rtl="0" eaLnBrk="1" latinLnBrk="0" hangingPunct="1">
+              <a:defRPr sz="1800" kern="1200">
+                <a:solidFill>
+                  <a:schemeClr val="lt1"/>
+                </a:solidFill>
+                <a:latin typeface="+mn-lt"/>
+                <a:ea typeface="+mn-ea"/>
+                <a:cs typeface="+mn-cs"/>
+              </a:defRPr>
+            </a:lvl1pPr>
+            <a:lvl2pPr marL="457200" algn="l" defTabSz="914400" rtl="0" eaLnBrk="1" latinLnBrk="0" hangingPunct="1">
+              <a:defRPr sz="1800" kern="1200">
+                <a:solidFill>
+                  <a:schemeClr val="lt1"/>
+                </a:solidFill>
+                <a:latin typeface="+mn-lt"/>
+                <a:ea typeface="+mn-ea"/>
+                <a:cs typeface="+mn-cs"/>
+              </a:defRPr>
+            </a:lvl2pPr>
+            <a:lvl3pPr marL="914400" algn="l" defTabSz="914400" rtl="0" eaLnBrk="1" latinLnBrk="0" hangingPunct="1">
+              <a:defRPr sz="1800" kern="1200">
+                <a:solidFill>
+                  <a:schemeClr val="lt1"/>
+                </a:solidFill>
+                <a:latin typeface="+mn-lt"/>
+                <a:ea typeface="+mn-ea"/>
+                <a:cs typeface="+mn-cs"/>
+              </a:defRPr>
+            </a:lvl3pPr>
+            <a:lvl4pPr marL="1371600" algn="l" defTabSz="914400" rtl="0" eaLnBrk="1" latinLnBrk="0" hangingPunct="1">
+              <a:defRPr sz="1800" kern="1200">
+                <a:solidFill>
+                  <a:schemeClr val="lt1"/>
+                </a:solidFill>
+                <a:latin typeface="+mn-lt"/>
+                <a:ea typeface="+mn-ea"/>
+                <a:cs typeface="+mn-cs"/>
+              </a:defRPr>
+            </a:lvl4pPr>
+            <a:lvl5pPr marL="1828800" algn="l" defTabSz="914400" rtl="0" eaLnBrk="1" latinLnBrk="0" hangingPunct="1">
+              <a:defRPr sz="1800" kern="1200">
+                <a:solidFill>
+                  <a:schemeClr val="lt1"/>
+                </a:solidFill>
+                <a:latin typeface="+mn-lt"/>
+                <a:ea typeface="+mn-ea"/>
+                <a:cs typeface="+mn-cs"/>
+              </a:defRPr>
+            </a:lvl5pPr>
+            <a:lvl6pPr marL="2286000" algn="l" defTabSz="914400" rtl="0" eaLnBrk="1" latinLnBrk="0" hangingPunct="1">
+              <a:defRPr sz="1800" kern="1200">
+                <a:solidFill>
+                  <a:schemeClr val="lt1"/>
+                </a:solidFill>
+                <a:latin typeface="+mn-lt"/>
+                <a:ea typeface="+mn-ea"/>
+                <a:cs typeface="+mn-cs"/>
+              </a:defRPr>
+            </a:lvl6pPr>
+            <a:lvl7pPr marL="2743200" algn="l" defTabSz="914400" rtl="0" eaLnBrk="1" latinLnBrk="0" hangingPunct="1">
+              <a:defRPr sz="1800" kern="1200">
+                <a:solidFill>
+                  <a:schemeClr val="lt1"/>
+                </a:solidFill>
+                <a:latin typeface="+mn-lt"/>
+                <a:ea typeface="+mn-ea"/>
+                <a:cs typeface="+mn-cs"/>
+              </a:defRPr>
+            </a:lvl7pPr>
+            <a:lvl8pPr marL="3200400" algn="l" defTabSz="914400" rtl="0" eaLnBrk="1" latinLnBrk="0" hangingPunct="1">
+              <a:defRPr sz="1800" kern="1200">
+                <a:solidFill>
+                  <a:schemeClr val="lt1"/>
+                </a:solidFill>
+                <a:latin typeface="+mn-lt"/>
+                <a:ea typeface="+mn-ea"/>
+                <a:cs typeface="+mn-cs"/>
+              </a:defRPr>
+            </a:lvl8pPr>
+            <a:lvl9pPr marL="3657600" algn="l" defTabSz="914400" rtl="0" eaLnBrk="1" latinLnBrk="0" hangingPunct="1">
+              <a:defRPr sz="1800" kern="1200">
+                <a:solidFill>
+                  <a:schemeClr val="lt1"/>
+                </a:solidFill>
+                <a:latin typeface="+mn-lt"/>
+                <a:ea typeface="+mn-ea"/>
+                <a:cs typeface="+mn-cs"/>
+              </a:defRPr>
+            </a:lvl9pPr>
+          </a:lstStyle>
+          <a:p>
+            <a:pPr algn="ctr"/>
+            <a:r>
+              <a:rPr lang="en-US" sz="1100" b="1" dirty="0">
+                <a:solidFill>
+                  <a:srgbClr val="4F3267"/>
+                </a:solidFill>
+                <a:latin typeface="Helvetica"/>
+                <a:ea typeface="+mn-lt"/>
+                <a:cs typeface="Helvetica"/>
+              </a:rPr>
+              <a:t>Check for affiliate frauds like coupon code and Loyalty cards etc. at Checkout </a:t>
+            </a:r>
+            <a:endParaRPr lang="en-US" dirty="0"/>
+          </a:p>
+        </p:txBody>
+      </p:sp>
+      <p:cxnSp>
+        <p:nvCxnSpPr>
+          <p:cNvPr id="3" name="Straight Arrow Connector 2">
+            <a:extLst>
+              <a:ext uri="{FF2B5EF4-FFF2-40B4-BE49-F238E27FC236}">
+                <a16:creationId xmlns:a16="http://schemas.microsoft.com/office/drawing/2014/main" id="{435DD285-DC39-AEE8-8AE6-2B11D683BF99}"/>
+              </a:ext>
+            </a:extLst>
+          </p:cNvPr>
+          <p:cNvCxnSpPr>
+            <a:cxnSpLocks/>
+            <a:endCxn id="2" idx="1"/>
+          </p:cNvCxnSpPr>
+          <p:nvPr/>
+        </p:nvCxnSpPr>
+        <p:spPr>
+          <a:xfrm>
+            <a:off x="8831110" y="2804172"/>
+            <a:ext cx="650876" cy="954665"/>
+          </a:xfrm>
+          <a:prstGeom prst="straightConnector1">
+            <a:avLst/>
+          </a:prstGeom>
+          <a:ln>
+            <a:solidFill>
+              <a:srgbClr val="4F3267"/>
+            </a:solidFill>
+            <a:tailEnd type="triangle"/>
+          </a:ln>
+        </p:spPr>
+        <p:style>
+          <a:lnRef idx="1">
+            <a:schemeClr val="accent1"/>
+          </a:lnRef>
+          <a:fillRef idx="0">
+            <a:schemeClr val="accent1"/>
+          </a:fillRef>
+          <a:effectRef idx="0">
+            <a:schemeClr val="accent1"/>
+          </a:effectRef>
+          <a:fontRef idx="minor">
+            <a:schemeClr val="tx1"/>
+          </a:fontRef>
+        </p:style>
+      </p:cxnSp>
+      <p:sp>
+        <p:nvSpPr>
+          <p:cNvPr id="39" name="Rectangle 38">
+            <a:extLst>
+              <a:ext uri="{FF2B5EF4-FFF2-40B4-BE49-F238E27FC236}">
+                <a16:creationId xmlns:a16="http://schemas.microsoft.com/office/drawing/2014/main" id="{83EC4DED-B942-5C45-2BBD-8071D47E5476}"/>
+              </a:ext>
+            </a:extLst>
+          </p:cNvPr>
+          <p:cNvSpPr/>
+          <p:nvPr/>
+        </p:nvSpPr>
+        <p:spPr>
+          <a:xfrm>
+            <a:off x="4658774" y="6147326"/>
+            <a:ext cx="1809352" cy="502196"/>
+          </a:xfrm>
+          <a:prstGeom prst="rect">
+            <a:avLst/>
+          </a:prstGeom>
+          <a:solidFill>
+            <a:schemeClr val="bg1"/>
+          </a:solidFill>
+          <a:ln>
+            <a:solidFill>
+              <a:srgbClr val="4F3267"/>
+            </a:solidFill>
+          </a:ln>
+        </p:spPr>
+        <p:style>
+          <a:lnRef idx="2">
+            <a:schemeClr val="accent1">
+              <a:shade val="50000"/>
+            </a:schemeClr>
+          </a:lnRef>
+          <a:fillRef idx="1">
+            <a:schemeClr val="accent1"/>
+          </a:fillRef>
+          <a:effectRef idx="0">
+            <a:schemeClr val="accent1"/>
+          </a:effectRef>
+          <a:fontRef idx="minor">
+            <a:schemeClr val="lt1"/>
+          </a:fontRef>
+        </p:style>
+        <p:txBody>
+          <a:bodyPr rtlCol="0" anchor="ctr"/>
+          <a:lstStyle/>
+          <a:p>
+            <a:pPr algn="ctr"/>
+            <a:r>
+              <a:rPr lang="en-US" sz="1100" b="1" dirty="0">
+                <a:solidFill>
+                  <a:srgbClr val="4F3267"/>
+                </a:solidFill>
+                <a:latin typeface="Helvetica" panose="020B0604020202020204" pitchFamily="34" charset="0"/>
+                <a:cs typeface="Helvetica" panose="020B0604020202020204" pitchFamily="34" charset="0"/>
+              </a:rPr>
+              <a:t>Customer using huge Loyalty points for a purchase</a:t>
+            </a:r>
+            <a:endParaRPr lang="en-IN" sz="1100" b="1" dirty="0">
+              <a:solidFill>
+                <a:srgbClr val="4F3267"/>
+              </a:solidFill>
+              <a:latin typeface="Helvetica" panose="020B0604020202020204" pitchFamily="34" charset="0"/>
+              <a:cs typeface="Helvetica" panose="020B0604020202020204" pitchFamily="34" charset="0"/>
+            </a:endParaRPr>
+          </a:p>
+        </p:txBody>
+      </p:sp>
+      <p:cxnSp>
+        <p:nvCxnSpPr>
+          <p:cNvPr id="40" name="Straight Arrow Connector 39">
+            <a:extLst>
+              <a:ext uri="{FF2B5EF4-FFF2-40B4-BE49-F238E27FC236}">
+                <a16:creationId xmlns:a16="http://schemas.microsoft.com/office/drawing/2014/main" id="{216511CA-E9D2-CBFF-2E95-7A6E8AD5F3C0}"/>
+              </a:ext>
+            </a:extLst>
+          </p:cNvPr>
+          <p:cNvCxnSpPr>
+            <a:cxnSpLocks/>
+            <a:endCxn id="39" idx="0"/>
+          </p:cNvCxnSpPr>
+          <p:nvPr/>
+        </p:nvCxnSpPr>
+        <p:spPr>
+          <a:xfrm>
+            <a:off x="5545757" y="5691091"/>
+            <a:ext cx="17693" cy="456235"/>
+          </a:xfrm>
+          <a:prstGeom prst="straightConnector1">
+            <a:avLst/>
+          </a:prstGeom>
+          <a:ln>
+            <a:solidFill>
+              <a:srgbClr val="4F3267"/>
+            </a:solidFill>
+            <a:tailEnd type="triangle"/>
+          </a:ln>
+        </p:spPr>
+        <p:style>
+          <a:lnRef idx="1">
+            <a:schemeClr val="accent1"/>
+          </a:lnRef>
+          <a:fillRef idx="0">
+            <a:schemeClr val="accent1"/>
+          </a:fillRef>
+          <a:effectRef idx="0">
+            <a:schemeClr val="accent1"/>
+          </a:effectRef>
+          <a:fontRef idx="minor">
+            <a:schemeClr val="tx1"/>
+          </a:fontRef>
+        </p:style>
+      </p:cxnSp>
     </p:spTree>
     <p:extLst>
       <p:ext uri="{BB962C8B-B14F-4D97-AF65-F5344CB8AC3E}">
@@ -17855,6 +18175,2581 @@
 </file>
 
 <file path=ppt/slides/slide8.xml><?xml version="1.0" encoding="utf-8"?>
+<p:sld xmlns:a="http://schemas.openxmlformats.org/drawingml/2006/main" xmlns:r="http://schemas.openxmlformats.org/officeDocument/2006/relationships" xmlns:p="http://schemas.openxmlformats.org/presentationml/2006/main">
+  <p:cSld>
+    <p:bg>
+      <p:bgPr>
+        <a:solidFill>
+          <a:srgbClr val="F7F7F7"/>
+        </a:solidFill>
+        <a:effectLst/>
+      </p:bgPr>
+    </p:bg>
+    <p:spTree>
+      <p:nvGrpSpPr>
+        <p:cNvPr id="1" name=""/>
+        <p:cNvGrpSpPr/>
+        <p:nvPr/>
+      </p:nvGrpSpPr>
+      <p:grpSpPr>
+        <a:xfrm>
+          <a:off x="0" y="0"/>
+          <a:ext cx="0" cy="0"/>
+          <a:chOff x="0" y="0"/>
+          <a:chExt cx="0" cy="0"/>
+        </a:xfrm>
+      </p:grpSpPr>
+      <p:sp>
+        <p:nvSpPr>
+          <p:cNvPr id="4" name="Rectangle 3">
+            <a:extLst>
+              <a:ext uri="{FF2B5EF4-FFF2-40B4-BE49-F238E27FC236}">
+                <a16:creationId xmlns:a16="http://schemas.microsoft.com/office/drawing/2014/main" id="{8473B140-C7BA-9A11-B2C2-962705E67539}"/>
+              </a:ext>
+            </a:extLst>
+          </p:cNvPr>
+          <p:cNvSpPr/>
+          <p:nvPr/>
+        </p:nvSpPr>
+        <p:spPr>
+          <a:xfrm>
+            <a:off x="4511975" y="1343878"/>
+            <a:ext cx="1204896" cy="778955"/>
+          </a:xfrm>
+          <a:prstGeom prst="rect">
+            <a:avLst/>
+          </a:prstGeom>
+          <a:solidFill>
+            <a:schemeClr val="bg1"/>
+          </a:solidFill>
+          <a:ln>
+            <a:solidFill>
+              <a:srgbClr val="4F3267"/>
+            </a:solidFill>
+          </a:ln>
+        </p:spPr>
+        <p:style>
+          <a:lnRef idx="2">
+            <a:schemeClr val="accent1">
+              <a:shade val="50000"/>
+            </a:schemeClr>
+          </a:lnRef>
+          <a:fillRef idx="1">
+            <a:schemeClr val="accent1"/>
+          </a:fillRef>
+          <a:effectRef idx="0">
+            <a:schemeClr val="accent1"/>
+          </a:effectRef>
+          <a:fontRef idx="minor">
+            <a:schemeClr val="lt1"/>
+          </a:fontRef>
+        </p:style>
+        <p:txBody>
+          <a:bodyPr rtlCol="0" anchor="ctr"/>
+          <a:lstStyle/>
+          <a:p>
+            <a:pPr marL="0" marR="0" lvl="0" indent="0" algn="ctr" defTabSz="914400" rtl="0" eaLnBrk="1" fontAlgn="auto" latinLnBrk="0" hangingPunct="1">
+              <a:lnSpc>
+                <a:spcPct val="100000"/>
+              </a:lnSpc>
+              <a:spcBef>
+                <a:spcPts val="0"/>
+              </a:spcBef>
+              <a:spcAft>
+                <a:spcPts val="0"/>
+              </a:spcAft>
+              <a:buClrTx/>
+              <a:buSzTx/>
+              <a:buFontTx/>
+              <a:buNone/>
+              <a:tabLst/>
+              <a:defRPr/>
+            </a:pPr>
+            <a:r>
+              <a:rPr kumimoji="0" lang="en-US" sz="1100" b="1" i="0" u="none" strike="noStrike" kern="1200" cap="none" spc="0" normalizeH="0" baseline="0" noProof="0" dirty="0">
+                <a:ln>
+                  <a:noFill/>
+                </a:ln>
+                <a:solidFill>
+                  <a:srgbClr val="4F3267"/>
+                </a:solidFill>
+                <a:effectLst/>
+                <a:uLnTx/>
+                <a:uFillTx/>
+                <a:latin typeface="Helvetica" panose="020B0604020202020204" pitchFamily="34" charset="0"/>
+                <a:ea typeface="+mn-ea"/>
+                <a:cs typeface="Helvetica" panose="020B0604020202020204" pitchFamily="34" charset="0"/>
+              </a:rPr>
+              <a:t>Add to Cart</a:t>
+            </a:r>
+            <a:endParaRPr kumimoji="0" lang="en-IN" sz="1100" b="1" i="0" u="none" strike="noStrike" kern="1200" cap="none" spc="0" normalizeH="0" baseline="0" noProof="0" dirty="0">
+              <a:ln>
+                <a:noFill/>
+              </a:ln>
+              <a:solidFill>
+                <a:srgbClr val="4F3267"/>
+              </a:solidFill>
+              <a:effectLst/>
+              <a:uLnTx/>
+              <a:uFillTx/>
+              <a:latin typeface="Helvetica" panose="020B0604020202020204" pitchFamily="34" charset="0"/>
+              <a:ea typeface="+mn-ea"/>
+              <a:cs typeface="Helvetica" panose="020B0604020202020204" pitchFamily="34" charset="0"/>
+            </a:endParaRPr>
+          </a:p>
+        </p:txBody>
+      </p:sp>
+      <p:cxnSp>
+        <p:nvCxnSpPr>
+          <p:cNvPr id="6" name="Straight Arrow Connector 5">
+            <a:extLst>
+              <a:ext uri="{FF2B5EF4-FFF2-40B4-BE49-F238E27FC236}">
+                <a16:creationId xmlns:a16="http://schemas.microsoft.com/office/drawing/2014/main" id="{A31D0819-8D74-CE2E-CBB6-A73B3AA2DB85}"/>
+              </a:ext>
+            </a:extLst>
+          </p:cNvPr>
+          <p:cNvCxnSpPr>
+            <a:cxnSpLocks/>
+            <a:stCxn id="4" idx="3"/>
+            <a:endCxn id="7" idx="1"/>
+          </p:cNvCxnSpPr>
+          <p:nvPr/>
+        </p:nvCxnSpPr>
+        <p:spPr>
+          <a:xfrm flipV="1">
+            <a:off x="5716871" y="1733355"/>
+            <a:ext cx="690001" cy="1"/>
+          </a:xfrm>
+          <a:prstGeom prst="straightConnector1">
+            <a:avLst/>
+          </a:prstGeom>
+          <a:ln>
+            <a:solidFill>
+              <a:srgbClr val="4F3267"/>
+            </a:solidFill>
+            <a:tailEnd type="triangle"/>
+          </a:ln>
+        </p:spPr>
+        <p:style>
+          <a:lnRef idx="1">
+            <a:schemeClr val="accent1"/>
+          </a:lnRef>
+          <a:fillRef idx="0">
+            <a:schemeClr val="accent1"/>
+          </a:fillRef>
+          <a:effectRef idx="0">
+            <a:schemeClr val="accent1"/>
+          </a:effectRef>
+          <a:fontRef idx="minor">
+            <a:schemeClr val="tx1"/>
+          </a:fontRef>
+        </p:style>
+      </p:cxnSp>
+      <p:sp>
+        <p:nvSpPr>
+          <p:cNvPr id="7" name="Rectangle 6">
+            <a:extLst>
+              <a:ext uri="{FF2B5EF4-FFF2-40B4-BE49-F238E27FC236}">
+                <a16:creationId xmlns:a16="http://schemas.microsoft.com/office/drawing/2014/main" id="{AC5C1049-B20B-430C-C8DC-625885F5F916}"/>
+              </a:ext>
+            </a:extLst>
+          </p:cNvPr>
+          <p:cNvSpPr/>
+          <p:nvPr/>
+        </p:nvSpPr>
+        <p:spPr>
+          <a:xfrm>
+            <a:off x="6406872" y="1355503"/>
+            <a:ext cx="1722486" cy="755703"/>
+          </a:xfrm>
+          <a:prstGeom prst="rect">
+            <a:avLst/>
+          </a:prstGeom>
+          <a:solidFill>
+            <a:schemeClr val="bg1"/>
+          </a:solidFill>
+          <a:ln>
+            <a:solidFill>
+              <a:srgbClr val="4F3267"/>
+            </a:solidFill>
+          </a:ln>
+        </p:spPr>
+        <p:style>
+          <a:lnRef idx="2">
+            <a:schemeClr val="accent1">
+              <a:shade val="50000"/>
+            </a:schemeClr>
+          </a:lnRef>
+          <a:fillRef idx="1">
+            <a:schemeClr val="accent1"/>
+          </a:fillRef>
+          <a:effectRef idx="0">
+            <a:schemeClr val="accent1"/>
+          </a:effectRef>
+          <a:fontRef idx="minor">
+            <a:schemeClr val="lt1"/>
+          </a:fontRef>
+        </p:style>
+        <p:txBody>
+          <a:bodyPr rtlCol="0" anchor="ctr"/>
+          <a:lstStyle/>
+          <a:p>
+            <a:pPr marL="0" marR="0" lvl="0" indent="0" algn="ctr" defTabSz="914400" rtl="0" eaLnBrk="1" fontAlgn="auto" latinLnBrk="0" hangingPunct="1">
+              <a:lnSpc>
+                <a:spcPct val="100000"/>
+              </a:lnSpc>
+              <a:spcBef>
+                <a:spcPts val="0"/>
+              </a:spcBef>
+              <a:spcAft>
+                <a:spcPts val="0"/>
+              </a:spcAft>
+              <a:buClrTx/>
+              <a:buSzTx/>
+              <a:buFontTx/>
+              <a:buNone/>
+              <a:tabLst/>
+              <a:defRPr/>
+            </a:pPr>
+            <a:r>
+              <a:rPr kumimoji="0" lang="en-US" sz="1100" b="1" i="0" u="none" strike="noStrike" kern="1200" cap="none" spc="0" normalizeH="0" baseline="0" noProof="0" dirty="0">
+                <a:ln>
+                  <a:noFill/>
+                </a:ln>
+                <a:solidFill>
+                  <a:srgbClr val="4F3267"/>
+                </a:solidFill>
+                <a:effectLst/>
+                <a:uLnTx/>
+                <a:uFillTx/>
+                <a:latin typeface="Helvetica" panose="020B0604020202020204" pitchFamily="34" charset="0"/>
+                <a:ea typeface="+mn-ea"/>
+                <a:cs typeface="Helvetica" panose="020B0604020202020204" pitchFamily="34" charset="0"/>
+              </a:rPr>
+              <a:t>We look at Quantity and Volume of Transaction</a:t>
+            </a:r>
+            <a:endParaRPr kumimoji="0" lang="en-IN" sz="1100" b="1" i="0" u="none" strike="noStrike" kern="1200" cap="none" spc="0" normalizeH="0" baseline="0" noProof="0" dirty="0">
+              <a:ln>
+                <a:noFill/>
+              </a:ln>
+              <a:solidFill>
+                <a:srgbClr val="4F3267"/>
+              </a:solidFill>
+              <a:effectLst/>
+              <a:uLnTx/>
+              <a:uFillTx/>
+              <a:latin typeface="Helvetica" panose="020B0604020202020204" pitchFamily="34" charset="0"/>
+              <a:ea typeface="+mn-ea"/>
+              <a:cs typeface="Helvetica" panose="020B0604020202020204" pitchFamily="34" charset="0"/>
+            </a:endParaRPr>
+          </a:p>
+        </p:txBody>
+      </p:sp>
+      <p:cxnSp>
+        <p:nvCxnSpPr>
+          <p:cNvPr id="9" name="Straight Arrow Connector 8">
+            <a:extLst>
+              <a:ext uri="{FF2B5EF4-FFF2-40B4-BE49-F238E27FC236}">
+                <a16:creationId xmlns:a16="http://schemas.microsoft.com/office/drawing/2014/main" id="{0642F900-CA90-F2A4-65F8-7FA6C3B41534}"/>
+              </a:ext>
+            </a:extLst>
+          </p:cNvPr>
+          <p:cNvCxnSpPr>
+            <a:cxnSpLocks/>
+            <a:stCxn id="7" idx="3"/>
+            <a:endCxn id="12" idx="1"/>
+          </p:cNvCxnSpPr>
+          <p:nvPr/>
+        </p:nvCxnSpPr>
+        <p:spPr>
+          <a:xfrm>
+            <a:off x="8129358" y="1733355"/>
+            <a:ext cx="729551" cy="1"/>
+          </a:xfrm>
+          <a:prstGeom prst="straightConnector1">
+            <a:avLst/>
+          </a:prstGeom>
+          <a:ln>
+            <a:solidFill>
+              <a:srgbClr val="4F3267"/>
+            </a:solidFill>
+            <a:tailEnd type="triangle"/>
+          </a:ln>
+        </p:spPr>
+        <p:style>
+          <a:lnRef idx="1">
+            <a:schemeClr val="accent1"/>
+          </a:lnRef>
+          <a:fillRef idx="0">
+            <a:schemeClr val="accent1"/>
+          </a:fillRef>
+          <a:effectRef idx="0">
+            <a:schemeClr val="accent1"/>
+          </a:effectRef>
+          <a:fontRef idx="minor">
+            <a:schemeClr val="tx1"/>
+          </a:fontRef>
+        </p:style>
+      </p:cxnSp>
+      <p:sp>
+        <p:nvSpPr>
+          <p:cNvPr id="12" name="Rectangle 11">
+            <a:extLst>
+              <a:ext uri="{FF2B5EF4-FFF2-40B4-BE49-F238E27FC236}">
+                <a16:creationId xmlns:a16="http://schemas.microsoft.com/office/drawing/2014/main" id="{B9577398-07FA-D52C-5E5C-F18746B88E4C}"/>
+              </a:ext>
+            </a:extLst>
+          </p:cNvPr>
+          <p:cNvSpPr/>
+          <p:nvPr/>
+        </p:nvSpPr>
+        <p:spPr>
+          <a:xfrm>
+            <a:off x="8858909" y="1343878"/>
+            <a:ext cx="1204896" cy="778955"/>
+          </a:xfrm>
+          <a:prstGeom prst="rect">
+            <a:avLst/>
+          </a:prstGeom>
+          <a:solidFill>
+            <a:schemeClr val="bg1"/>
+          </a:solidFill>
+          <a:ln>
+            <a:solidFill>
+              <a:srgbClr val="4F3267"/>
+            </a:solidFill>
+          </a:ln>
+        </p:spPr>
+        <p:style>
+          <a:lnRef idx="2">
+            <a:schemeClr val="accent1">
+              <a:shade val="50000"/>
+            </a:schemeClr>
+          </a:lnRef>
+          <a:fillRef idx="1">
+            <a:schemeClr val="accent1"/>
+          </a:fillRef>
+          <a:effectRef idx="0">
+            <a:schemeClr val="accent1"/>
+          </a:effectRef>
+          <a:fontRef idx="minor">
+            <a:schemeClr val="lt1"/>
+          </a:fontRef>
+        </p:style>
+        <p:txBody>
+          <a:bodyPr rtlCol="0" anchor="ctr"/>
+          <a:lstStyle/>
+          <a:p>
+            <a:pPr marL="0" marR="0" lvl="0" indent="0" algn="ctr" defTabSz="914400" rtl="0" eaLnBrk="1" fontAlgn="auto" latinLnBrk="0" hangingPunct="1">
+              <a:lnSpc>
+                <a:spcPct val="100000"/>
+              </a:lnSpc>
+              <a:spcBef>
+                <a:spcPts val="0"/>
+              </a:spcBef>
+              <a:spcAft>
+                <a:spcPts val="0"/>
+              </a:spcAft>
+              <a:buClrTx/>
+              <a:buSzTx/>
+              <a:buFontTx/>
+              <a:buNone/>
+              <a:tabLst/>
+              <a:defRPr/>
+            </a:pPr>
+            <a:r>
+              <a:rPr kumimoji="0" lang="en-US" sz="1100" b="1" i="0" u="none" strike="noStrike" kern="1200" cap="none" spc="0" normalizeH="0" baseline="0" noProof="0" dirty="0">
+                <a:ln>
+                  <a:noFill/>
+                </a:ln>
+                <a:solidFill>
+                  <a:srgbClr val="4F3267"/>
+                </a:solidFill>
+                <a:effectLst/>
+                <a:uLnTx/>
+                <a:uFillTx/>
+                <a:latin typeface="Helvetica" panose="020B0604020202020204" pitchFamily="34" charset="0"/>
+                <a:ea typeface="+mn-ea"/>
+                <a:cs typeface="Helvetica" panose="020B0604020202020204" pitchFamily="34" charset="0"/>
+              </a:rPr>
+              <a:t>Checkout</a:t>
+            </a:r>
+            <a:endParaRPr kumimoji="0" lang="en-IN" sz="1100" b="1" i="0" u="none" strike="noStrike" kern="1200" cap="none" spc="0" normalizeH="0" baseline="0" noProof="0" dirty="0">
+              <a:ln>
+                <a:noFill/>
+              </a:ln>
+              <a:solidFill>
+                <a:srgbClr val="4F3267"/>
+              </a:solidFill>
+              <a:effectLst/>
+              <a:uLnTx/>
+              <a:uFillTx/>
+              <a:latin typeface="Helvetica" panose="020B0604020202020204" pitchFamily="34" charset="0"/>
+              <a:ea typeface="+mn-ea"/>
+              <a:cs typeface="Helvetica" panose="020B0604020202020204" pitchFamily="34" charset="0"/>
+            </a:endParaRPr>
+          </a:p>
+        </p:txBody>
+      </p:sp>
+      <p:sp>
+        <p:nvSpPr>
+          <p:cNvPr id="41" name="Rectangle 40">
+            <a:extLst>
+              <a:ext uri="{FF2B5EF4-FFF2-40B4-BE49-F238E27FC236}">
+                <a16:creationId xmlns:a16="http://schemas.microsoft.com/office/drawing/2014/main" id="{BCAFF46A-D566-3638-15CF-7B43FA5159CA}"/>
+              </a:ext>
+            </a:extLst>
+          </p:cNvPr>
+          <p:cNvSpPr/>
+          <p:nvPr/>
+        </p:nvSpPr>
+        <p:spPr>
+          <a:xfrm>
+            <a:off x="2028003" y="1343878"/>
+            <a:ext cx="1853579" cy="778955"/>
+          </a:xfrm>
+          <a:prstGeom prst="rect">
+            <a:avLst/>
+          </a:prstGeom>
+          <a:solidFill>
+            <a:schemeClr val="bg1"/>
+          </a:solidFill>
+          <a:ln>
+            <a:solidFill>
+              <a:srgbClr val="4F3267"/>
+            </a:solidFill>
+          </a:ln>
+        </p:spPr>
+        <p:style>
+          <a:lnRef idx="2">
+            <a:schemeClr val="accent1">
+              <a:shade val="50000"/>
+            </a:schemeClr>
+          </a:lnRef>
+          <a:fillRef idx="1">
+            <a:schemeClr val="accent1"/>
+          </a:fillRef>
+          <a:effectRef idx="0">
+            <a:schemeClr val="accent1"/>
+          </a:effectRef>
+          <a:fontRef idx="minor">
+            <a:schemeClr val="lt1"/>
+          </a:fontRef>
+        </p:style>
+        <p:txBody>
+          <a:bodyPr rtlCol="0" anchor="ctr"/>
+          <a:lstStyle/>
+          <a:p>
+            <a:pPr marL="0" marR="0" lvl="0" indent="0" algn="ctr" defTabSz="914400" rtl="0" eaLnBrk="1" fontAlgn="auto" latinLnBrk="0" hangingPunct="1">
+              <a:lnSpc>
+                <a:spcPct val="100000"/>
+              </a:lnSpc>
+              <a:spcBef>
+                <a:spcPts val="0"/>
+              </a:spcBef>
+              <a:spcAft>
+                <a:spcPts val="0"/>
+              </a:spcAft>
+              <a:buClrTx/>
+              <a:buSzTx/>
+              <a:buFontTx/>
+              <a:buNone/>
+              <a:tabLst/>
+              <a:defRPr/>
+            </a:pPr>
+            <a:r>
+              <a:rPr kumimoji="0" lang="en-US" sz="1100" b="1" i="0" u="none" strike="noStrike" kern="1200" cap="none" spc="0" normalizeH="0" baseline="0" noProof="0" dirty="0">
+                <a:ln>
+                  <a:noFill/>
+                </a:ln>
+                <a:solidFill>
+                  <a:srgbClr val="4F3267"/>
+                </a:solidFill>
+                <a:effectLst/>
+                <a:uLnTx/>
+                <a:uFillTx/>
+                <a:latin typeface="Helvetica" panose="020B0604020202020204" pitchFamily="34" charset="0"/>
+                <a:ea typeface="+mn-ea"/>
+                <a:cs typeface="Helvetica" panose="020B0604020202020204" pitchFamily="34" charset="0"/>
+              </a:rPr>
+              <a:t>Customer entering the site and browsing through products etc.</a:t>
+            </a:r>
+            <a:endParaRPr kumimoji="0" lang="en-IN" sz="1100" b="1" i="0" u="none" strike="noStrike" kern="1200" cap="none" spc="0" normalizeH="0" baseline="0" noProof="0" dirty="0">
+              <a:ln>
+                <a:noFill/>
+              </a:ln>
+              <a:solidFill>
+                <a:srgbClr val="4F3267"/>
+              </a:solidFill>
+              <a:effectLst/>
+              <a:uLnTx/>
+              <a:uFillTx/>
+              <a:latin typeface="Helvetica" panose="020B0604020202020204" pitchFamily="34" charset="0"/>
+              <a:ea typeface="+mn-ea"/>
+              <a:cs typeface="Helvetica" panose="020B0604020202020204" pitchFamily="34" charset="0"/>
+            </a:endParaRPr>
+          </a:p>
+        </p:txBody>
+      </p:sp>
+      <p:cxnSp>
+        <p:nvCxnSpPr>
+          <p:cNvPr id="43" name="Straight Arrow Connector 42">
+            <a:extLst>
+              <a:ext uri="{FF2B5EF4-FFF2-40B4-BE49-F238E27FC236}">
+                <a16:creationId xmlns:a16="http://schemas.microsoft.com/office/drawing/2014/main" id="{6816D354-8E93-8966-1577-BCB444DF17E7}"/>
+              </a:ext>
+            </a:extLst>
+          </p:cNvPr>
+          <p:cNvCxnSpPr>
+            <a:cxnSpLocks/>
+          </p:cNvCxnSpPr>
+          <p:nvPr/>
+        </p:nvCxnSpPr>
+        <p:spPr>
+          <a:xfrm>
+            <a:off x="3896829" y="1733355"/>
+            <a:ext cx="599899" cy="0"/>
+          </a:xfrm>
+          <a:prstGeom prst="straightConnector1">
+            <a:avLst/>
+          </a:prstGeom>
+          <a:ln>
+            <a:solidFill>
+              <a:srgbClr val="4F3267"/>
+            </a:solidFill>
+            <a:tailEnd type="triangle"/>
+          </a:ln>
+        </p:spPr>
+        <p:style>
+          <a:lnRef idx="1">
+            <a:schemeClr val="accent1"/>
+          </a:lnRef>
+          <a:fillRef idx="0">
+            <a:schemeClr val="accent1"/>
+          </a:fillRef>
+          <a:effectRef idx="0">
+            <a:schemeClr val="accent1"/>
+          </a:effectRef>
+          <a:fontRef idx="minor">
+            <a:schemeClr val="tx1"/>
+          </a:fontRef>
+        </p:style>
+      </p:cxnSp>
+      <p:sp>
+        <p:nvSpPr>
+          <p:cNvPr id="46" name="Rectangle 45">
+            <a:extLst>
+              <a:ext uri="{FF2B5EF4-FFF2-40B4-BE49-F238E27FC236}">
+                <a16:creationId xmlns:a16="http://schemas.microsoft.com/office/drawing/2014/main" id="{887026F8-2043-2BAA-274C-9EA2B1B53DD1}"/>
+              </a:ext>
+            </a:extLst>
+          </p:cNvPr>
+          <p:cNvSpPr/>
+          <p:nvPr/>
+        </p:nvSpPr>
+        <p:spPr>
+          <a:xfrm>
+            <a:off x="5551143" y="2712742"/>
+            <a:ext cx="2381786" cy="789186"/>
+          </a:xfrm>
+          <a:prstGeom prst="rect">
+            <a:avLst/>
+          </a:prstGeom>
+          <a:solidFill>
+            <a:schemeClr val="bg1"/>
+          </a:solidFill>
+          <a:ln>
+            <a:solidFill>
+              <a:srgbClr val="4F3267"/>
+            </a:solidFill>
+          </a:ln>
+        </p:spPr>
+        <p:style>
+          <a:lnRef idx="2">
+            <a:schemeClr val="accent1">
+              <a:shade val="50000"/>
+            </a:schemeClr>
+          </a:lnRef>
+          <a:fillRef idx="1">
+            <a:schemeClr val="accent1"/>
+          </a:fillRef>
+          <a:effectRef idx="0">
+            <a:schemeClr val="accent1"/>
+          </a:effectRef>
+          <a:fontRef idx="minor">
+            <a:schemeClr val="lt1"/>
+          </a:fontRef>
+        </p:style>
+        <p:txBody>
+          <a:bodyPr rtlCol="0" anchor="ctr"/>
+          <a:lstStyle/>
+          <a:p>
+            <a:pPr marL="0" marR="0" lvl="0" indent="0" algn="ctr" defTabSz="914400" rtl="0" eaLnBrk="1" fontAlgn="auto" latinLnBrk="0" hangingPunct="1">
+              <a:lnSpc>
+                <a:spcPct val="100000"/>
+              </a:lnSpc>
+              <a:spcBef>
+                <a:spcPts val="0"/>
+              </a:spcBef>
+              <a:spcAft>
+                <a:spcPts val="0"/>
+              </a:spcAft>
+              <a:buClrTx/>
+              <a:buSzTx/>
+              <a:buFontTx/>
+              <a:buNone/>
+              <a:tabLst/>
+              <a:defRPr/>
+            </a:pPr>
+            <a:r>
+              <a:rPr kumimoji="0" lang="en-US" sz="1100" b="1" i="0" u="none" strike="noStrike" kern="1200" cap="none" spc="0" normalizeH="0" baseline="0" noProof="0" dirty="0">
+                <a:ln>
+                  <a:noFill/>
+                </a:ln>
+                <a:solidFill>
+                  <a:srgbClr val="4F3267"/>
+                </a:solidFill>
+                <a:effectLst/>
+                <a:uLnTx/>
+                <a:uFillTx/>
+                <a:latin typeface="Helvetica" panose="020B0604020202020204" pitchFamily="34" charset="0"/>
+                <a:ea typeface="+mn-ea"/>
+                <a:cs typeface="Helvetica" panose="020B0604020202020204" pitchFamily="34" charset="0"/>
+              </a:rPr>
+              <a:t>Keeping track of all the Activities the customer is doing on the website/app</a:t>
+            </a:r>
+            <a:endParaRPr kumimoji="0" lang="en-IN" sz="1100" b="1" i="0" u="none" strike="noStrike" kern="1200" cap="none" spc="0" normalizeH="0" baseline="0" noProof="0" dirty="0">
+              <a:ln>
+                <a:noFill/>
+              </a:ln>
+              <a:solidFill>
+                <a:srgbClr val="4F3267"/>
+              </a:solidFill>
+              <a:effectLst/>
+              <a:uLnTx/>
+              <a:uFillTx/>
+              <a:latin typeface="Helvetica" panose="020B0604020202020204" pitchFamily="34" charset="0"/>
+              <a:ea typeface="+mn-ea"/>
+              <a:cs typeface="Helvetica" panose="020B0604020202020204" pitchFamily="34" charset="0"/>
+            </a:endParaRPr>
+          </a:p>
+        </p:txBody>
+      </p:sp>
+      <p:pic>
+        <p:nvPicPr>
+          <p:cNvPr id="115" name="Picture 114">
+            <a:extLst>
+              <a:ext uri="{FF2B5EF4-FFF2-40B4-BE49-F238E27FC236}">
+                <a16:creationId xmlns:a16="http://schemas.microsoft.com/office/drawing/2014/main" id="{EC4B2522-9C9E-E9B1-1582-BE8E81BE897C}"/>
+              </a:ext>
+            </a:extLst>
+          </p:cNvPr>
+          <p:cNvPicPr>
+            <a:picLocks noChangeAspect="1"/>
+          </p:cNvPicPr>
+          <p:nvPr/>
+        </p:nvPicPr>
+        <p:blipFill>
+          <a:blip r:embed="rId2"/>
+          <a:stretch>
+            <a:fillRect/>
+          </a:stretch>
+        </p:blipFill>
+        <p:spPr>
+          <a:xfrm>
+            <a:off x="10182225" y="0"/>
+            <a:ext cx="2009775" cy="781050"/>
+          </a:xfrm>
+          <a:prstGeom prst="rect">
+            <a:avLst/>
+          </a:prstGeom>
+        </p:spPr>
+      </p:pic>
+      <p:cxnSp>
+        <p:nvCxnSpPr>
+          <p:cNvPr id="5" name="Straight Arrow Connector 4">
+            <a:extLst>
+              <a:ext uri="{FF2B5EF4-FFF2-40B4-BE49-F238E27FC236}">
+                <a16:creationId xmlns:a16="http://schemas.microsoft.com/office/drawing/2014/main" id="{B5652611-3619-F970-D10C-78A8D7A2E248}"/>
+              </a:ext>
+            </a:extLst>
+          </p:cNvPr>
+          <p:cNvCxnSpPr>
+            <a:cxnSpLocks/>
+          </p:cNvCxnSpPr>
+          <p:nvPr/>
+        </p:nvCxnSpPr>
+        <p:spPr>
+          <a:xfrm>
+            <a:off x="2985110" y="2122833"/>
+            <a:ext cx="0" cy="350758"/>
+          </a:xfrm>
+          <a:prstGeom prst="straightConnector1">
+            <a:avLst/>
+          </a:prstGeom>
+          <a:ln>
+            <a:solidFill>
+              <a:srgbClr val="4F3267"/>
+            </a:solidFill>
+            <a:tailEnd type="triangle"/>
+          </a:ln>
+        </p:spPr>
+        <p:style>
+          <a:lnRef idx="1">
+            <a:schemeClr val="accent1"/>
+          </a:lnRef>
+          <a:fillRef idx="0">
+            <a:schemeClr val="accent1"/>
+          </a:fillRef>
+          <a:effectRef idx="0">
+            <a:schemeClr val="accent1"/>
+          </a:effectRef>
+          <a:fontRef idx="minor">
+            <a:schemeClr val="tx1"/>
+          </a:fontRef>
+        </p:style>
+      </p:cxnSp>
+      <p:cxnSp>
+        <p:nvCxnSpPr>
+          <p:cNvPr id="10" name="Straight Arrow Connector 9">
+            <a:extLst>
+              <a:ext uri="{FF2B5EF4-FFF2-40B4-BE49-F238E27FC236}">
+                <a16:creationId xmlns:a16="http://schemas.microsoft.com/office/drawing/2014/main" id="{1EB2C795-F674-1663-7E10-65B0B7168A65}"/>
+              </a:ext>
+            </a:extLst>
+          </p:cNvPr>
+          <p:cNvCxnSpPr>
+            <a:cxnSpLocks/>
+          </p:cNvCxnSpPr>
+          <p:nvPr/>
+        </p:nvCxnSpPr>
+        <p:spPr>
+          <a:xfrm>
+            <a:off x="5106987" y="2122833"/>
+            <a:ext cx="0" cy="350758"/>
+          </a:xfrm>
+          <a:prstGeom prst="straightConnector1">
+            <a:avLst/>
+          </a:prstGeom>
+          <a:ln>
+            <a:solidFill>
+              <a:srgbClr val="4F3267"/>
+            </a:solidFill>
+            <a:tailEnd type="triangle"/>
+          </a:ln>
+        </p:spPr>
+        <p:style>
+          <a:lnRef idx="1">
+            <a:schemeClr val="accent1"/>
+          </a:lnRef>
+          <a:fillRef idx="0">
+            <a:schemeClr val="accent1"/>
+          </a:fillRef>
+          <a:effectRef idx="0">
+            <a:schemeClr val="accent1"/>
+          </a:effectRef>
+          <a:fontRef idx="minor">
+            <a:schemeClr val="tx1"/>
+          </a:fontRef>
+        </p:style>
+      </p:cxnSp>
+      <p:cxnSp>
+        <p:nvCxnSpPr>
+          <p:cNvPr id="14" name="Straight Arrow Connector 13">
+            <a:extLst>
+              <a:ext uri="{FF2B5EF4-FFF2-40B4-BE49-F238E27FC236}">
+                <a16:creationId xmlns:a16="http://schemas.microsoft.com/office/drawing/2014/main" id="{B58ACE79-8F70-66A7-4EE8-7DAAF8CE1D3F}"/>
+              </a:ext>
+            </a:extLst>
+          </p:cNvPr>
+          <p:cNvCxnSpPr>
+            <a:cxnSpLocks/>
+          </p:cNvCxnSpPr>
+          <p:nvPr/>
+        </p:nvCxnSpPr>
+        <p:spPr>
+          <a:xfrm>
+            <a:off x="7313270" y="2111206"/>
+            <a:ext cx="0" cy="350758"/>
+          </a:xfrm>
+          <a:prstGeom prst="straightConnector1">
+            <a:avLst/>
+          </a:prstGeom>
+          <a:ln>
+            <a:solidFill>
+              <a:srgbClr val="4F3267"/>
+            </a:solidFill>
+            <a:tailEnd type="triangle"/>
+          </a:ln>
+        </p:spPr>
+        <p:style>
+          <a:lnRef idx="1">
+            <a:schemeClr val="accent1"/>
+          </a:lnRef>
+          <a:fillRef idx="0">
+            <a:schemeClr val="accent1"/>
+          </a:fillRef>
+          <a:effectRef idx="0">
+            <a:schemeClr val="accent1"/>
+          </a:effectRef>
+          <a:fontRef idx="minor">
+            <a:schemeClr val="tx1"/>
+          </a:fontRef>
+        </p:style>
+      </p:cxnSp>
+      <p:cxnSp>
+        <p:nvCxnSpPr>
+          <p:cNvPr id="19" name="Straight Arrow Connector 18">
+            <a:extLst>
+              <a:ext uri="{FF2B5EF4-FFF2-40B4-BE49-F238E27FC236}">
+                <a16:creationId xmlns:a16="http://schemas.microsoft.com/office/drawing/2014/main" id="{4C02ACA5-B94C-6679-DD2E-A6FC092E1EEC}"/>
+              </a:ext>
+            </a:extLst>
+          </p:cNvPr>
+          <p:cNvCxnSpPr>
+            <a:cxnSpLocks/>
+          </p:cNvCxnSpPr>
+          <p:nvPr/>
+        </p:nvCxnSpPr>
+        <p:spPr>
+          <a:xfrm flipH="1">
+            <a:off x="8496886" y="1939019"/>
+            <a:ext cx="362023" cy="0"/>
+          </a:xfrm>
+          <a:prstGeom prst="straightConnector1">
+            <a:avLst/>
+          </a:prstGeom>
+          <a:ln>
+            <a:solidFill>
+              <a:srgbClr val="4F3267"/>
+            </a:solidFill>
+            <a:tailEnd type="triangle"/>
+          </a:ln>
+        </p:spPr>
+        <p:style>
+          <a:lnRef idx="1">
+            <a:schemeClr val="accent1"/>
+          </a:lnRef>
+          <a:fillRef idx="0">
+            <a:schemeClr val="accent1"/>
+          </a:fillRef>
+          <a:effectRef idx="0">
+            <a:schemeClr val="accent1"/>
+          </a:effectRef>
+          <a:fontRef idx="minor">
+            <a:schemeClr val="tx1"/>
+          </a:fontRef>
+        </p:style>
+      </p:cxnSp>
+      <p:cxnSp>
+        <p:nvCxnSpPr>
+          <p:cNvPr id="30" name="Straight Arrow Connector 29">
+            <a:extLst>
+              <a:ext uri="{FF2B5EF4-FFF2-40B4-BE49-F238E27FC236}">
+                <a16:creationId xmlns:a16="http://schemas.microsoft.com/office/drawing/2014/main" id="{AA224A0E-4224-CA19-F230-A8E7A5C08742}"/>
+              </a:ext>
+            </a:extLst>
+          </p:cNvPr>
+          <p:cNvCxnSpPr>
+            <a:cxnSpLocks/>
+          </p:cNvCxnSpPr>
+          <p:nvPr/>
+        </p:nvCxnSpPr>
+        <p:spPr>
+          <a:xfrm>
+            <a:off x="8496886" y="1950829"/>
+            <a:ext cx="0" cy="511135"/>
+          </a:xfrm>
+          <a:prstGeom prst="straightConnector1">
+            <a:avLst/>
+          </a:prstGeom>
+          <a:ln>
+            <a:solidFill>
+              <a:srgbClr val="4F3267"/>
+            </a:solidFill>
+            <a:tailEnd type="triangle"/>
+          </a:ln>
+        </p:spPr>
+        <p:style>
+          <a:lnRef idx="1">
+            <a:schemeClr val="accent1"/>
+          </a:lnRef>
+          <a:fillRef idx="0">
+            <a:schemeClr val="accent1"/>
+          </a:fillRef>
+          <a:effectRef idx="0">
+            <a:schemeClr val="accent1"/>
+          </a:effectRef>
+          <a:fontRef idx="minor">
+            <a:schemeClr val="tx1"/>
+          </a:fontRef>
+        </p:style>
+      </p:cxnSp>
+      <p:cxnSp>
+        <p:nvCxnSpPr>
+          <p:cNvPr id="35" name="Straight Connector 34">
+            <a:extLst>
+              <a:ext uri="{FF2B5EF4-FFF2-40B4-BE49-F238E27FC236}">
+                <a16:creationId xmlns:a16="http://schemas.microsoft.com/office/drawing/2014/main" id="{D0A6E3D5-1BED-D826-FBC6-BCBE6FE550C4}"/>
+              </a:ext>
+            </a:extLst>
+          </p:cNvPr>
+          <p:cNvCxnSpPr/>
+          <p:nvPr/>
+        </p:nvCxnSpPr>
+        <p:spPr>
+          <a:xfrm flipV="1">
+            <a:off x="2985110" y="2461964"/>
+            <a:ext cx="5511776" cy="11627"/>
+          </a:xfrm>
+          <a:prstGeom prst="line">
+            <a:avLst/>
+          </a:prstGeom>
+          <a:ln>
+            <a:solidFill>
+              <a:srgbClr val="4F3267"/>
+            </a:solidFill>
+          </a:ln>
+        </p:spPr>
+        <p:style>
+          <a:lnRef idx="1">
+            <a:schemeClr val="accent1"/>
+          </a:lnRef>
+          <a:fillRef idx="0">
+            <a:schemeClr val="accent1"/>
+          </a:fillRef>
+          <a:effectRef idx="0">
+            <a:schemeClr val="accent1"/>
+          </a:effectRef>
+          <a:fontRef idx="minor">
+            <a:schemeClr val="tx1"/>
+          </a:fontRef>
+        </p:style>
+      </p:cxnSp>
+      <p:cxnSp>
+        <p:nvCxnSpPr>
+          <p:cNvPr id="39" name="Straight Arrow Connector 38">
+            <a:extLst>
+              <a:ext uri="{FF2B5EF4-FFF2-40B4-BE49-F238E27FC236}">
+                <a16:creationId xmlns:a16="http://schemas.microsoft.com/office/drawing/2014/main" id="{F852BD38-0D9E-3541-27C3-A1AAEC206F0D}"/>
+              </a:ext>
+            </a:extLst>
+          </p:cNvPr>
+          <p:cNvCxnSpPr>
+            <a:cxnSpLocks/>
+          </p:cNvCxnSpPr>
+          <p:nvPr/>
+        </p:nvCxnSpPr>
+        <p:spPr>
+          <a:xfrm>
+            <a:off x="6742036" y="2473591"/>
+            <a:ext cx="0" cy="239151"/>
+          </a:xfrm>
+          <a:prstGeom prst="straightConnector1">
+            <a:avLst/>
+          </a:prstGeom>
+          <a:ln>
+            <a:solidFill>
+              <a:srgbClr val="4F3267"/>
+            </a:solidFill>
+            <a:tailEnd type="triangle"/>
+          </a:ln>
+        </p:spPr>
+        <p:style>
+          <a:lnRef idx="1">
+            <a:schemeClr val="accent1"/>
+          </a:lnRef>
+          <a:fillRef idx="0">
+            <a:schemeClr val="accent1"/>
+          </a:fillRef>
+          <a:effectRef idx="0">
+            <a:schemeClr val="accent1"/>
+          </a:effectRef>
+          <a:fontRef idx="minor">
+            <a:schemeClr val="tx1"/>
+          </a:fontRef>
+        </p:style>
+      </p:cxnSp>
+      <p:sp>
+        <p:nvSpPr>
+          <p:cNvPr id="40" name="TextBox 39">
+            <a:extLst>
+              <a:ext uri="{FF2B5EF4-FFF2-40B4-BE49-F238E27FC236}">
+                <a16:creationId xmlns:a16="http://schemas.microsoft.com/office/drawing/2014/main" id="{EDA4D46B-1A06-FA1B-38B0-DBA0BD6D69F0}"/>
+              </a:ext>
+            </a:extLst>
+          </p:cNvPr>
+          <p:cNvSpPr txBox="1"/>
+          <p:nvPr/>
+        </p:nvSpPr>
+        <p:spPr>
+          <a:xfrm>
+            <a:off x="427974" y="391786"/>
+            <a:ext cx="6780446" cy="369332"/>
+          </a:xfrm>
+          <a:prstGeom prst="rect">
+            <a:avLst/>
+          </a:prstGeom>
+          <a:noFill/>
+        </p:spPr>
+        <p:txBody>
+          <a:bodyPr wrap="none" rtlCol="0">
+            <a:spAutoFit/>
+          </a:bodyPr>
+          <a:lstStyle/>
+          <a:p>
+            <a:pPr marL="0" marR="0" lvl="0" indent="0" algn="l" defTabSz="914400" rtl="0" eaLnBrk="1" fontAlgn="auto" latinLnBrk="0" hangingPunct="1">
+              <a:lnSpc>
+                <a:spcPct val="100000"/>
+              </a:lnSpc>
+              <a:spcBef>
+                <a:spcPts val="0"/>
+              </a:spcBef>
+              <a:spcAft>
+                <a:spcPts val="0"/>
+              </a:spcAft>
+              <a:buClrTx/>
+              <a:buSzTx/>
+              <a:buFontTx/>
+              <a:buNone/>
+              <a:tabLst/>
+              <a:defRPr/>
+            </a:pPr>
+            <a:r>
+              <a:rPr kumimoji="0" lang="en-US" sz="1800" b="1" i="0" u="none" strike="noStrike" kern="1200" cap="none" spc="0" normalizeH="0" baseline="0" noProof="0" dirty="0">
+                <a:ln>
+                  <a:noFill/>
+                </a:ln>
+                <a:solidFill>
+                  <a:prstClr val="black"/>
+                </a:solidFill>
+                <a:effectLst/>
+                <a:uLnTx/>
+                <a:uFillTx/>
+                <a:latin typeface="Helvetica" panose="020B0604020202020204" pitchFamily="34" charset="0"/>
+                <a:ea typeface="+mn-ea"/>
+                <a:cs typeface="Helvetica" panose="020B0604020202020204" pitchFamily="34" charset="0"/>
+              </a:rPr>
+              <a:t>Detecting/Preventing Suspicious Activities Before Checkout</a:t>
+            </a:r>
+            <a:endParaRPr kumimoji="0" lang="en-IN" sz="1800" b="1" i="0" u="none" strike="noStrike" kern="1200" cap="none" spc="0" normalizeH="0" baseline="0" noProof="0" dirty="0">
+              <a:ln>
+                <a:noFill/>
+              </a:ln>
+              <a:solidFill>
+                <a:prstClr val="black"/>
+              </a:solidFill>
+              <a:effectLst/>
+              <a:uLnTx/>
+              <a:uFillTx/>
+              <a:latin typeface="Helvetica" panose="020B0604020202020204" pitchFamily="34" charset="0"/>
+              <a:ea typeface="+mn-ea"/>
+              <a:cs typeface="Helvetica" panose="020B0604020202020204" pitchFamily="34" charset="0"/>
+            </a:endParaRPr>
+          </a:p>
+        </p:txBody>
+      </p:sp>
+      <p:sp>
+        <p:nvSpPr>
+          <p:cNvPr id="42" name="Diamond 41">
+            <a:extLst>
+              <a:ext uri="{FF2B5EF4-FFF2-40B4-BE49-F238E27FC236}">
+                <a16:creationId xmlns:a16="http://schemas.microsoft.com/office/drawing/2014/main" id="{332D4720-732A-7907-A021-12B5748D2214}"/>
+              </a:ext>
+            </a:extLst>
+          </p:cNvPr>
+          <p:cNvSpPr/>
+          <p:nvPr/>
+        </p:nvSpPr>
+        <p:spPr>
+          <a:xfrm>
+            <a:off x="5793584" y="4018919"/>
+            <a:ext cx="1915509" cy="1352620"/>
+          </a:xfrm>
+          <a:prstGeom prst="diamond">
+            <a:avLst/>
+          </a:prstGeom>
+          <a:solidFill>
+            <a:schemeClr val="bg1"/>
+          </a:solidFill>
+          <a:ln>
+            <a:solidFill>
+              <a:srgbClr val="4F3267"/>
+            </a:solidFill>
+          </a:ln>
+        </p:spPr>
+        <p:style>
+          <a:lnRef idx="2">
+            <a:schemeClr val="accent1">
+              <a:shade val="50000"/>
+            </a:schemeClr>
+          </a:lnRef>
+          <a:fillRef idx="1">
+            <a:schemeClr val="accent1"/>
+          </a:fillRef>
+          <a:effectRef idx="0">
+            <a:schemeClr val="accent1"/>
+          </a:effectRef>
+          <a:fontRef idx="minor">
+            <a:schemeClr val="lt1"/>
+          </a:fontRef>
+        </p:style>
+        <p:txBody>
+          <a:bodyPr rtlCol="0" anchor="ctr"/>
+          <a:lstStyle/>
+          <a:p>
+            <a:pPr marL="0" marR="0" lvl="0" indent="0" algn="ctr" defTabSz="914400" rtl="0" eaLnBrk="1" fontAlgn="auto" latinLnBrk="0" hangingPunct="1">
+              <a:lnSpc>
+                <a:spcPct val="100000"/>
+              </a:lnSpc>
+              <a:spcBef>
+                <a:spcPts val="0"/>
+              </a:spcBef>
+              <a:spcAft>
+                <a:spcPts val="0"/>
+              </a:spcAft>
+              <a:buClrTx/>
+              <a:buSzTx/>
+              <a:buFontTx/>
+              <a:buNone/>
+              <a:tabLst/>
+              <a:defRPr/>
+            </a:pPr>
+            <a:r>
+              <a:rPr kumimoji="0" lang="en-US" sz="1100" b="1" i="0" u="none" strike="noStrike" kern="1200" cap="none" spc="0" normalizeH="0" baseline="0" noProof="0" dirty="0">
+                <a:ln>
+                  <a:noFill/>
+                </a:ln>
+                <a:solidFill>
+                  <a:srgbClr val="4F3267"/>
+                </a:solidFill>
+                <a:effectLst/>
+                <a:uLnTx/>
+                <a:uFillTx/>
+                <a:latin typeface="Helvetica" panose="020B0604020202020204" pitchFamily="34" charset="0"/>
+                <a:ea typeface="+mn-ea"/>
+                <a:cs typeface="Helvetica" panose="020B0604020202020204" pitchFamily="34" charset="0"/>
+              </a:rPr>
+              <a:t>Looks Suspicious?</a:t>
+            </a:r>
+            <a:endParaRPr kumimoji="0" lang="en-IN" sz="1100" b="1" i="0" u="none" strike="noStrike" kern="1200" cap="none" spc="0" normalizeH="0" baseline="0" noProof="0" dirty="0">
+              <a:ln>
+                <a:noFill/>
+              </a:ln>
+              <a:solidFill>
+                <a:srgbClr val="4F3267"/>
+              </a:solidFill>
+              <a:effectLst/>
+              <a:uLnTx/>
+              <a:uFillTx/>
+              <a:latin typeface="Helvetica" panose="020B0604020202020204" pitchFamily="34" charset="0"/>
+              <a:ea typeface="+mn-ea"/>
+              <a:cs typeface="Helvetica" panose="020B0604020202020204" pitchFamily="34" charset="0"/>
+            </a:endParaRPr>
+          </a:p>
+        </p:txBody>
+      </p:sp>
+      <p:cxnSp>
+        <p:nvCxnSpPr>
+          <p:cNvPr id="45" name="Straight Arrow Connector 44">
+            <a:extLst>
+              <a:ext uri="{FF2B5EF4-FFF2-40B4-BE49-F238E27FC236}">
+                <a16:creationId xmlns:a16="http://schemas.microsoft.com/office/drawing/2014/main" id="{5EA69D59-C1F1-7AC4-4230-430F0FCBD6E9}"/>
+              </a:ext>
+            </a:extLst>
+          </p:cNvPr>
+          <p:cNvCxnSpPr>
+            <a:cxnSpLocks/>
+            <a:endCxn id="42" idx="0"/>
+          </p:cNvCxnSpPr>
+          <p:nvPr/>
+        </p:nvCxnSpPr>
+        <p:spPr>
+          <a:xfrm>
+            <a:off x="6742036" y="3501928"/>
+            <a:ext cx="9303" cy="516991"/>
+          </a:xfrm>
+          <a:prstGeom prst="straightConnector1">
+            <a:avLst/>
+          </a:prstGeom>
+          <a:ln>
+            <a:solidFill>
+              <a:srgbClr val="4F3267"/>
+            </a:solidFill>
+            <a:tailEnd type="triangle"/>
+          </a:ln>
+        </p:spPr>
+        <p:style>
+          <a:lnRef idx="1">
+            <a:schemeClr val="accent1"/>
+          </a:lnRef>
+          <a:fillRef idx="0">
+            <a:schemeClr val="accent1"/>
+          </a:fillRef>
+          <a:effectRef idx="0">
+            <a:schemeClr val="accent1"/>
+          </a:effectRef>
+          <a:fontRef idx="minor">
+            <a:schemeClr val="tx1"/>
+          </a:fontRef>
+        </p:style>
+      </p:cxnSp>
+      <p:sp>
+        <p:nvSpPr>
+          <p:cNvPr id="47" name="Rectangle 46">
+            <a:extLst>
+              <a:ext uri="{FF2B5EF4-FFF2-40B4-BE49-F238E27FC236}">
+                <a16:creationId xmlns:a16="http://schemas.microsoft.com/office/drawing/2014/main" id="{3B2A205B-F78D-B134-60B7-6527C4CED6FB}"/>
+              </a:ext>
+            </a:extLst>
+          </p:cNvPr>
+          <p:cNvSpPr/>
+          <p:nvPr/>
+        </p:nvSpPr>
+        <p:spPr>
+          <a:xfrm>
+            <a:off x="8391633" y="4288373"/>
+            <a:ext cx="1915509" cy="778955"/>
+          </a:xfrm>
+          <a:prstGeom prst="rect">
+            <a:avLst/>
+          </a:prstGeom>
+          <a:solidFill>
+            <a:schemeClr val="bg1"/>
+          </a:solidFill>
+          <a:ln>
+            <a:solidFill>
+              <a:srgbClr val="4F3267"/>
+            </a:solidFill>
+          </a:ln>
+        </p:spPr>
+        <p:style>
+          <a:lnRef idx="2">
+            <a:schemeClr val="accent1">
+              <a:shade val="50000"/>
+            </a:schemeClr>
+          </a:lnRef>
+          <a:fillRef idx="1">
+            <a:schemeClr val="accent1"/>
+          </a:fillRef>
+          <a:effectRef idx="0">
+            <a:schemeClr val="accent1"/>
+          </a:effectRef>
+          <a:fontRef idx="minor">
+            <a:schemeClr val="lt1"/>
+          </a:fontRef>
+        </p:style>
+        <p:txBody>
+          <a:bodyPr rtlCol="0" anchor="ctr"/>
+          <a:lstStyle/>
+          <a:p>
+            <a:pPr marL="0" marR="0" lvl="0" indent="0" algn="ctr" defTabSz="914400" rtl="0" eaLnBrk="1" fontAlgn="auto" latinLnBrk="0" hangingPunct="1">
+              <a:lnSpc>
+                <a:spcPct val="100000"/>
+              </a:lnSpc>
+              <a:spcBef>
+                <a:spcPts val="0"/>
+              </a:spcBef>
+              <a:spcAft>
+                <a:spcPts val="0"/>
+              </a:spcAft>
+              <a:buClrTx/>
+              <a:buSzTx/>
+              <a:buFontTx/>
+              <a:buNone/>
+              <a:tabLst/>
+              <a:defRPr/>
+            </a:pPr>
+            <a:r>
+              <a:rPr kumimoji="0" lang="en-US" sz="1100" b="1" i="0" u="none" strike="noStrike" kern="1200" cap="none" spc="0" normalizeH="0" baseline="0" noProof="0" dirty="0">
+                <a:ln>
+                  <a:noFill/>
+                </a:ln>
+                <a:solidFill>
+                  <a:srgbClr val="4F3267"/>
+                </a:solidFill>
+                <a:effectLst/>
+                <a:uLnTx/>
+                <a:uFillTx/>
+                <a:latin typeface="Helvetica" panose="020B0604020202020204" pitchFamily="34" charset="0"/>
+                <a:ea typeface="+mn-ea"/>
+                <a:cs typeface="Helvetica" panose="020B0604020202020204" pitchFamily="34" charset="0"/>
+              </a:rPr>
+              <a:t>Let the customer continue app/website and product browsing</a:t>
+            </a:r>
+            <a:endParaRPr kumimoji="0" lang="en-IN" sz="1100" b="1" i="0" u="none" strike="noStrike" kern="1200" cap="none" spc="0" normalizeH="0" baseline="0" noProof="0" dirty="0">
+              <a:ln>
+                <a:noFill/>
+              </a:ln>
+              <a:solidFill>
+                <a:srgbClr val="4F3267"/>
+              </a:solidFill>
+              <a:effectLst/>
+              <a:uLnTx/>
+              <a:uFillTx/>
+              <a:latin typeface="Helvetica" panose="020B0604020202020204" pitchFamily="34" charset="0"/>
+              <a:ea typeface="+mn-ea"/>
+              <a:cs typeface="Helvetica" panose="020B0604020202020204" pitchFamily="34" charset="0"/>
+            </a:endParaRPr>
+          </a:p>
+        </p:txBody>
+      </p:sp>
+      <p:cxnSp>
+        <p:nvCxnSpPr>
+          <p:cNvPr id="48" name="Straight Arrow Connector 47">
+            <a:extLst>
+              <a:ext uri="{FF2B5EF4-FFF2-40B4-BE49-F238E27FC236}">
+                <a16:creationId xmlns:a16="http://schemas.microsoft.com/office/drawing/2014/main" id="{05B90517-B59A-F423-CD39-6A30C106C358}"/>
+              </a:ext>
+            </a:extLst>
+          </p:cNvPr>
+          <p:cNvCxnSpPr>
+            <a:cxnSpLocks/>
+            <a:stCxn id="42" idx="3"/>
+            <a:endCxn id="47" idx="1"/>
+          </p:cNvCxnSpPr>
+          <p:nvPr/>
+        </p:nvCxnSpPr>
+        <p:spPr>
+          <a:xfrm flipV="1">
+            <a:off x="7709093" y="4677851"/>
+            <a:ext cx="682540" cy="17378"/>
+          </a:xfrm>
+          <a:prstGeom prst="straightConnector1">
+            <a:avLst/>
+          </a:prstGeom>
+          <a:ln>
+            <a:solidFill>
+              <a:srgbClr val="4F3267"/>
+            </a:solidFill>
+            <a:tailEnd type="triangle"/>
+          </a:ln>
+        </p:spPr>
+        <p:style>
+          <a:lnRef idx="1">
+            <a:schemeClr val="accent1"/>
+          </a:lnRef>
+          <a:fillRef idx="0">
+            <a:schemeClr val="accent1"/>
+          </a:fillRef>
+          <a:effectRef idx="0">
+            <a:schemeClr val="accent1"/>
+          </a:effectRef>
+          <a:fontRef idx="minor">
+            <a:schemeClr val="tx1"/>
+          </a:fontRef>
+        </p:style>
+      </p:cxnSp>
+      <p:sp>
+        <p:nvSpPr>
+          <p:cNvPr id="51" name="TextBox 50">
+            <a:extLst>
+              <a:ext uri="{FF2B5EF4-FFF2-40B4-BE49-F238E27FC236}">
+                <a16:creationId xmlns:a16="http://schemas.microsoft.com/office/drawing/2014/main" id="{6868AD7D-37A4-0D9F-9CC4-F9EE189C0967}"/>
+              </a:ext>
+            </a:extLst>
+          </p:cNvPr>
+          <p:cNvSpPr txBox="1"/>
+          <p:nvPr/>
+        </p:nvSpPr>
+        <p:spPr>
+          <a:xfrm>
+            <a:off x="7770444" y="4365722"/>
+            <a:ext cx="464282" cy="261610"/>
+          </a:xfrm>
+          <a:prstGeom prst="rect">
+            <a:avLst/>
+          </a:prstGeom>
+          <a:noFill/>
+          <a:ln>
+            <a:noFill/>
+          </a:ln>
+        </p:spPr>
+        <p:txBody>
+          <a:bodyPr wrap="square" rtlCol="0">
+            <a:spAutoFit/>
+          </a:bodyPr>
+          <a:lstStyle/>
+          <a:p>
+            <a:pPr marL="0" marR="0" lvl="0" indent="0" algn="l" defTabSz="914400" rtl="0" eaLnBrk="1" fontAlgn="auto" latinLnBrk="0" hangingPunct="1">
+              <a:lnSpc>
+                <a:spcPct val="100000"/>
+              </a:lnSpc>
+              <a:spcBef>
+                <a:spcPts val="0"/>
+              </a:spcBef>
+              <a:spcAft>
+                <a:spcPts val="0"/>
+              </a:spcAft>
+              <a:buClrTx/>
+              <a:buSzTx/>
+              <a:buFontTx/>
+              <a:buNone/>
+              <a:tabLst/>
+              <a:defRPr/>
+            </a:pPr>
+            <a:r>
+              <a:rPr kumimoji="0" lang="en-US" sz="1100" b="1" i="0" u="none" strike="noStrike" kern="1200" cap="none" spc="0" normalizeH="0" baseline="0" noProof="0" dirty="0">
+                <a:ln>
+                  <a:noFill/>
+                </a:ln>
+                <a:solidFill>
+                  <a:srgbClr val="4F3267"/>
+                </a:solidFill>
+                <a:effectLst/>
+                <a:uLnTx/>
+                <a:uFillTx/>
+                <a:latin typeface="Helvetica" panose="020B0604020202020204" pitchFamily="34" charset="0"/>
+                <a:ea typeface="+mn-ea"/>
+                <a:cs typeface="Helvetica" panose="020B0604020202020204" pitchFamily="34" charset="0"/>
+              </a:rPr>
+              <a:t>No</a:t>
+            </a:r>
+            <a:endParaRPr kumimoji="0" lang="en-IN" sz="1100" b="1" i="0" u="none" strike="noStrike" kern="1200" cap="none" spc="0" normalizeH="0" baseline="0" noProof="0" dirty="0">
+              <a:ln>
+                <a:noFill/>
+              </a:ln>
+              <a:solidFill>
+                <a:srgbClr val="4F3267"/>
+              </a:solidFill>
+              <a:effectLst/>
+              <a:uLnTx/>
+              <a:uFillTx/>
+              <a:latin typeface="Helvetica" panose="020B0604020202020204" pitchFamily="34" charset="0"/>
+              <a:ea typeface="+mn-ea"/>
+              <a:cs typeface="Helvetica" panose="020B0604020202020204" pitchFamily="34" charset="0"/>
+            </a:endParaRPr>
+          </a:p>
+        </p:txBody>
+      </p:sp>
+      <p:cxnSp>
+        <p:nvCxnSpPr>
+          <p:cNvPr id="59" name="Straight Arrow Connector 58">
+            <a:extLst>
+              <a:ext uri="{FF2B5EF4-FFF2-40B4-BE49-F238E27FC236}">
+                <a16:creationId xmlns:a16="http://schemas.microsoft.com/office/drawing/2014/main" id="{61FDBCE0-0B18-E498-CA3E-B8B951FABF48}"/>
+              </a:ext>
+            </a:extLst>
+          </p:cNvPr>
+          <p:cNvCxnSpPr>
+            <a:cxnSpLocks/>
+            <a:stCxn id="42" idx="1"/>
+          </p:cNvCxnSpPr>
+          <p:nvPr/>
+        </p:nvCxnSpPr>
+        <p:spPr>
+          <a:xfrm flipH="1">
+            <a:off x="5298627" y="4695229"/>
+            <a:ext cx="494957" cy="0"/>
+          </a:xfrm>
+          <a:prstGeom prst="straightConnector1">
+            <a:avLst/>
+          </a:prstGeom>
+          <a:ln>
+            <a:solidFill>
+              <a:srgbClr val="4F3267"/>
+            </a:solidFill>
+            <a:tailEnd type="triangle"/>
+          </a:ln>
+        </p:spPr>
+        <p:style>
+          <a:lnRef idx="1">
+            <a:schemeClr val="accent1"/>
+          </a:lnRef>
+          <a:fillRef idx="0">
+            <a:schemeClr val="accent1"/>
+          </a:fillRef>
+          <a:effectRef idx="0">
+            <a:schemeClr val="accent1"/>
+          </a:effectRef>
+          <a:fontRef idx="minor">
+            <a:schemeClr val="tx1"/>
+          </a:fontRef>
+        </p:style>
+      </p:cxnSp>
+      <p:sp>
+        <p:nvSpPr>
+          <p:cNvPr id="60" name="TextBox 59">
+            <a:extLst>
+              <a:ext uri="{FF2B5EF4-FFF2-40B4-BE49-F238E27FC236}">
+                <a16:creationId xmlns:a16="http://schemas.microsoft.com/office/drawing/2014/main" id="{9971755B-2716-3FF4-93D6-F14739F2FED2}"/>
+              </a:ext>
+            </a:extLst>
+          </p:cNvPr>
+          <p:cNvSpPr txBox="1"/>
+          <p:nvPr/>
+        </p:nvSpPr>
+        <p:spPr>
+          <a:xfrm>
+            <a:off x="5298627" y="4433619"/>
+            <a:ext cx="464282" cy="261610"/>
+          </a:xfrm>
+          <a:prstGeom prst="rect">
+            <a:avLst/>
+          </a:prstGeom>
+          <a:noFill/>
+          <a:ln>
+            <a:noFill/>
+          </a:ln>
+        </p:spPr>
+        <p:txBody>
+          <a:bodyPr wrap="square" rtlCol="0">
+            <a:spAutoFit/>
+          </a:bodyPr>
+          <a:lstStyle/>
+          <a:p>
+            <a:pPr marL="0" marR="0" lvl="0" indent="0" algn="l" defTabSz="914400" rtl="0" eaLnBrk="1" fontAlgn="auto" latinLnBrk="0" hangingPunct="1">
+              <a:lnSpc>
+                <a:spcPct val="100000"/>
+              </a:lnSpc>
+              <a:spcBef>
+                <a:spcPts val="0"/>
+              </a:spcBef>
+              <a:spcAft>
+                <a:spcPts val="0"/>
+              </a:spcAft>
+              <a:buClrTx/>
+              <a:buSzTx/>
+              <a:buFontTx/>
+              <a:buNone/>
+              <a:tabLst/>
+              <a:defRPr/>
+            </a:pPr>
+            <a:r>
+              <a:rPr kumimoji="0" lang="en-US" sz="1100" b="1" i="0" u="none" strike="noStrike" kern="1200" cap="none" spc="0" normalizeH="0" baseline="0" noProof="0" dirty="0">
+                <a:ln>
+                  <a:noFill/>
+                </a:ln>
+                <a:solidFill>
+                  <a:srgbClr val="4F3267"/>
+                </a:solidFill>
+                <a:effectLst/>
+                <a:uLnTx/>
+                <a:uFillTx/>
+                <a:latin typeface="Helvetica" panose="020B0604020202020204" pitchFamily="34" charset="0"/>
+                <a:ea typeface="+mn-ea"/>
+                <a:cs typeface="Helvetica" panose="020B0604020202020204" pitchFamily="34" charset="0"/>
+              </a:rPr>
+              <a:t>Yes</a:t>
+            </a:r>
+            <a:endParaRPr kumimoji="0" lang="en-IN" sz="1100" b="1" i="0" u="none" strike="noStrike" kern="1200" cap="none" spc="0" normalizeH="0" baseline="0" noProof="0" dirty="0">
+              <a:ln>
+                <a:noFill/>
+              </a:ln>
+              <a:solidFill>
+                <a:srgbClr val="4F3267"/>
+              </a:solidFill>
+              <a:effectLst/>
+              <a:uLnTx/>
+              <a:uFillTx/>
+              <a:latin typeface="Helvetica" panose="020B0604020202020204" pitchFamily="34" charset="0"/>
+              <a:ea typeface="+mn-ea"/>
+              <a:cs typeface="Helvetica" panose="020B0604020202020204" pitchFamily="34" charset="0"/>
+            </a:endParaRPr>
+          </a:p>
+        </p:txBody>
+      </p:sp>
+      <p:sp>
+        <p:nvSpPr>
+          <p:cNvPr id="63" name="Oval 62">
+            <a:extLst>
+              <a:ext uri="{FF2B5EF4-FFF2-40B4-BE49-F238E27FC236}">
+                <a16:creationId xmlns:a16="http://schemas.microsoft.com/office/drawing/2014/main" id="{78C7C395-E593-33B6-D213-EB932A3E7ABB}"/>
+              </a:ext>
+            </a:extLst>
+          </p:cNvPr>
+          <p:cNvSpPr/>
+          <p:nvPr/>
+        </p:nvSpPr>
+        <p:spPr>
+          <a:xfrm>
+            <a:off x="3818197" y="4018919"/>
+            <a:ext cx="1475492" cy="1352620"/>
+          </a:xfrm>
+          <a:prstGeom prst="ellipse">
+            <a:avLst/>
+          </a:prstGeom>
+          <a:solidFill>
+            <a:schemeClr val="bg1"/>
+          </a:solidFill>
+          <a:ln>
+            <a:solidFill>
+              <a:srgbClr val="4F3267"/>
+            </a:solidFill>
+          </a:ln>
+        </p:spPr>
+        <p:style>
+          <a:lnRef idx="2">
+            <a:schemeClr val="accent1">
+              <a:shade val="50000"/>
+            </a:schemeClr>
+          </a:lnRef>
+          <a:fillRef idx="1">
+            <a:schemeClr val="accent1"/>
+          </a:fillRef>
+          <a:effectRef idx="0">
+            <a:schemeClr val="accent1"/>
+          </a:effectRef>
+          <a:fontRef idx="minor">
+            <a:schemeClr val="lt1"/>
+          </a:fontRef>
+        </p:style>
+        <p:txBody>
+          <a:bodyPr rtlCol="0" anchor="ctr"/>
+          <a:lstStyle/>
+          <a:p>
+            <a:pPr marL="0" marR="0" lvl="0" indent="0" algn="ctr" defTabSz="914400" rtl="0" eaLnBrk="1" fontAlgn="auto" latinLnBrk="0" hangingPunct="1">
+              <a:lnSpc>
+                <a:spcPct val="100000"/>
+              </a:lnSpc>
+              <a:spcBef>
+                <a:spcPts val="0"/>
+              </a:spcBef>
+              <a:spcAft>
+                <a:spcPts val="0"/>
+              </a:spcAft>
+              <a:buClrTx/>
+              <a:buSzTx/>
+              <a:buFontTx/>
+              <a:buNone/>
+              <a:tabLst/>
+              <a:defRPr/>
+            </a:pPr>
+            <a:r>
+              <a:rPr kumimoji="0" lang="en-US" sz="1100" b="1" i="0" u="none" strike="noStrike" kern="1200" cap="none" spc="0" normalizeH="0" baseline="0" noProof="0" dirty="0">
+                <a:ln>
+                  <a:noFill/>
+                </a:ln>
+                <a:solidFill>
+                  <a:srgbClr val="4F3267"/>
+                </a:solidFill>
+                <a:effectLst/>
+                <a:uLnTx/>
+                <a:uFillTx/>
+                <a:latin typeface="Helvetica" panose="020B0604020202020204" pitchFamily="34" charset="0"/>
+                <a:ea typeface="+mn-ea"/>
+                <a:cs typeface="Helvetica" panose="020B0604020202020204" pitchFamily="34" charset="0"/>
+              </a:rPr>
+              <a:t>Raise appropriate triggers to review customer’s online activity</a:t>
+            </a:r>
+            <a:endParaRPr kumimoji="0" lang="en-IN" sz="1100" b="1" i="0" u="none" strike="noStrike" kern="1200" cap="none" spc="0" normalizeH="0" baseline="0" noProof="0" dirty="0">
+              <a:ln>
+                <a:noFill/>
+              </a:ln>
+              <a:solidFill>
+                <a:srgbClr val="4F3267"/>
+              </a:solidFill>
+              <a:effectLst/>
+              <a:uLnTx/>
+              <a:uFillTx/>
+              <a:latin typeface="Helvetica" panose="020B0604020202020204" pitchFamily="34" charset="0"/>
+              <a:ea typeface="+mn-ea"/>
+              <a:cs typeface="Helvetica" panose="020B0604020202020204" pitchFamily="34" charset="0"/>
+            </a:endParaRPr>
+          </a:p>
+        </p:txBody>
+      </p:sp>
+      <p:cxnSp>
+        <p:nvCxnSpPr>
+          <p:cNvPr id="65" name="Straight Connector 64">
+            <a:extLst>
+              <a:ext uri="{FF2B5EF4-FFF2-40B4-BE49-F238E27FC236}">
+                <a16:creationId xmlns:a16="http://schemas.microsoft.com/office/drawing/2014/main" id="{95CAD9D0-08FB-75C9-1ACA-ECE75B2DF13E}"/>
+              </a:ext>
+            </a:extLst>
+          </p:cNvPr>
+          <p:cNvCxnSpPr>
+            <a:cxnSpLocks/>
+          </p:cNvCxnSpPr>
+          <p:nvPr/>
+        </p:nvCxnSpPr>
+        <p:spPr>
+          <a:xfrm>
+            <a:off x="10330395" y="4655699"/>
+            <a:ext cx="856717" cy="0"/>
+          </a:xfrm>
+          <a:prstGeom prst="line">
+            <a:avLst/>
+          </a:prstGeom>
+          <a:ln>
+            <a:solidFill>
+              <a:srgbClr val="4F3267"/>
+            </a:solidFill>
+          </a:ln>
+        </p:spPr>
+        <p:style>
+          <a:lnRef idx="1">
+            <a:schemeClr val="accent1"/>
+          </a:lnRef>
+          <a:fillRef idx="0">
+            <a:schemeClr val="accent1"/>
+          </a:fillRef>
+          <a:effectRef idx="0">
+            <a:schemeClr val="accent1"/>
+          </a:effectRef>
+          <a:fontRef idx="minor">
+            <a:schemeClr val="tx1"/>
+          </a:fontRef>
+        </p:style>
+      </p:cxnSp>
+      <p:cxnSp>
+        <p:nvCxnSpPr>
+          <p:cNvPr id="68" name="Straight Connector 67">
+            <a:extLst>
+              <a:ext uri="{FF2B5EF4-FFF2-40B4-BE49-F238E27FC236}">
+                <a16:creationId xmlns:a16="http://schemas.microsoft.com/office/drawing/2014/main" id="{4BDBB0A6-E230-4A5D-AE73-6F79573D3600}"/>
+              </a:ext>
+            </a:extLst>
+          </p:cNvPr>
+          <p:cNvCxnSpPr>
+            <a:cxnSpLocks/>
+          </p:cNvCxnSpPr>
+          <p:nvPr/>
+        </p:nvCxnSpPr>
+        <p:spPr>
+          <a:xfrm flipV="1">
+            <a:off x="11187112" y="975160"/>
+            <a:ext cx="0" cy="3682318"/>
+          </a:xfrm>
+          <a:prstGeom prst="line">
+            <a:avLst/>
+          </a:prstGeom>
+          <a:ln>
+            <a:solidFill>
+              <a:srgbClr val="4F3267"/>
+            </a:solidFill>
+          </a:ln>
+        </p:spPr>
+        <p:style>
+          <a:lnRef idx="1">
+            <a:schemeClr val="accent1"/>
+          </a:lnRef>
+          <a:fillRef idx="0">
+            <a:schemeClr val="accent1"/>
+          </a:fillRef>
+          <a:effectRef idx="0">
+            <a:schemeClr val="accent1"/>
+          </a:effectRef>
+          <a:fontRef idx="minor">
+            <a:schemeClr val="tx1"/>
+          </a:fontRef>
+        </p:style>
+      </p:cxnSp>
+      <p:cxnSp>
+        <p:nvCxnSpPr>
+          <p:cNvPr id="76" name="Straight Connector 75">
+            <a:extLst>
+              <a:ext uri="{FF2B5EF4-FFF2-40B4-BE49-F238E27FC236}">
+                <a16:creationId xmlns:a16="http://schemas.microsoft.com/office/drawing/2014/main" id="{76C983B4-DF37-E7F5-0CA0-0F2EF30FBA0D}"/>
+              </a:ext>
+            </a:extLst>
+          </p:cNvPr>
+          <p:cNvCxnSpPr>
+            <a:cxnSpLocks/>
+          </p:cNvCxnSpPr>
+          <p:nvPr/>
+        </p:nvCxnSpPr>
+        <p:spPr>
+          <a:xfrm flipV="1">
+            <a:off x="2986878" y="955856"/>
+            <a:ext cx="8200234" cy="19304"/>
+          </a:xfrm>
+          <a:prstGeom prst="line">
+            <a:avLst/>
+          </a:prstGeom>
+          <a:ln>
+            <a:solidFill>
+              <a:srgbClr val="4F3267"/>
+            </a:solidFill>
+          </a:ln>
+        </p:spPr>
+        <p:style>
+          <a:lnRef idx="1">
+            <a:schemeClr val="accent1"/>
+          </a:lnRef>
+          <a:fillRef idx="0">
+            <a:schemeClr val="accent1"/>
+          </a:fillRef>
+          <a:effectRef idx="0">
+            <a:schemeClr val="accent1"/>
+          </a:effectRef>
+          <a:fontRef idx="minor">
+            <a:schemeClr val="tx1"/>
+          </a:fontRef>
+        </p:style>
+      </p:cxnSp>
+      <p:cxnSp>
+        <p:nvCxnSpPr>
+          <p:cNvPr id="82" name="Straight Arrow Connector 81">
+            <a:extLst>
+              <a:ext uri="{FF2B5EF4-FFF2-40B4-BE49-F238E27FC236}">
+                <a16:creationId xmlns:a16="http://schemas.microsoft.com/office/drawing/2014/main" id="{EE5C45FB-D680-F511-6E74-1DD6D551430E}"/>
+              </a:ext>
+            </a:extLst>
+          </p:cNvPr>
+          <p:cNvCxnSpPr>
+            <a:cxnSpLocks/>
+          </p:cNvCxnSpPr>
+          <p:nvPr/>
+        </p:nvCxnSpPr>
+        <p:spPr>
+          <a:xfrm>
+            <a:off x="2985110" y="979052"/>
+            <a:ext cx="0" cy="350758"/>
+          </a:xfrm>
+          <a:prstGeom prst="straightConnector1">
+            <a:avLst/>
+          </a:prstGeom>
+          <a:ln>
+            <a:solidFill>
+              <a:srgbClr val="4F3267"/>
+            </a:solidFill>
+            <a:tailEnd type="triangle"/>
+          </a:ln>
+        </p:spPr>
+        <p:style>
+          <a:lnRef idx="1">
+            <a:schemeClr val="accent1"/>
+          </a:lnRef>
+          <a:fillRef idx="0">
+            <a:schemeClr val="accent1"/>
+          </a:fillRef>
+          <a:effectRef idx="0">
+            <a:schemeClr val="accent1"/>
+          </a:effectRef>
+          <a:fontRef idx="minor">
+            <a:schemeClr val="tx1"/>
+          </a:fontRef>
+        </p:style>
+      </p:cxnSp>
+      <p:cxnSp>
+        <p:nvCxnSpPr>
+          <p:cNvPr id="84" name="Straight Arrow Connector 83">
+            <a:extLst>
+              <a:ext uri="{FF2B5EF4-FFF2-40B4-BE49-F238E27FC236}">
+                <a16:creationId xmlns:a16="http://schemas.microsoft.com/office/drawing/2014/main" id="{20461D50-7035-A624-16B9-6ECA9E8F4A08}"/>
+              </a:ext>
+            </a:extLst>
+          </p:cNvPr>
+          <p:cNvCxnSpPr>
+            <a:cxnSpLocks/>
+          </p:cNvCxnSpPr>
+          <p:nvPr/>
+        </p:nvCxnSpPr>
+        <p:spPr>
+          <a:xfrm>
+            <a:off x="5114838" y="975160"/>
+            <a:ext cx="0" cy="368718"/>
+          </a:xfrm>
+          <a:prstGeom prst="straightConnector1">
+            <a:avLst/>
+          </a:prstGeom>
+          <a:ln>
+            <a:solidFill>
+              <a:srgbClr val="4F3267"/>
+            </a:solidFill>
+            <a:tailEnd type="triangle"/>
+          </a:ln>
+        </p:spPr>
+        <p:style>
+          <a:lnRef idx="1">
+            <a:schemeClr val="accent1"/>
+          </a:lnRef>
+          <a:fillRef idx="0">
+            <a:schemeClr val="accent1"/>
+          </a:fillRef>
+          <a:effectRef idx="0">
+            <a:schemeClr val="accent1"/>
+          </a:effectRef>
+          <a:fontRef idx="minor">
+            <a:schemeClr val="tx1"/>
+          </a:fontRef>
+        </p:style>
+      </p:cxnSp>
+      <p:cxnSp>
+        <p:nvCxnSpPr>
+          <p:cNvPr id="86" name="Straight Arrow Connector 85">
+            <a:extLst>
+              <a:ext uri="{FF2B5EF4-FFF2-40B4-BE49-F238E27FC236}">
+                <a16:creationId xmlns:a16="http://schemas.microsoft.com/office/drawing/2014/main" id="{96F4068D-5244-CBD0-A576-B032BCDCD68E}"/>
+              </a:ext>
+            </a:extLst>
+          </p:cNvPr>
+          <p:cNvCxnSpPr>
+            <a:cxnSpLocks/>
+          </p:cNvCxnSpPr>
+          <p:nvPr/>
+        </p:nvCxnSpPr>
+        <p:spPr>
+          <a:xfrm>
+            <a:off x="7259968" y="955856"/>
+            <a:ext cx="0" cy="368718"/>
+          </a:xfrm>
+          <a:prstGeom prst="straightConnector1">
+            <a:avLst/>
+          </a:prstGeom>
+          <a:ln>
+            <a:solidFill>
+              <a:srgbClr val="4F3267"/>
+            </a:solidFill>
+            <a:tailEnd type="triangle"/>
+          </a:ln>
+        </p:spPr>
+        <p:style>
+          <a:lnRef idx="1">
+            <a:schemeClr val="accent1"/>
+          </a:lnRef>
+          <a:fillRef idx="0">
+            <a:schemeClr val="accent1"/>
+          </a:fillRef>
+          <a:effectRef idx="0">
+            <a:schemeClr val="accent1"/>
+          </a:effectRef>
+          <a:fontRef idx="minor">
+            <a:schemeClr val="tx1"/>
+          </a:fontRef>
+        </p:style>
+      </p:cxnSp>
+      <p:cxnSp>
+        <p:nvCxnSpPr>
+          <p:cNvPr id="87" name="Straight Arrow Connector 86">
+            <a:extLst>
+              <a:ext uri="{FF2B5EF4-FFF2-40B4-BE49-F238E27FC236}">
+                <a16:creationId xmlns:a16="http://schemas.microsoft.com/office/drawing/2014/main" id="{775DD039-B4B6-9345-90FA-61BEE5271023}"/>
+              </a:ext>
+            </a:extLst>
+          </p:cNvPr>
+          <p:cNvCxnSpPr>
+            <a:cxnSpLocks/>
+          </p:cNvCxnSpPr>
+          <p:nvPr/>
+        </p:nvCxnSpPr>
+        <p:spPr>
+          <a:xfrm>
+            <a:off x="9461357" y="970072"/>
+            <a:ext cx="0" cy="368718"/>
+          </a:xfrm>
+          <a:prstGeom prst="straightConnector1">
+            <a:avLst/>
+          </a:prstGeom>
+          <a:ln>
+            <a:solidFill>
+              <a:srgbClr val="4F3267"/>
+            </a:solidFill>
+            <a:tailEnd type="triangle"/>
+          </a:ln>
+        </p:spPr>
+        <p:style>
+          <a:lnRef idx="1">
+            <a:schemeClr val="accent1"/>
+          </a:lnRef>
+          <a:fillRef idx="0">
+            <a:schemeClr val="accent1"/>
+          </a:fillRef>
+          <a:effectRef idx="0">
+            <a:schemeClr val="accent1"/>
+          </a:effectRef>
+          <a:fontRef idx="minor">
+            <a:schemeClr val="tx1"/>
+          </a:fontRef>
+        </p:style>
+      </p:cxnSp>
+      <p:sp>
+        <p:nvSpPr>
+          <p:cNvPr id="93" name="Rectangle 92">
+            <a:extLst>
+              <a:ext uri="{FF2B5EF4-FFF2-40B4-BE49-F238E27FC236}">
+                <a16:creationId xmlns:a16="http://schemas.microsoft.com/office/drawing/2014/main" id="{54C02C48-B9BC-1492-2874-A31BF102E826}"/>
+              </a:ext>
+            </a:extLst>
+          </p:cNvPr>
+          <p:cNvSpPr/>
+          <p:nvPr/>
+        </p:nvSpPr>
+        <p:spPr>
+          <a:xfrm>
+            <a:off x="1034533" y="3086669"/>
+            <a:ext cx="2381786" cy="733872"/>
+          </a:xfrm>
+          <a:prstGeom prst="rect">
+            <a:avLst/>
+          </a:prstGeom>
+          <a:solidFill>
+            <a:schemeClr val="bg1"/>
+          </a:solidFill>
+          <a:ln>
+            <a:solidFill>
+              <a:srgbClr val="4F3267"/>
+            </a:solidFill>
+          </a:ln>
+        </p:spPr>
+        <p:style>
+          <a:lnRef idx="2">
+            <a:schemeClr val="accent1">
+              <a:shade val="50000"/>
+            </a:schemeClr>
+          </a:lnRef>
+          <a:fillRef idx="1">
+            <a:schemeClr val="accent1"/>
+          </a:fillRef>
+          <a:effectRef idx="0">
+            <a:schemeClr val="accent1"/>
+          </a:effectRef>
+          <a:fontRef idx="minor">
+            <a:schemeClr val="lt1"/>
+          </a:fontRef>
+        </p:style>
+        <p:txBody>
+          <a:bodyPr rtlCol="0" anchor="ctr"/>
+          <a:lstStyle/>
+          <a:p>
+            <a:pPr marL="0" marR="0" lvl="0" indent="0" algn="ctr" defTabSz="914400" rtl="0" eaLnBrk="1" fontAlgn="auto" latinLnBrk="0" hangingPunct="1">
+              <a:lnSpc>
+                <a:spcPct val="100000"/>
+              </a:lnSpc>
+              <a:spcBef>
+                <a:spcPts val="0"/>
+              </a:spcBef>
+              <a:spcAft>
+                <a:spcPts val="0"/>
+              </a:spcAft>
+              <a:buClrTx/>
+              <a:buSzTx/>
+              <a:buFontTx/>
+              <a:buNone/>
+              <a:tabLst/>
+              <a:defRPr/>
+            </a:pPr>
+            <a:r>
+              <a:rPr kumimoji="0" lang="en-US" sz="1100" b="1" i="0" u="none" strike="noStrike" kern="1200" cap="none" spc="0" normalizeH="0" baseline="0" noProof="0" dirty="0">
+                <a:ln>
+                  <a:noFill/>
+                </a:ln>
+                <a:solidFill>
+                  <a:srgbClr val="4F3267"/>
+                </a:solidFill>
+                <a:effectLst/>
+                <a:uLnTx/>
+                <a:uFillTx/>
+                <a:latin typeface="Helvetica" panose="020B0604020202020204" pitchFamily="34" charset="0"/>
+                <a:ea typeface="+mn-ea"/>
+                <a:cs typeface="Helvetica" panose="020B0604020202020204" pitchFamily="34" charset="0"/>
+              </a:rPr>
+              <a:t>Validate IP/Pincode and check if customer is browsing from some suspicious location per Caratlane tagging</a:t>
+            </a:r>
+            <a:endParaRPr kumimoji="0" lang="en-IN" sz="1100" b="1" i="0" u="none" strike="noStrike" kern="1200" cap="none" spc="0" normalizeH="0" baseline="0" noProof="0" dirty="0">
+              <a:ln>
+                <a:noFill/>
+              </a:ln>
+              <a:solidFill>
+                <a:srgbClr val="4F3267"/>
+              </a:solidFill>
+              <a:effectLst/>
+              <a:uLnTx/>
+              <a:uFillTx/>
+              <a:latin typeface="Helvetica" panose="020B0604020202020204" pitchFamily="34" charset="0"/>
+              <a:ea typeface="+mn-ea"/>
+              <a:cs typeface="Helvetica" panose="020B0604020202020204" pitchFamily="34" charset="0"/>
+            </a:endParaRPr>
+          </a:p>
+        </p:txBody>
+      </p:sp>
+      <p:sp>
+        <p:nvSpPr>
+          <p:cNvPr id="94" name="Rectangle 93">
+            <a:extLst>
+              <a:ext uri="{FF2B5EF4-FFF2-40B4-BE49-F238E27FC236}">
+                <a16:creationId xmlns:a16="http://schemas.microsoft.com/office/drawing/2014/main" id="{34011CD3-0F53-7697-5862-D30B1246A977}"/>
+              </a:ext>
+            </a:extLst>
+          </p:cNvPr>
+          <p:cNvSpPr/>
+          <p:nvPr/>
+        </p:nvSpPr>
+        <p:spPr>
+          <a:xfrm>
+            <a:off x="512983" y="3998786"/>
+            <a:ext cx="2441809" cy="733872"/>
+          </a:xfrm>
+          <a:prstGeom prst="rect">
+            <a:avLst/>
+          </a:prstGeom>
+          <a:solidFill>
+            <a:schemeClr val="bg1"/>
+          </a:solidFill>
+          <a:ln>
+            <a:solidFill>
+              <a:srgbClr val="4F3267"/>
+            </a:solidFill>
+          </a:ln>
+        </p:spPr>
+        <p:style>
+          <a:lnRef idx="2">
+            <a:schemeClr val="accent1">
+              <a:shade val="50000"/>
+            </a:schemeClr>
+          </a:lnRef>
+          <a:fillRef idx="1">
+            <a:schemeClr val="accent1"/>
+          </a:fillRef>
+          <a:effectRef idx="0">
+            <a:schemeClr val="accent1"/>
+          </a:effectRef>
+          <a:fontRef idx="minor">
+            <a:schemeClr val="lt1"/>
+          </a:fontRef>
+        </p:style>
+        <p:txBody>
+          <a:bodyPr rtlCol="0" anchor="ctr"/>
+          <a:lstStyle/>
+          <a:p>
+            <a:pPr marL="0" marR="0" lvl="0" indent="0" algn="ctr" defTabSz="914400" rtl="0" eaLnBrk="1" fontAlgn="auto" latinLnBrk="0" hangingPunct="1">
+              <a:lnSpc>
+                <a:spcPct val="100000"/>
+              </a:lnSpc>
+              <a:spcBef>
+                <a:spcPts val="0"/>
+              </a:spcBef>
+              <a:spcAft>
+                <a:spcPts val="0"/>
+              </a:spcAft>
+              <a:buClrTx/>
+              <a:buSzTx/>
+              <a:buFontTx/>
+              <a:buNone/>
+              <a:tabLst/>
+              <a:defRPr/>
+            </a:pPr>
+            <a:r>
+              <a:rPr kumimoji="0" lang="en-US" sz="1100" b="1" i="0" u="none" strike="noStrike" kern="1200" cap="none" spc="0" normalizeH="0" baseline="0" noProof="0" dirty="0">
+                <a:ln>
+                  <a:noFill/>
+                </a:ln>
+                <a:solidFill>
+                  <a:srgbClr val="4F3267"/>
+                </a:solidFill>
+                <a:effectLst/>
+                <a:uLnTx/>
+                <a:uFillTx/>
+                <a:latin typeface="Helvetica" panose="020B0604020202020204" pitchFamily="34" charset="0"/>
+                <a:ea typeface="+mn-ea"/>
+                <a:cs typeface="Helvetica" panose="020B0604020202020204" pitchFamily="34" charset="0"/>
+              </a:rPr>
+              <a:t>Monitor if customer is spending more than a specified time on website or browsing through suspiciously lot of products</a:t>
+            </a:r>
+            <a:endParaRPr kumimoji="0" lang="en-IN" sz="1100" b="1" i="0" u="none" strike="noStrike" kern="1200" cap="none" spc="0" normalizeH="0" baseline="0" noProof="0" dirty="0">
+              <a:ln>
+                <a:noFill/>
+              </a:ln>
+              <a:solidFill>
+                <a:srgbClr val="4F3267"/>
+              </a:solidFill>
+              <a:effectLst/>
+              <a:uLnTx/>
+              <a:uFillTx/>
+              <a:latin typeface="Helvetica" panose="020B0604020202020204" pitchFamily="34" charset="0"/>
+              <a:ea typeface="+mn-ea"/>
+              <a:cs typeface="Helvetica" panose="020B0604020202020204" pitchFamily="34" charset="0"/>
+            </a:endParaRPr>
+          </a:p>
+        </p:txBody>
+      </p:sp>
+      <p:sp>
+        <p:nvSpPr>
+          <p:cNvPr id="95" name="Rectangle 94">
+            <a:extLst>
+              <a:ext uri="{FF2B5EF4-FFF2-40B4-BE49-F238E27FC236}">
+                <a16:creationId xmlns:a16="http://schemas.microsoft.com/office/drawing/2014/main" id="{2E71AEB8-E689-5F0E-B43B-3639BA5BC02B}"/>
+              </a:ext>
+            </a:extLst>
+          </p:cNvPr>
+          <p:cNvSpPr/>
+          <p:nvPr/>
+        </p:nvSpPr>
+        <p:spPr>
+          <a:xfrm>
+            <a:off x="370569" y="4910903"/>
+            <a:ext cx="2765088" cy="625963"/>
+          </a:xfrm>
+          <a:prstGeom prst="rect">
+            <a:avLst/>
+          </a:prstGeom>
+          <a:solidFill>
+            <a:schemeClr val="bg1"/>
+          </a:solidFill>
+          <a:ln>
+            <a:solidFill>
+              <a:srgbClr val="4F3267"/>
+            </a:solidFill>
+          </a:ln>
+        </p:spPr>
+        <p:style>
+          <a:lnRef idx="2">
+            <a:schemeClr val="accent1">
+              <a:shade val="50000"/>
+            </a:schemeClr>
+          </a:lnRef>
+          <a:fillRef idx="1">
+            <a:schemeClr val="accent1"/>
+          </a:fillRef>
+          <a:effectRef idx="0">
+            <a:schemeClr val="accent1"/>
+          </a:effectRef>
+          <a:fontRef idx="minor">
+            <a:schemeClr val="lt1"/>
+          </a:fontRef>
+        </p:style>
+        <p:txBody>
+          <a:bodyPr rtlCol="0" anchor="ctr"/>
+          <a:lstStyle/>
+          <a:p>
+            <a:pPr marL="0" marR="0" lvl="0" indent="0" algn="ctr" defTabSz="914400" rtl="0" eaLnBrk="1" fontAlgn="auto" latinLnBrk="0" hangingPunct="1">
+              <a:lnSpc>
+                <a:spcPct val="100000"/>
+              </a:lnSpc>
+              <a:spcBef>
+                <a:spcPts val="0"/>
+              </a:spcBef>
+              <a:spcAft>
+                <a:spcPts val="0"/>
+              </a:spcAft>
+              <a:buClrTx/>
+              <a:buSzTx/>
+              <a:buFontTx/>
+              <a:buNone/>
+              <a:tabLst/>
+              <a:defRPr/>
+            </a:pPr>
+            <a:r>
+              <a:rPr kumimoji="0" lang="en-US" sz="1100" b="1" i="0" u="none" strike="noStrike" kern="1200" cap="none" spc="0" normalizeH="0" baseline="0" noProof="0" dirty="0">
+                <a:ln>
+                  <a:noFill/>
+                </a:ln>
+                <a:solidFill>
+                  <a:srgbClr val="4F3267"/>
+                </a:solidFill>
+                <a:effectLst/>
+                <a:uLnTx/>
+                <a:uFillTx/>
+                <a:latin typeface="Helvetica" panose="020B0604020202020204" pitchFamily="34" charset="0"/>
+                <a:ea typeface="+mn-ea"/>
+                <a:cs typeface="Helvetica" panose="020B0604020202020204" pitchFamily="34" charset="0"/>
+              </a:rPr>
+              <a:t>Monitor customer Loyalty card points and see if the customer has received huge points from some other accounts</a:t>
+            </a:r>
+            <a:endParaRPr kumimoji="0" lang="en-IN" sz="1100" b="1" i="0" u="none" strike="noStrike" kern="1200" cap="none" spc="0" normalizeH="0" baseline="0" noProof="0" dirty="0">
+              <a:ln>
+                <a:noFill/>
+              </a:ln>
+              <a:solidFill>
+                <a:srgbClr val="4F3267"/>
+              </a:solidFill>
+              <a:effectLst/>
+              <a:uLnTx/>
+              <a:uFillTx/>
+              <a:latin typeface="Helvetica" panose="020B0604020202020204" pitchFamily="34" charset="0"/>
+              <a:ea typeface="+mn-ea"/>
+              <a:cs typeface="Helvetica" panose="020B0604020202020204" pitchFamily="34" charset="0"/>
+            </a:endParaRPr>
+          </a:p>
+        </p:txBody>
+      </p:sp>
+      <p:sp>
+        <p:nvSpPr>
+          <p:cNvPr id="96" name="Rectangle 95">
+            <a:extLst>
+              <a:ext uri="{FF2B5EF4-FFF2-40B4-BE49-F238E27FC236}">
+                <a16:creationId xmlns:a16="http://schemas.microsoft.com/office/drawing/2014/main" id="{74A3ABC0-5070-B6A2-ADFD-1DF61E2EDB2B}"/>
+              </a:ext>
+            </a:extLst>
+          </p:cNvPr>
+          <p:cNvSpPr/>
+          <p:nvPr/>
+        </p:nvSpPr>
+        <p:spPr>
+          <a:xfrm>
+            <a:off x="915989" y="5715111"/>
+            <a:ext cx="2381785" cy="516877"/>
+          </a:xfrm>
+          <a:prstGeom prst="rect">
+            <a:avLst/>
+          </a:prstGeom>
+          <a:solidFill>
+            <a:schemeClr val="bg1"/>
+          </a:solidFill>
+          <a:ln>
+            <a:solidFill>
+              <a:srgbClr val="4F3267"/>
+            </a:solidFill>
+          </a:ln>
+        </p:spPr>
+        <p:style>
+          <a:lnRef idx="2">
+            <a:schemeClr val="accent1">
+              <a:shade val="50000"/>
+            </a:schemeClr>
+          </a:lnRef>
+          <a:fillRef idx="1">
+            <a:schemeClr val="accent1"/>
+          </a:fillRef>
+          <a:effectRef idx="0">
+            <a:schemeClr val="accent1"/>
+          </a:effectRef>
+          <a:fontRef idx="minor">
+            <a:schemeClr val="lt1"/>
+          </a:fontRef>
+        </p:style>
+        <p:txBody>
+          <a:bodyPr rtlCol="0" anchor="ctr"/>
+          <a:lstStyle/>
+          <a:p>
+            <a:pPr marL="0" marR="0" lvl="0" indent="0" algn="ctr" defTabSz="914400" rtl="0" eaLnBrk="1" fontAlgn="auto" latinLnBrk="0" hangingPunct="1">
+              <a:lnSpc>
+                <a:spcPct val="100000"/>
+              </a:lnSpc>
+              <a:spcBef>
+                <a:spcPts val="0"/>
+              </a:spcBef>
+              <a:spcAft>
+                <a:spcPts val="0"/>
+              </a:spcAft>
+              <a:buClrTx/>
+              <a:buSzTx/>
+              <a:buFontTx/>
+              <a:buNone/>
+              <a:tabLst/>
+              <a:defRPr/>
+            </a:pPr>
+            <a:r>
+              <a:rPr kumimoji="0" lang="en-US" sz="1100" b="1" i="0" u="none" strike="noStrike" kern="1200" cap="none" spc="0" normalizeH="0" baseline="0" noProof="0" dirty="0">
+                <a:ln>
+                  <a:noFill/>
+                </a:ln>
+                <a:solidFill>
+                  <a:srgbClr val="4F3267"/>
+                </a:solidFill>
+                <a:effectLst/>
+                <a:uLnTx/>
+                <a:uFillTx/>
+                <a:latin typeface="Helvetica" panose="020B0604020202020204" pitchFamily="34" charset="0"/>
+                <a:ea typeface="+mn-ea"/>
+                <a:cs typeface="Helvetica" panose="020B0604020202020204" pitchFamily="34" charset="0"/>
+              </a:rPr>
+              <a:t>Track if customer is entering lot of wrong Gift or Coupon Codes before Checkout</a:t>
+            </a:r>
+            <a:endParaRPr kumimoji="0" lang="en-IN" sz="1100" b="1" i="0" u="none" strike="noStrike" kern="1200" cap="none" spc="0" normalizeH="0" baseline="0" noProof="0" dirty="0">
+              <a:ln>
+                <a:noFill/>
+              </a:ln>
+              <a:solidFill>
+                <a:srgbClr val="4F3267"/>
+              </a:solidFill>
+              <a:effectLst/>
+              <a:uLnTx/>
+              <a:uFillTx/>
+              <a:latin typeface="Helvetica" panose="020B0604020202020204" pitchFamily="34" charset="0"/>
+              <a:ea typeface="+mn-ea"/>
+              <a:cs typeface="Helvetica" panose="020B0604020202020204" pitchFamily="34" charset="0"/>
+            </a:endParaRPr>
+          </a:p>
+        </p:txBody>
+      </p:sp>
+      <p:cxnSp>
+        <p:nvCxnSpPr>
+          <p:cNvPr id="97" name="Straight Arrow Connector 96">
+            <a:extLst>
+              <a:ext uri="{FF2B5EF4-FFF2-40B4-BE49-F238E27FC236}">
+                <a16:creationId xmlns:a16="http://schemas.microsoft.com/office/drawing/2014/main" id="{0B8C1B60-3147-B9F0-0EDF-993783FDA06A}"/>
+              </a:ext>
+            </a:extLst>
+          </p:cNvPr>
+          <p:cNvCxnSpPr>
+            <a:cxnSpLocks/>
+            <a:stCxn id="63" idx="1"/>
+          </p:cNvCxnSpPr>
+          <p:nvPr/>
+        </p:nvCxnSpPr>
+        <p:spPr>
+          <a:xfrm flipH="1" flipV="1">
+            <a:off x="3416319" y="3501928"/>
+            <a:ext cx="617959" cy="715078"/>
+          </a:xfrm>
+          <a:prstGeom prst="straightConnector1">
+            <a:avLst/>
+          </a:prstGeom>
+          <a:ln>
+            <a:solidFill>
+              <a:srgbClr val="4F3267"/>
+            </a:solidFill>
+            <a:tailEnd type="triangle"/>
+          </a:ln>
+        </p:spPr>
+        <p:style>
+          <a:lnRef idx="1">
+            <a:schemeClr val="accent1"/>
+          </a:lnRef>
+          <a:fillRef idx="0">
+            <a:schemeClr val="accent1"/>
+          </a:fillRef>
+          <a:effectRef idx="0">
+            <a:schemeClr val="accent1"/>
+          </a:effectRef>
+          <a:fontRef idx="minor">
+            <a:schemeClr val="tx1"/>
+          </a:fontRef>
+        </p:style>
+      </p:cxnSp>
+      <p:cxnSp>
+        <p:nvCxnSpPr>
+          <p:cNvPr id="101" name="Straight Arrow Connector 100">
+            <a:extLst>
+              <a:ext uri="{FF2B5EF4-FFF2-40B4-BE49-F238E27FC236}">
+                <a16:creationId xmlns:a16="http://schemas.microsoft.com/office/drawing/2014/main" id="{A3E24444-C3DE-C0BF-509B-30EB9D6A0DC9}"/>
+              </a:ext>
+            </a:extLst>
+          </p:cNvPr>
+          <p:cNvCxnSpPr>
+            <a:cxnSpLocks/>
+            <a:endCxn id="94" idx="3"/>
+          </p:cNvCxnSpPr>
+          <p:nvPr/>
+        </p:nvCxnSpPr>
+        <p:spPr>
+          <a:xfrm flipH="1" flipV="1">
+            <a:off x="2954792" y="4365722"/>
+            <a:ext cx="926790" cy="67897"/>
+          </a:xfrm>
+          <a:prstGeom prst="straightConnector1">
+            <a:avLst/>
+          </a:prstGeom>
+          <a:ln>
+            <a:solidFill>
+              <a:srgbClr val="4F3267"/>
+            </a:solidFill>
+            <a:tailEnd type="triangle"/>
+          </a:ln>
+        </p:spPr>
+        <p:style>
+          <a:lnRef idx="1">
+            <a:schemeClr val="accent1"/>
+          </a:lnRef>
+          <a:fillRef idx="0">
+            <a:schemeClr val="accent1"/>
+          </a:fillRef>
+          <a:effectRef idx="0">
+            <a:schemeClr val="accent1"/>
+          </a:effectRef>
+          <a:fontRef idx="minor">
+            <a:schemeClr val="tx1"/>
+          </a:fontRef>
+        </p:style>
+      </p:cxnSp>
+      <p:cxnSp>
+        <p:nvCxnSpPr>
+          <p:cNvPr id="105" name="Straight Arrow Connector 104">
+            <a:extLst>
+              <a:ext uri="{FF2B5EF4-FFF2-40B4-BE49-F238E27FC236}">
+                <a16:creationId xmlns:a16="http://schemas.microsoft.com/office/drawing/2014/main" id="{37F1398E-8E75-789B-4C3F-7B173BCD61D5}"/>
+              </a:ext>
+            </a:extLst>
+          </p:cNvPr>
+          <p:cNvCxnSpPr>
+            <a:cxnSpLocks/>
+            <a:stCxn id="63" idx="3"/>
+            <a:endCxn id="95" idx="3"/>
+          </p:cNvCxnSpPr>
+          <p:nvPr/>
+        </p:nvCxnSpPr>
+        <p:spPr>
+          <a:xfrm flipH="1">
+            <a:off x="3135657" y="5173452"/>
+            <a:ext cx="898621" cy="50433"/>
+          </a:xfrm>
+          <a:prstGeom prst="straightConnector1">
+            <a:avLst/>
+          </a:prstGeom>
+          <a:ln>
+            <a:solidFill>
+              <a:srgbClr val="4F3267"/>
+            </a:solidFill>
+            <a:tailEnd type="triangle"/>
+          </a:ln>
+        </p:spPr>
+        <p:style>
+          <a:lnRef idx="1">
+            <a:schemeClr val="accent1"/>
+          </a:lnRef>
+          <a:fillRef idx="0">
+            <a:schemeClr val="accent1"/>
+          </a:fillRef>
+          <a:effectRef idx="0">
+            <a:schemeClr val="accent1"/>
+          </a:effectRef>
+          <a:fontRef idx="minor">
+            <a:schemeClr val="tx1"/>
+          </a:fontRef>
+        </p:style>
+      </p:cxnSp>
+      <p:cxnSp>
+        <p:nvCxnSpPr>
+          <p:cNvPr id="108" name="Straight Arrow Connector 107">
+            <a:extLst>
+              <a:ext uri="{FF2B5EF4-FFF2-40B4-BE49-F238E27FC236}">
+                <a16:creationId xmlns:a16="http://schemas.microsoft.com/office/drawing/2014/main" id="{3B088FBF-A027-A1BF-22CB-2B3B03DBBF68}"/>
+              </a:ext>
+            </a:extLst>
+          </p:cNvPr>
+          <p:cNvCxnSpPr>
+            <a:cxnSpLocks/>
+            <a:stCxn id="63" idx="4"/>
+            <a:endCxn id="96" idx="3"/>
+          </p:cNvCxnSpPr>
+          <p:nvPr/>
+        </p:nvCxnSpPr>
+        <p:spPr>
+          <a:xfrm flipH="1">
+            <a:off x="3297774" y="5371539"/>
+            <a:ext cx="1258169" cy="602011"/>
+          </a:xfrm>
+          <a:prstGeom prst="straightConnector1">
+            <a:avLst/>
+          </a:prstGeom>
+          <a:ln>
+            <a:solidFill>
+              <a:srgbClr val="4F3267"/>
+            </a:solidFill>
+            <a:tailEnd type="triangle"/>
+          </a:ln>
+        </p:spPr>
+        <p:style>
+          <a:lnRef idx="1">
+            <a:schemeClr val="accent1"/>
+          </a:lnRef>
+          <a:fillRef idx="0">
+            <a:schemeClr val="accent1"/>
+          </a:fillRef>
+          <a:effectRef idx="0">
+            <a:schemeClr val="accent1"/>
+          </a:effectRef>
+          <a:fontRef idx="minor">
+            <a:schemeClr val="tx1"/>
+          </a:fontRef>
+        </p:style>
+      </p:cxnSp>
+    </p:spTree>
+    <p:extLst>
+      <p:ext uri="{BB962C8B-B14F-4D97-AF65-F5344CB8AC3E}">
+        <p14:creationId xmlns:p14="http://schemas.microsoft.com/office/powerpoint/2010/main" val="1372167563"/>
+      </p:ext>
+    </p:extLst>
+  </p:cSld>
+  <p:clrMapOvr>
+    <a:masterClrMapping/>
+  </p:clrMapOvr>
+</p:sld>
+</file>
+
+<file path=ppt/slides/slide9.xml><?xml version="1.0" encoding="utf-8"?>
 <p:sld xmlns:a="http://schemas.openxmlformats.org/drawingml/2006/main" xmlns:r="http://schemas.openxmlformats.org/officeDocument/2006/relationships" xmlns:p="http://schemas.openxmlformats.org/presentationml/2006/main">
   <p:cSld>
     <p:spTree>

</xml_diff>